<commit_message>
Updated nightlight project. Added class notes slide
</commit_message>
<xml_diff>
--- a/docs/Introduction to Arduino.pptx
+++ b/docs/Introduction to Arduino.pptx
@@ -5,33 +5,34 @@
     <p:sldMasterId id="2147483660" r:id="rId1"/>
   </p:sldMasterIdLst>
   <p:notesMasterIdLst>
-    <p:notesMasterId r:id="rId26"/>
+    <p:notesMasterId r:id="rId27"/>
   </p:notesMasterIdLst>
   <p:sldIdLst>
     <p:sldId id="256" r:id="rId2"/>
     <p:sldId id="267" r:id="rId3"/>
-    <p:sldId id="257" r:id="rId4"/>
-    <p:sldId id="268" r:id="rId5"/>
-    <p:sldId id="258" r:id="rId6"/>
-    <p:sldId id="260" r:id="rId7"/>
-    <p:sldId id="269" r:id="rId8"/>
-    <p:sldId id="262" r:id="rId9"/>
-    <p:sldId id="263" r:id="rId10"/>
-    <p:sldId id="264" r:id="rId11"/>
-    <p:sldId id="259" r:id="rId12"/>
-    <p:sldId id="261" r:id="rId13"/>
-    <p:sldId id="277" r:id="rId14"/>
-    <p:sldId id="270" r:id="rId15"/>
-    <p:sldId id="271" r:id="rId16"/>
-    <p:sldId id="272" r:id="rId17"/>
-    <p:sldId id="273" r:id="rId18"/>
-    <p:sldId id="274" r:id="rId19"/>
-    <p:sldId id="275" r:id="rId20"/>
-    <p:sldId id="276" r:id="rId21"/>
-    <p:sldId id="266" r:id="rId22"/>
-    <p:sldId id="265" r:id="rId23"/>
-    <p:sldId id="278" r:id="rId24"/>
-    <p:sldId id="279" r:id="rId25"/>
+    <p:sldId id="280" r:id="rId4"/>
+    <p:sldId id="257" r:id="rId5"/>
+    <p:sldId id="268" r:id="rId6"/>
+    <p:sldId id="258" r:id="rId7"/>
+    <p:sldId id="260" r:id="rId8"/>
+    <p:sldId id="269" r:id="rId9"/>
+    <p:sldId id="262" r:id="rId10"/>
+    <p:sldId id="263" r:id="rId11"/>
+    <p:sldId id="264" r:id="rId12"/>
+    <p:sldId id="259" r:id="rId13"/>
+    <p:sldId id="261" r:id="rId14"/>
+    <p:sldId id="277" r:id="rId15"/>
+    <p:sldId id="270" r:id="rId16"/>
+    <p:sldId id="271" r:id="rId17"/>
+    <p:sldId id="272" r:id="rId18"/>
+    <p:sldId id="273" r:id="rId19"/>
+    <p:sldId id="274" r:id="rId20"/>
+    <p:sldId id="275" r:id="rId21"/>
+    <p:sldId id="276" r:id="rId22"/>
+    <p:sldId id="266" r:id="rId23"/>
+    <p:sldId id="265" r:id="rId24"/>
+    <p:sldId id="278" r:id="rId25"/>
+    <p:sldId id="279" r:id="rId26"/>
   </p:sldIdLst>
   <p:sldSz cx="12192000" cy="6858000"/>
   <p:notesSz cx="7315200" cy="9601200"/>
@@ -725,7 +726,7 @@
           <a:p>
             <a:fld id="{4A861C55-573A-4575-87D0-721189A62B1A}" type="datetimeFigureOut">
               <a:rPr lang="en-US" smtClean="0"/>
-              <a:t>9/28/2021</a:t>
+              <a:t>10/13/2021</a:t>
             </a:fld>
             <a:endParaRPr lang="en-US"/>
           </a:p>
@@ -1237,7 +1238,7 @@
           <a:p>
             <a:fld id="{F75B3346-D7F0-4D8C-A364-9CE3883CE6B6}" type="slidenum">
               <a:rPr lang="en-US" smtClean="0"/>
-              <a:t>3</a:t>
+              <a:t>4</a:t>
             </a:fld>
             <a:endParaRPr lang="en-US"/>
           </a:p>
@@ -1321,7 +1322,7 @@
           <a:p>
             <a:fld id="{F75B3346-D7F0-4D8C-A364-9CE3883CE6B6}" type="slidenum">
               <a:rPr lang="en-US" smtClean="0"/>
-              <a:t>5</a:t>
+              <a:t>6</a:t>
             </a:fld>
             <a:endParaRPr lang="en-US"/>
           </a:p>
@@ -1405,7 +1406,7 @@
           <a:p>
             <a:fld id="{F75B3346-D7F0-4D8C-A364-9CE3883CE6B6}" type="slidenum">
               <a:rPr lang="en-US" smtClean="0"/>
-              <a:t>12</a:t>
+              <a:t>13</a:t>
             </a:fld>
             <a:endParaRPr lang="en-US"/>
           </a:p>
@@ -1489,7 +1490,7 @@
           <a:p>
             <a:fld id="{F75B3346-D7F0-4D8C-A364-9CE3883CE6B6}" type="slidenum">
               <a:rPr lang="en-US" smtClean="0"/>
-              <a:t>13</a:t>
+              <a:t>14</a:t>
             </a:fld>
             <a:endParaRPr lang="en-US"/>
           </a:p>
@@ -1734,7 +1735,7 @@
           <a:p>
             <a:fld id="{535A6ECC-B47E-4333-AF56-7D6B53A728C1}" type="datetime1">
               <a:rPr lang="en-US" smtClean="0"/>
-              <a:t>9/28/2021</a:t>
+              <a:t>10/13/2021</a:t>
             </a:fld>
             <a:endParaRPr lang="en-US"/>
           </a:p>
@@ -1945,7 +1946,7 @@
           <a:p>
             <a:fld id="{3AC83308-0B1A-4095-AE48-6FD04CA62E2F}" type="datetime1">
               <a:rPr lang="en-US" smtClean="0"/>
-              <a:t>9/28/2021</a:t>
+              <a:t>10/13/2021</a:t>
             </a:fld>
             <a:endParaRPr lang="en-US"/>
           </a:p>
@@ -2204,7 +2205,7 @@
           <a:p>
             <a:fld id="{28B83625-5325-4108-BA4A-8AEA791FA3D9}" type="datetime1">
               <a:rPr lang="en-US" smtClean="0"/>
-              <a:t>9/28/2021</a:t>
+              <a:t>10/13/2021</a:t>
             </a:fld>
             <a:endParaRPr lang="en-US"/>
           </a:p>
@@ -2381,7 +2382,7 @@
           <a:p>
             <a:fld id="{DFE20814-A8AC-4A12-AC2A-0C83C165F5B0}" type="datetime1">
               <a:rPr lang="en-US" smtClean="0"/>
-              <a:t>9/28/2021</a:t>
+              <a:t>10/13/2021</a:t>
             </a:fld>
             <a:endParaRPr lang="en-US"/>
           </a:p>
@@ -2727,7 +2728,7 @@
           <a:p>
             <a:fld id="{8FFEFE8B-BC27-47B1-A2BC-08723A697AC2}" type="datetime1">
               <a:rPr lang="en-US" smtClean="0"/>
-              <a:t>9/28/2021</a:t>
+              <a:t>10/13/2021</a:t>
             </a:fld>
             <a:endParaRPr lang="en-US"/>
           </a:p>
@@ -3005,7 +3006,7 @@
           <a:p>
             <a:fld id="{1552D9A3-B737-42EF-8E68-5E109E88E2B3}" type="datetime1">
               <a:rPr lang="en-US" smtClean="0"/>
-              <a:t>9/28/2021</a:t>
+              <a:t>10/13/2021</a:t>
             </a:fld>
             <a:endParaRPr lang="en-US"/>
           </a:p>
@@ -3387,7 +3388,7 @@
           <a:p>
             <a:fld id="{8A10665B-4C1B-49BA-8463-A1FAD4616F0A}" type="datetime1">
               <a:rPr lang="en-US" smtClean="0"/>
-              <a:t>9/28/2021</a:t>
+              <a:t>10/13/2021</a:t>
             </a:fld>
             <a:endParaRPr lang="en-US"/>
           </a:p>
@@ -3508,7 +3509,7 @@
           <a:p>
             <a:fld id="{ED7C0A16-7385-4340-A364-F0ABD84FB76E}" type="datetime1">
               <a:rPr lang="en-US" smtClean="0"/>
-              <a:t>9/28/2021</a:t>
+              <a:t>10/13/2021</a:t>
             </a:fld>
             <a:endParaRPr lang="en-US"/>
           </a:p>
@@ -3682,7 +3683,7 @@
           <a:p>
             <a:fld id="{70DD088D-CD95-400F-B449-841C3EF2C34D}" type="datetime1">
               <a:rPr lang="en-US" smtClean="0"/>
-              <a:t>9/28/2021</a:t>
+              <a:t>10/13/2021</a:t>
             </a:fld>
             <a:endParaRPr lang="en-US"/>
           </a:p>
@@ -4039,7 +4040,7 @@
           <a:p>
             <a:fld id="{8DADA382-CFF3-4E38-B3B0-A0A9802453AA}" type="datetime1">
               <a:rPr lang="en-US" smtClean="0"/>
-              <a:t>9/28/2021</a:t>
+              <a:t>10/13/2021</a:t>
             </a:fld>
             <a:endParaRPr lang="en-US"/>
           </a:p>
@@ -4424,7 +4425,7 @@
           <a:p>
             <a:fld id="{494878A2-9AA6-4CED-BB30-45870680D252}" type="datetime1">
               <a:rPr lang="en-US" smtClean="0"/>
-              <a:t>9/28/2021</a:t>
+              <a:t>10/13/2021</a:t>
             </a:fld>
             <a:endParaRPr lang="en-US"/>
           </a:p>
@@ -4714,7 +4715,7 @@
           <a:p>
             <a:fld id="{D3EE4551-0335-48B6-85FF-7403C6145F24}" type="datetime1">
               <a:rPr lang="en-US" smtClean="0"/>
-              <a:t>9/28/2021</a:t>
+              <a:t>10/13/2021</a:t>
             </a:fld>
             <a:endParaRPr lang="en-US"/>
           </a:p>
@@ -5329,7 +5330,7 @@
       </p:grpSpPr>
       <p:sp>
         <p:nvSpPr>
-          <p:cNvPr id="2" name="Title 1"/>
+          <p:cNvPr id="5" name="Title 4"/>
           <p:cNvSpPr>
             <a:spLocks noGrp="1"/>
           </p:cNvSpPr>
@@ -5344,148 +5345,123 @@
           <a:p>
             <a:r>
               <a:rPr lang="en-US" dirty="0"/>
-              <a:t>SPI</a:t>
-            </a:r>
-          </a:p>
-        </p:txBody>
-      </p:sp>
-      <p:sp>
-        <p:nvSpPr>
-          <p:cNvPr id="4" name="Content Placeholder 3"/>
-          <p:cNvSpPr>
-            <a:spLocks noGrp="1"/>
-          </p:cNvSpPr>
-          <p:nvPr>
-            <p:ph sz="half" idx="1"/>
-          </p:nvPr>
-        </p:nvSpPr>
-        <p:spPr/>
-        <p:txBody>
-          <a:bodyPr>
-            <a:normAutofit/>
-          </a:bodyPr>
-          <a:lstStyle/>
-          <a:p>
-            <a:r>
-              <a:rPr lang="en-US" dirty="0"/>
-              <a:t>The </a:t>
-            </a:r>
-            <a:r>
-              <a:rPr lang="en-US" b="1" dirty="0"/>
-              <a:t>Serial Peripheral Interface</a:t>
-            </a:r>
-            <a:r>
-              <a:rPr lang="en-US" dirty="0"/>
-              <a:t> (</a:t>
-            </a:r>
-            <a:r>
-              <a:rPr lang="en-US" b="1" dirty="0"/>
-              <a:t>SPI</a:t>
-            </a:r>
-            <a:r>
-              <a:rPr lang="en-US" dirty="0"/>
-              <a:t>) is a </a:t>
-            </a:r>
-            <a:r>
-              <a:rPr lang="en-US" dirty="0">
-                <a:hlinkClick r:id="rId2" tooltip="Synchronous circuit"/>
-              </a:rPr>
-              <a:t>synchronous</a:t>
-            </a:r>
-            <a:r>
-              <a:rPr lang="en-US" dirty="0"/>
-              <a:t> </a:t>
-            </a:r>
-            <a:r>
-              <a:rPr lang="en-US" dirty="0">
-                <a:hlinkClick r:id="rId3" tooltip="Serial communication"/>
-              </a:rPr>
-              <a:t>serial communication</a:t>
-            </a:r>
-            <a:r>
-              <a:rPr lang="en-US" dirty="0"/>
-              <a:t> interface specification used for short distance communication, primarily in </a:t>
-            </a:r>
-            <a:r>
-              <a:rPr lang="en-US" dirty="0">
-                <a:hlinkClick r:id="rId4" tooltip="Embedded systems"/>
-              </a:rPr>
-              <a:t>embedded systems</a:t>
-            </a:r>
-            <a:r>
-              <a:rPr lang="en-US" dirty="0"/>
-              <a:t>. The interface was developed by </a:t>
-            </a:r>
-            <a:r>
-              <a:rPr lang="en-US" dirty="0">
-                <a:hlinkClick r:id="rId5" tooltip="Motorola"/>
-              </a:rPr>
-              <a:t>Motorola</a:t>
-            </a:r>
-            <a:r>
-              <a:rPr lang="en-US" dirty="0"/>
-              <a:t> in the mid 1980s and has become a </a:t>
-            </a:r>
-            <a:r>
-              <a:rPr lang="en-US" i="1" dirty="0">
-                <a:hlinkClick r:id="rId6" tooltip="De facto standard"/>
-              </a:rPr>
-              <a:t>de facto</a:t>
-            </a:r>
-            <a:r>
-              <a:rPr lang="en-US" dirty="0">
-                <a:hlinkClick r:id="rId6" tooltip="De facto standard"/>
-              </a:rPr>
-              <a:t> standard</a:t>
-            </a:r>
-            <a:r>
-              <a:rPr lang="en-US" dirty="0"/>
-              <a:t>. Typical applications include </a:t>
-            </a:r>
-            <a:r>
-              <a:rPr lang="en-US" dirty="0">
-                <a:hlinkClick r:id="rId7" tooltip="Secure Digital"/>
-              </a:rPr>
-              <a:t>Secure Digital</a:t>
-            </a:r>
-            <a:r>
-              <a:rPr lang="en-US" dirty="0"/>
-              <a:t> cards and </a:t>
-            </a:r>
-            <a:r>
-              <a:rPr lang="en-US" dirty="0">
-                <a:hlinkClick r:id="rId8" tooltip="Liquid crystal display"/>
-              </a:rPr>
-              <a:t>liquid crystal displays</a:t>
-            </a:r>
-            <a:r>
-              <a:rPr lang="en-US" dirty="0"/>
-              <a:t>. </a:t>
-            </a:r>
-          </a:p>
-          <a:p>
-            <a:pPr marL="914400" lvl="2" indent="0">
+              <a:t>I2C</a:t>
+            </a:r>
+          </a:p>
+        </p:txBody>
+      </p:sp>
+      <p:sp>
+        <p:nvSpPr>
+          <p:cNvPr id="6" name="Content Placeholder 5"/>
+          <p:cNvSpPr>
+            <a:spLocks noGrp="1"/>
+          </p:cNvSpPr>
+          <p:nvPr>
+            <p:ph idx="1"/>
+          </p:nvPr>
+        </p:nvSpPr>
+        <p:spPr/>
+        <p:txBody>
+          <a:bodyPr/>
+          <a:lstStyle/>
+          <a:p>
+            <a:r>
+              <a:rPr lang="en-US" dirty="0"/>
+              <a:t>I²C ( Inter-Integrated Circuit ), pronounced I-squared-C , is a synchronous , multi-master, multi-slave , packet switched , single-ended , serial computer bus invented in 1982 by Philips Semiconductor (now NXP Semiconductors ). It is widely used for attaching lower-speed peripheral ICs to processors and microcontrollers in short-distance, intra-board communication. Alternatively I²C is spelled I2C (pronounced I-two-C) or IIC (pronounced I-I-C).</a:t>
+            </a:r>
+          </a:p>
+          <a:p>
+            <a:pPr marL="0" indent="0">
               <a:buNone/>
             </a:pPr>
             <a:r>
               <a:rPr lang="en-US" dirty="0"/>
-              <a:t>		Wikipedia</a:t>
-            </a:r>
+              <a:t>								Wikipedia</a:t>
+            </a:r>
+          </a:p>
+        </p:txBody>
+      </p:sp>
+      <p:sp>
+        <p:nvSpPr>
+          <p:cNvPr id="2" name="Footer Placeholder 1">
+            <a:extLst>
+              <a:ext uri="{FF2B5EF4-FFF2-40B4-BE49-F238E27FC236}">
+                <a16:creationId xmlns:a16="http://schemas.microsoft.com/office/drawing/2014/main" id="{D4B7E5A5-76BD-4285-96A4-A5DB195F83D6}"/>
+              </a:ext>
+            </a:extLst>
+          </p:cNvPr>
+          <p:cNvSpPr>
+            <a:spLocks noGrp="1"/>
+          </p:cNvSpPr>
+          <p:nvPr>
+            <p:ph type="ftr" sz="quarter" idx="11"/>
+          </p:nvPr>
+        </p:nvSpPr>
+        <p:spPr/>
+        <p:txBody>
+          <a:bodyPr/>
+          <a:lstStyle/>
+          <a:p>
+            <a:r>
+              <a:rPr lang="en-US" dirty="0"/>
+              <a:t>Rochester </a:t>
+            </a:r>
+            <a:r>
+              <a:rPr lang="en-US" dirty="0" err="1"/>
+              <a:t>MakerSpace</a:t>
+            </a:r>
+            <a:r>
+              <a:rPr lang="en-US" dirty="0"/>
+              <a:t> 2021</a:t>
+            </a:r>
+          </a:p>
+        </p:txBody>
+      </p:sp>
+      <p:sp>
+        <p:nvSpPr>
+          <p:cNvPr id="3" name="Slide Number Placeholder 2">
+            <a:extLst>
+              <a:ext uri="{FF2B5EF4-FFF2-40B4-BE49-F238E27FC236}">
+                <a16:creationId xmlns:a16="http://schemas.microsoft.com/office/drawing/2014/main" id="{F8F509E3-8B64-4169-96B6-2028505F61DB}"/>
+              </a:ext>
+            </a:extLst>
+          </p:cNvPr>
+          <p:cNvSpPr>
+            <a:spLocks noGrp="1"/>
+          </p:cNvSpPr>
+          <p:nvPr>
+            <p:ph type="sldNum" sz="quarter" idx="12"/>
+          </p:nvPr>
+        </p:nvSpPr>
+        <p:spPr/>
+        <p:txBody>
+          <a:bodyPr/>
+          <a:lstStyle/>
+          <a:p>
+            <a:fld id="{ADDE84BC-4FC7-4B69-BEAA-AA840A7919E3}" type="slidenum">
+              <a:rPr lang="en-US" smtClean="0"/>
+              <a:t>10</a:t>
+            </a:fld>
+            <a:endParaRPr lang="en-US"/>
           </a:p>
         </p:txBody>
       </p:sp>
       <p:pic>
         <p:nvPicPr>
-          <p:cNvPr id="6" name="Content Placeholder 5"/>
+          <p:cNvPr id="7" name="Picture 6">
+            <a:extLst>
+              <a:ext uri="{FF2B5EF4-FFF2-40B4-BE49-F238E27FC236}">
+                <a16:creationId xmlns:a16="http://schemas.microsoft.com/office/drawing/2014/main" id="{AEE8F0F6-01E6-4F6D-88B9-E419E370DA89}"/>
+              </a:ext>
+            </a:extLst>
+          </p:cNvPr>
           <p:cNvPicPr>
-            <a:picLocks noGrp="1" noChangeAspect="1"/>
+            <a:picLocks noChangeAspect="1"/>
           </p:cNvPicPr>
-          <p:nvPr>
-            <p:ph sz="half" idx="2"/>
-          </p:nvPr>
+          <p:nvPr/>
         </p:nvPicPr>
         <p:blipFill>
-          <a:blip r:embed="rId9">
+          <a:blip r:embed="rId2">
             <a:extLst>
               <a:ext uri="{28A0092B-C50C-407E-A947-70E740481C1C}">
                 <a14:useLocalDpi xmlns:a14="http://schemas.microsoft.com/office/drawing/2010/main" val="0"/>
@@ -5498,80 +5474,18 @@
         </p:blipFill>
         <p:spPr>
           <a:xfrm>
-            <a:off x="6218238" y="3086200"/>
-            <a:ext cx="4937125" cy="1542851"/>
+            <a:off x="2538128" y="3693437"/>
+            <a:ext cx="4067743" cy="2095792"/>
           </a:xfrm>
+          <a:prstGeom prst="rect">
+            <a:avLst/>
+          </a:prstGeom>
         </p:spPr>
       </p:pic>
-      <p:sp>
-        <p:nvSpPr>
-          <p:cNvPr id="3" name="Footer Placeholder 2">
-            <a:extLst>
-              <a:ext uri="{FF2B5EF4-FFF2-40B4-BE49-F238E27FC236}">
-                <a16:creationId xmlns:a16="http://schemas.microsoft.com/office/drawing/2014/main" id="{48C4A1CF-FF80-4DE4-8EB5-86ED3EE2F475}"/>
-              </a:ext>
-            </a:extLst>
-          </p:cNvPr>
-          <p:cNvSpPr>
-            <a:spLocks noGrp="1"/>
-          </p:cNvSpPr>
-          <p:nvPr>
-            <p:ph type="ftr" sz="quarter" idx="11"/>
-          </p:nvPr>
-        </p:nvSpPr>
-        <p:spPr/>
-        <p:txBody>
-          <a:bodyPr/>
-          <a:lstStyle/>
-          <a:p>
-            <a:r>
-              <a:rPr lang="en-US" dirty="0"/>
-              <a:t>Rochester </a:t>
-            </a:r>
-            <a:r>
-              <a:rPr lang="en-US" dirty="0" err="1"/>
-              <a:t>MakerSpace</a:t>
-            </a:r>
-            <a:r>
-              <a:rPr lang="en-US" dirty="0"/>
-              <a:t> 2021</a:t>
-            </a:r>
-          </a:p>
-        </p:txBody>
-      </p:sp>
-      <p:sp>
-        <p:nvSpPr>
-          <p:cNvPr id="5" name="Slide Number Placeholder 4">
-            <a:extLst>
-              <a:ext uri="{FF2B5EF4-FFF2-40B4-BE49-F238E27FC236}">
-                <a16:creationId xmlns:a16="http://schemas.microsoft.com/office/drawing/2014/main" id="{3B9BC356-196E-435E-9C24-CF5477F3BB51}"/>
-              </a:ext>
-            </a:extLst>
-          </p:cNvPr>
-          <p:cNvSpPr>
-            <a:spLocks noGrp="1"/>
-          </p:cNvSpPr>
-          <p:nvPr>
-            <p:ph type="sldNum" sz="quarter" idx="12"/>
-          </p:nvPr>
-        </p:nvSpPr>
-        <p:spPr/>
-        <p:txBody>
-          <a:bodyPr/>
-          <a:lstStyle/>
-          <a:p>
-            <a:fld id="{ADDE84BC-4FC7-4B69-BEAA-AA840A7919E3}" type="slidenum">
-              <a:rPr lang="en-US" smtClean="0"/>
-              <a:t>10</a:t>
-            </a:fld>
-            <a:endParaRPr lang="en-US"/>
-          </a:p>
-        </p:txBody>
-      </p:sp>
     </p:spTree>
     <p:extLst>
       <p:ext uri="{BB962C8B-B14F-4D97-AF65-F5344CB8AC3E}">
-        <p14:creationId xmlns:p14="http://schemas.microsoft.com/office/powerpoint/2010/main" val="887560721"/>
+        <p14:creationId xmlns:p14="http://schemas.microsoft.com/office/powerpoint/2010/main" val="2826264457"/>
       </p:ext>
     </p:extLst>
   </p:cSld>
@@ -5600,10 +5514,186 @@
       </p:grpSpPr>
       <p:sp>
         <p:nvSpPr>
-          <p:cNvPr id="2" name="Footer Placeholder 1">
+          <p:cNvPr id="2" name="Title 1"/>
+          <p:cNvSpPr>
+            <a:spLocks noGrp="1"/>
+          </p:cNvSpPr>
+          <p:nvPr>
+            <p:ph type="title"/>
+          </p:nvPr>
+        </p:nvSpPr>
+        <p:spPr/>
+        <p:txBody>
+          <a:bodyPr/>
+          <a:lstStyle/>
+          <a:p>
+            <a:r>
+              <a:rPr lang="en-US" dirty="0"/>
+              <a:t>SPI</a:t>
+            </a:r>
+          </a:p>
+        </p:txBody>
+      </p:sp>
+      <p:sp>
+        <p:nvSpPr>
+          <p:cNvPr id="4" name="Content Placeholder 3"/>
+          <p:cNvSpPr>
+            <a:spLocks noGrp="1"/>
+          </p:cNvSpPr>
+          <p:nvPr>
+            <p:ph sz="half" idx="1"/>
+          </p:nvPr>
+        </p:nvSpPr>
+        <p:spPr/>
+        <p:txBody>
+          <a:bodyPr>
+            <a:normAutofit/>
+          </a:bodyPr>
+          <a:lstStyle/>
+          <a:p>
+            <a:r>
+              <a:rPr lang="en-US" dirty="0"/>
+              <a:t>The </a:t>
+            </a:r>
+            <a:r>
+              <a:rPr lang="en-US" b="1" dirty="0"/>
+              <a:t>Serial Peripheral Interface</a:t>
+            </a:r>
+            <a:r>
+              <a:rPr lang="en-US" dirty="0"/>
+              <a:t> (</a:t>
+            </a:r>
+            <a:r>
+              <a:rPr lang="en-US" b="1" dirty="0"/>
+              <a:t>SPI</a:t>
+            </a:r>
+            <a:r>
+              <a:rPr lang="en-US" dirty="0"/>
+              <a:t>) is a </a:t>
+            </a:r>
+            <a:r>
+              <a:rPr lang="en-US" dirty="0">
+                <a:hlinkClick r:id="rId2" tooltip="Synchronous circuit"/>
+              </a:rPr>
+              <a:t>synchronous</a:t>
+            </a:r>
+            <a:r>
+              <a:rPr lang="en-US" dirty="0"/>
+              <a:t> </a:t>
+            </a:r>
+            <a:r>
+              <a:rPr lang="en-US" dirty="0">
+                <a:hlinkClick r:id="rId3" tooltip="Serial communication"/>
+              </a:rPr>
+              <a:t>serial communication</a:t>
+            </a:r>
+            <a:r>
+              <a:rPr lang="en-US" dirty="0"/>
+              <a:t> interface specification used for short distance communication, primarily in </a:t>
+            </a:r>
+            <a:r>
+              <a:rPr lang="en-US" dirty="0">
+                <a:hlinkClick r:id="rId4" tooltip="Embedded systems"/>
+              </a:rPr>
+              <a:t>embedded systems</a:t>
+            </a:r>
+            <a:r>
+              <a:rPr lang="en-US" dirty="0"/>
+              <a:t>. The interface was developed by </a:t>
+            </a:r>
+            <a:r>
+              <a:rPr lang="en-US" dirty="0">
+                <a:hlinkClick r:id="rId5" tooltip="Motorola"/>
+              </a:rPr>
+              <a:t>Motorola</a:t>
+            </a:r>
+            <a:r>
+              <a:rPr lang="en-US" dirty="0"/>
+              <a:t> in the mid 1980s and has become a </a:t>
+            </a:r>
+            <a:r>
+              <a:rPr lang="en-US" i="1" dirty="0">
+                <a:hlinkClick r:id="rId6" tooltip="De facto standard"/>
+              </a:rPr>
+              <a:t>de facto</a:t>
+            </a:r>
+            <a:r>
+              <a:rPr lang="en-US" dirty="0">
+                <a:hlinkClick r:id="rId6" tooltip="De facto standard"/>
+              </a:rPr>
+              <a:t> standard</a:t>
+            </a:r>
+            <a:r>
+              <a:rPr lang="en-US" dirty="0"/>
+              <a:t>. Typical applications include </a:t>
+            </a:r>
+            <a:r>
+              <a:rPr lang="en-US" dirty="0">
+                <a:hlinkClick r:id="rId7" tooltip="Secure Digital"/>
+              </a:rPr>
+              <a:t>Secure Digital</a:t>
+            </a:r>
+            <a:r>
+              <a:rPr lang="en-US" dirty="0"/>
+              <a:t> cards and </a:t>
+            </a:r>
+            <a:r>
+              <a:rPr lang="en-US" dirty="0">
+                <a:hlinkClick r:id="rId8" tooltip="Liquid crystal display"/>
+              </a:rPr>
+              <a:t>liquid crystal displays</a:t>
+            </a:r>
+            <a:r>
+              <a:rPr lang="en-US" dirty="0"/>
+              <a:t>. </a:t>
+            </a:r>
+          </a:p>
+          <a:p>
+            <a:pPr marL="914400" lvl="2" indent="0">
+              <a:buNone/>
+            </a:pPr>
+            <a:r>
+              <a:rPr lang="en-US" dirty="0"/>
+              <a:t>		Wikipedia</a:t>
+            </a:r>
+          </a:p>
+        </p:txBody>
+      </p:sp>
+      <p:pic>
+        <p:nvPicPr>
+          <p:cNvPr id="6" name="Content Placeholder 5"/>
+          <p:cNvPicPr>
+            <a:picLocks noGrp="1" noChangeAspect="1"/>
+          </p:cNvPicPr>
+          <p:nvPr>
+            <p:ph sz="half" idx="2"/>
+          </p:nvPr>
+        </p:nvPicPr>
+        <p:blipFill>
+          <a:blip r:embed="rId9">
+            <a:extLst>
+              <a:ext uri="{28A0092B-C50C-407E-A947-70E740481C1C}">
+                <a14:useLocalDpi xmlns:a14="http://schemas.microsoft.com/office/drawing/2010/main" val="0"/>
+              </a:ext>
+            </a:extLst>
+          </a:blip>
+          <a:stretch>
+            <a:fillRect/>
+          </a:stretch>
+        </p:blipFill>
+        <p:spPr>
+          <a:xfrm>
+            <a:off x="6218238" y="3086200"/>
+            <a:ext cx="4937125" cy="1542851"/>
+          </a:xfrm>
+        </p:spPr>
+      </p:pic>
+      <p:sp>
+        <p:nvSpPr>
+          <p:cNvPr id="3" name="Footer Placeholder 2">
             <a:extLst>
               <a:ext uri="{FF2B5EF4-FFF2-40B4-BE49-F238E27FC236}">
-                <a16:creationId xmlns:a16="http://schemas.microsoft.com/office/drawing/2014/main" id="{4522D509-7CC3-45B7-949D-A0BC60BBAD3A}"/>
+                <a16:creationId xmlns:a16="http://schemas.microsoft.com/office/drawing/2014/main" id="{48C4A1CF-FF80-4DE4-8EB5-86ED3EE2F475}"/>
               </a:ext>
             </a:extLst>
           </p:cNvPr>
@@ -5636,10 +5726,10 @@
       </p:sp>
       <p:sp>
         <p:nvSpPr>
-          <p:cNvPr id="3" name="Slide Number Placeholder 2">
+          <p:cNvPr id="5" name="Slide Number Placeholder 4">
             <a:extLst>
               <a:ext uri="{FF2B5EF4-FFF2-40B4-BE49-F238E27FC236}">
-                <a16:creationId xmlns:a16="http://schemas.microsoft.com/office/drawing/2014/main" id="{1C2A2651-CFFA-4492-9EDC-A351F1BBC887}"/>
+                <a16:creationId xmlns:a16="http://schemas.microsoft.com/office/drawing/2014/main" id="{3B9BC356-196E-435E-9C24-CF5477F3BB51}"/>
               </a:ext>
             </a:extLst>
           </p:cNvPr>
@@ -5658,6 +5748,101 @@
             <a:fld id="{ADDE84BC-4FC7-4B69-BEAA-AA840A7919E3}" type="slidenum">
               <a:rPr lang="en-US" smtClean="0"/>
               <a:t>11</a:t>
+            </a:fld>
+            <a:endParaRPr lang="en-US"/>
+          </a:p>
+        </p:txBody>
+      </p:sp>
+    </p:spTree>
+    <p:extLst>
+      <p:ext uri="{BB962C8B-B14F-4D97-AF65-F5344CB8AC3E}">
+        <p14:creationId xmlns:p14="http://schemas.microsoft.com/office/powerpoint/2010/main" val="887560721"/>
+      </p:ext>
+    </p:extLst>
+  </p:cSld>
+  <p:clrMapOvr>
+    <a:masterClrMapping/>
+  </p:clrMapOvr>
+</p:sld>
+</file>
+
+<file path=ppt/slides/slide12.xml><?xml version="1.0" encoding="utf-8"?>
+<p:sld xmlns:a="http://schemas.openxmlformats.org/drawingml/2006/main" xmlns:r="http://schemas.openxmlformats.org/officeDocument/2006/relationships" xmlns:p="http://schemas.openxmlformats.org/presentationml/2006/main">
+  <p:cSld>
+    <p:spTree>
+      <p:nvGrpSpPr>
+        <p:cNvPr id="1" name=""/>
+        <p:cNvGrpSpPr/>
+        <p:nvPr/>
+      </p:nvGrpSpPr>
+      <p:grpSpPr>
+        <a:xfrm>
+          <a:off x="0" y="0"/>
+          <a:ext cx="0" cy="0"/>
+          <a:chOff x="0" y="0"/>
+          <a:chExt cx="0" cy="0"/>
+        </a:xfrm>
+      </p:grpSpPr>
+      <p:sp>
+        <p:nvSpPr>
+          <p:cNvPr id="2" name="Footer Placeholder 1">
+            <a:extLst>
+              <a:ext uri="{FF2B5EF4-FFF2-40B4-BE49-F238E27FC236}">
+                <a16:creationId xmlns:a16="http://schemas.microsoft.com/office/drawing/2014/main" id="{4522D509-7CC3-45B7-949D-A0BC60BBAD3A}"/>
+              </a:ext>
+            </a:extLst>
+          </p:cNvPr>
+          <p:cNvSpPr>
+            <a:spLocks noGrp="1"/>
+          </p:cNvSpPr>
+          <p:nvPr>
+            <p:ph type="ftr" sz="quarter" idx="11"/>
+          </p:nvPr>
+        </p:nvSpPr>
+        <p:spPr/>
+        <p:txBody>
+          <a:bodyPr/>
+          <a:lstStyle/>
+          <a:p>
+            <a:r>
+              <a:rPr lang="en-US" dirty="0"/>
+              <a:t>Rochester </a:t>
+            </a:r>
+            <a:r>
+              <a:rPr lang="en-US" dirty="0" err="1"/>
+              <a:t>MakerSpace</a:t>
+            </a:r>
+            <a:r>
+              <a:rPr lang="en-US" dirty="0"/>
+              <a:t> 2021</a:t>
+            </a:r>
+          </a:p>
+        </p:txBody>
+      </p:sp>
+      <p:sp>
+        <p:nvSpPr>
+          <p:cNvPr id="3" name="Slide Number Placeholder 2">
+            <a:extLst>
+              <a:ext uri="{FF2B5EF4-FFF2-40B4-BE49-F238E27FC236}">
+                <a16:creationId xmlns:a16="http://schemas.microsoft.com/office/drawing/2014/main" id="{1C2A2651-CFFA-4492-9EDC-A351F1BBC887}"/>
+              </a:ext>
+            </a:extLst>
+          </p:cNvPr>
+          <p:cNvSpPr>
+            <a:spLocks noGrp="1"/>
+          </p:cNvSpPr>
+          <p:nvPr>
+            <p:ph type="sldNum" sz="quarter" idx="12"/>
+          </p:nvPr>
+        </p:nvSpPr>
+        <p:spPr/>
+        <p:txBody>
+          <a:bodyPr/>
+          <a:lstStyle/>
+          <a:p>
+            <a:fld id="{ADDE84BC-4FC7-4B69-BEAA-AA840A7919E3}" type="slidenum">
+              <a:rPr lang="en-US" smtClean="0"/>
+              <a:t>12</a:t>
             </a:fld>
             <a:endParaRPr lang="en-US"/>
           </a:p>
@@ -5803,7 +5988,7 @@
 </p:sld>
 </file>
 
-<file path=ppt/slides/slide12.xml><?xml version="1.0" encoding="utf-8"?>
+<file path=ppt/slides/slide13.xml><?xml version="1.0" encoding="utf-8"?>
 <p:sld xmlns:a="http://schemas.openxmlformats.org/drawingml/2006/main" xmlns:r="http://schemas.openxmlformats.org/officeDocument/2006/relationships" xmlns:p="http://schemas.openxmlformats.org/presentationml/2006/main">
   <p:cSld>
     <p:spTree>
@@ -6038,7 +6223,7 @@
           <a:p>
             <a:fld id="{ADDE84BC-4FC7-4B69-BEAA-AA840A7919E3}" type="slidenum">
               <a:rPr lang="en-US" smtClean="0"/>
-              <a:t>12</a:t>
+              <a:t>13</a:t>
             </a:fld>
             <a:endParaRPr lang="en-US"/>
           </a:p>
@@ -6048,277 +6233,6 @@
     <p:extLst>
       <p:ext uri="{BB962C8B-B14F-4D97-AF65-F5344CB8AC3E}">
         <p14:creationId xmlns:p14="http://schemas.microsoft.com/office/powerpoint/2010/main" val="1105792951"/>
-      </p:ext>
-    </p:extLst>
-  </p:cSld>
-  <p:clrMapOvr>
-    <a:masterClrMapping/>
-  </p:clrMapOvr>
-</p:sld>
-</file>
-
-<file path=ppt/slides/slide13.xml><?xml version="1.0" encoding="utf-8"?>
-<p:sld xmlns:a="http://schemas.openxmlformats.org/drawingml/2006/main" xmlns:r="http://schemas.openxmlformats.org/officeDocument/2006/relationships" xmlns:p="http://schemas.openxmlformats.org/presentationml/2006/main">
-  <p:cSld>
-    <p:spTree>
-      <p:nvGrpSpPr>
-        <p:cNvPr id="1" name=""/>
-        <p:cNvGrpSpPr/>
-        <p:nvPr/>
-      </p:nvGrpSpPr>
-      <p:grpSpPr>
-        <a:xfrm>
-          <a:off x="0" y="0"/>
-          <a:ext cx="0" cy="0"/>
-          <a:chOff x="0" y="0"/>
-          <a:chExt cx="0" cy="0"/>
-        </a:xfrm>
-      </p:grpSpPr>
-      <p:sp>
-        <p:nvSpPr>
-          <p:cNvPr id="2" name="Title 1"/>
-          <p:cNvSpPr>
-            <a:spLocks noGrp="1"/>
-          </p:cNvSpPr>
-          <p:nvPr>
-            <p:ph type="title"/>
-          </p:nvPr>
-        </p:nvSpPr>
-        <p:spPr>
-          <a:xfrm>
-            <a:off x="273352" y="188912"/>
-            <a:ext cx="3397841" cy="1600200"/>
-          </a:xfrm>
-        </p:spPr>
-        <p:txBody>
-          <a:bodyPr>
-            <a:normAutofit fontScale="90000"/>
-          </a:bodyPr>
-          <a:lstStyle/>
-          <a:p>
-            <a:r>
-              <a:rPr lang="en-US" sz="3600" dirty="0"/>
-              <a:t>Arduino</a:t>
-            </a:r>
-            <a:br>
-              <a:rPr lang="en-US" sz="3600" dirty="0"/>
-            </a:br>
-            <a:r>
-              <a:rPr lang="en-US" sz="3600" dirty="0"/>
-              <a:t>Integrated </a:t>
-            </a:r>
-            <a:br>
-              <a:rPr lang="en-US" sz="3600" dirty="0"/>
-            </a:br>
-            <a:r>
-              <a:rPr lang="en-US" sz="3600" dirty="0"/>
-              <a:t>Development Environment (IDE)</a:t>
-            </a:r>
-          </a:p>
-        </p:txBody>
-      </p:sp>
-      <p:sp>
-        <p:nvSpPr>
-          <p:cNvPr id="4" name="Text Placeholder 3"/>
-          <p:cNvSpPr>
-            <a:spLocks noGrp="1"/>
-          </p:cNvSpPr>
-          <p:nvPr>
-            <p:ph type="body" sz="half" idx="2"/>
-          </p:nvPr>
-        </p:nvSpPr>
-        <p:spPr>
-          <a:xfrm>
-            <a:off x="273352" y="2441046"/>
-            <a:ext cx="3638248" cy="3811588"/>
-          </a:xfrm>
-        </p:spPr>
-        <p:txBody>
-          <a:bodyPr>
-            <a:normAutofit/>
-          </a:bodyPr>
-          <a:lstStyle/>
-          <a:p>
-            <a:r>
-              <a:rPr lang="en-US" sz="2000" dirty="0"/>
-              <a:t>Change board type</a:t>
-            </a:r>
-          </a:p>
-          <a:p>
-            <a:pPr marL="342900" indent="-342900">
-              <a:buFont typeface="Arial" panose="020B0604020202020204" pitchFamily="34" charset="0"/>
-              <a:buChar char="•"/>
-            </a:pPr>
-            <a:r>
-              <a:rPr lang="en-US" sz="2000" dirty="0"/>
-              <a:t>Arduino UNO or Arduino UNO clone</a:t>
-            </a:r>
-          </a:p>
-          <a:p>
-            <a:pPr marL="800100" lvl="1" indent="-342900">
-              <a:buFont typeface="Arial" panose="020B0604020202020204" pitchFamily="34" charset="0"/>
-              <a:buChar char="•"/>
-            </a:pPr>
-            <a:r>
-              <a:rPr lang="en-US" sz="1700" dirty="0" err="1"/>
-              <a:t>Tools|Board|Arduino</a:t>
-            </a:r>
-            <a:r>
-              <a:rPr lang="en-US" sz="1700" dirty="0"/>
-              <a:t> AVR </a:t>
-            </a:r>
-            <a:r>
-              <a:rPr lang="en-US" sz="1700" dirty="0" err="1"/>
-              <a:t>Boards|Arduino</a:t>
-            </a:r>
-            <a:r>
-              <a:rPr lang="en-US" sz="1700" dirty="0"/>
-              <a:t>\Genuine UNO</a:t>
-            </a:r>
-          </a:p>
-          <a:p>
-            <a:pPr marL="342900" indent="-342900">
-              <a:buFont typeface="Arial" panose="020B0604020202020204" pitchFamily="34" charset="0"/>
-              <a:buChar char="•"/>
-            </a:pPr>
-            <a:r>
-              <a:rPr lang="en-US" sz="2000" dirty="0"/>
-              <a:t>Arduino Leonardo or Arduino Leonardo clone (Velleman – white board)</a:t>
-            </a:r>
-          </a:p>
-          <a:p>
-            <a:pPr marL="800100" lvl="1" indent="-342900">
-              <a:buFont typeface="Arial" panose="020B0604020202020204" pitchFamily="34" charset="0"/>
-              <a:buChar char="•"/>
-            </a:pPr>
-            <a:r>
-              <a:rPr lang="en-US" sz="1700" dirty="0" err="1"/>
-              <a:t>Tools|Board|Arduino</a:t>
-            </a:r>
-            <a:r>
-              <a:rPr lang="en-US" sz="1700" dirty="0"/>
-              <a:t> AVR </a:t>
-            </a:r>
-            <a:r>
-              <a:rPr lang="en-US" sz="1700" dirty="0" err="1"/>
-              <a:t>Boards|Arduino</a:t>
-            </a:r>
-            <a:r>
-              <a:rPr lang="en-US" sz="1700" dirty="0"/>
-              <a:t> Leonardo</a:t>
-            </a:r>
-          </a:p>
-        </p:txBody>
-      </p:sp>
-      <p:sp>
-        <p:nvSpPr>
-          <p:cNvPr id="3" name="Footer Placeholder 2">
-            <a:extLst>
-              <a:ext uri="{FF2B5EF4-FFF2-40B4-BE49-F238E27FC236}">
-                <a16:creationId xmlns:a16="http://schemas.microsoft.com/office/drawing/2014/main" id="{95F1DFC8-6304-4C78-908A-2A63585769F2}"/>
-              </a:ext>
-            </a:extLst>
-          </p:cNvPr>
-          <p:cNvSpPr>
-            <a:spLocks noGrp="1"/>
-          </p:cNvSpPr>
-          <p:nvPr>
-            <p:ph type="ftr" sz="quarter" idx="11"/>
-          </p:nvPr>
-        </p:nvSpPr>
-        <p:spPr>
-          <a:xfrm>
-            <a:off x="5334000" y="6492875"/>
-            <a:ext cx="4648200" cy="365125"/>
-          </a:xfrm>
-        </p:spPr>
-        <p:txBody>
-          <a:bodyPr/>
-          <a:lstStyle/>
-          <a:p>
-            <a:r>
-              <a:rPr lang="en-US" dirty="0"/>
-              <a:t>Rochester </a:t>
-            </a:r>
-            <a:r>
-              <a:rPr lang="en-US" dirty="0" err="1"/>
-              <a:t>MakerSpace</a:t>
-            </a:r>
-            <a:r>
-              <a:rPr lang="en-US" dirty="0"/>
-              <a:t> 2021</a:t>
-            </a:r>
-          </a:p>
-        </p:txBody>
-      </p:sp>
-      <p:sp>
-        <p:nvSpPr>
-          <p:cNvPr id="6" name="Slide Number Placeholder 5">
-            <a:extLst>
-              <a:ext uri="{FF2B5EF4-FFF2-40B4-BE49-F238E27FC236}">
-                <a16:creationId xmlns:a16="http://schemas.microsoft.com/office/drawing/2014/main" id="{B1A9E0C2-2740-45D4-BF11-BC4381CD561A}"/>
-              </a:ext>
-            </a:extLst>
-          </p:cNvPr>
-          <p:cNvSpPr>
-            <a:spLocks noGrp="1"/>
-          </p:cNvSpPr>
-          <p:nvPr>
-            <p:ph type="sldNum" sz="quarter" idx="12"/>
-          </p:nvPr>
-        </p:nvSpPr>
-        <p:spPr/>
-        <p:txBody>
-          <a:bodyPr/>
-          <a:lstStyle/>
-          <a:p>
-            <a:fld id="{ADDE84BC-4FC7-4B69-BEAA-AA840A7919E3}" type="slidenum">
-              <a:rPr lang="en-US" smtClean="0"/>
-              <a:t>13</a:t>
-            </a:fld>
-            <a:endParaRPr lang="en-US"/>
-          </a:p>
-        </p:txBody>
-      </p:sp>
-      <p:pic>
-        <p:nvPicPr>
-          <p:cNvPr id="10" name="Content Placeholder 9">
-            <a:extLst>
-              <a:ext uri="{FF2B5EF4-FFF2-40B4-BE49-F238E27FC236}">
-                <a16:creationId xmlns:a16="http://schemas.microsoft.com/office/drawing/2014/main" id="{4CD1844F-0F52-4DCD-8185-684503BA3A82}"/>
-              </a:ext>
-            </a:extLst>
-          </p:cNvPr>
-          <p:cNvPicPr>
-            <a:picLocks noGrp="1" noChangeAspect="1"/>
-          </p:cNvPicPr>
-          <p:nvPr>
-            <p:ph idx="1"/>
-          </p:nvPr>
-        </p:nvPicPr>
-        <p:blipFill>
-          <a:blip r:embed="rId3">
-            <a:extLst>
-              <a:ext uri="{28A0092B-C50C-407E-A947-70E740481C1C}">
-                <a14:useLocalDpi xmlns:a14="http://schemas.microsoft.com/office/drawing/2010/main" val="0"/>
-              </a:ext>
-            </a:extLst>
-          </a:blip>
-          <a:stretch>
-            <a:fillRect/>
-          </a:stretch>
-        </p:blipFill>
-        <p:spPr>
-          <a:xfrm>
-            <a:off x="4800600" y="1254404"/>
-            <a:ext cx="6492875" cy="4212668"/>
-          </a:xfrm>
-        </p:spPr>
-      </p:pic>
-    </p:spTree>
-    <p:extLst>
-      <p:ext uri="{BB962C8B-B14F-4D97-AF65-F5344CB8AC3E}">
-        <p14:creationId xmlns:p14="http://schemas.microsoft.com/office/powerpoint/2010/main" val="2322404811"/>
       </p:ext>
     </p:extLst>
   </p:cSld>
@@ -6347,13 +6261,7 @@
       </p:grpSpPr>
       <p:sp>
         <p:nvSpPr>
-          <p:cNvPr id="2" name="Title 1">
-            <a:extLst>
-              <a:ext uri="{FF2B5EF4-FFF2-40B4-BE49-F238E27FC236}">
-                <a16:creationId xmlns:a16="http://schemas.microsoft.com/office/drawing/2014/main" id="{998F3781-8AFE-42CB-881D-5F921B9B91E7}"/>
-              </a:ext>
-            </a:extLst>
-          </p:cNvPr>
+          <p:cNvPr id="2" name="Title 1"/>
           <p:cNvSpPr>
             <a:spLocks noGrp="1"/>
           </p:cNvSpPr>
@@ -6361,27 +6269,42 @@
             <p:ph type="title"/>
           </p:nvPr>
         </p:nvSpPr>
-        <p:spPr/>
-        <p:txBody>
-          <a:bodyPr/>
-          <a:lstStyle/>
-          <a:p>
-            <a:r>
-              <a:rPr lang="en-US" dirty="0"/>
-              <a:t>Sketches and Circuits</a:t>
-            </a:r>
-          </a:p>
-        </p:txBody>
-      </p:sp>
-      <p:sp>
-        <p:nvSpPr>
-          <p:cNvPr id="4" name="Text Placeholder 3">
-            <a:extLst>
-              <a:ext uri="{FF2B5EF4-FFF2-40B4-BE49-F238E27FC236}">
-                <a16:creationId xmlns:a16="http://schemas.microsoft.com/office/drawing/2014/main" id="{21E16F2C-5A42-4369-A418-B58976047D88}"/>
-              </a:ext>
-            </a:extLst>
-          </p:cNvPr>
+        <p:spPr>
+          <a:xfrm>
+            <a:off x="273352" y="188912"/>
+            <a:ext cx="3397841" cy="1600200"/>
+          </a:xfrm>
+        </p:spPr>
+        <p:txBody>
+          <a:bodyPr>
+            <a:normAutofit fontScale="90000"/>
+          </a:bodyPr>
+          <a:lstStyle/>
+          <a:p>
+            <a:r>
+              <a:rPr lang="en-US" sz="3600" dirty="0"/>
+              <a:t>Arduino</a:t>
+            </a:r>
+            <a:br>
+              <a:rPr lang="en-US" sz="3600" dirty="0"/>
+            </a:br>
+            <a:r>
+              <a:rPr lang="en-US" sz="3600" dirty="0"/>
+              <a:t>Integrated </a:t>
+            </a:r>
+            <a:br>
+              <a:rPr lang="en-US" sz="3600" dirty="0"/>
+            </a:br>
+            <a:r>
+              <a:rPr lang="en-US" sz="3600" dirty="0"/>
+              <a:t>Development Environment (IDE)</a:t>
+            </a:r>
+          </a:p>
+        </p:txBody>
+      </p:sp>
+      <p:sp>
+        <p:nvSpPr>
+          <p:cNvPr id="4" name="Text Placeholder 3"/>
           <p:cNvSpPr>
             <a:spLocks noGrp="1"/>
           </p:cNvSpPr>
@@ -6389,47 +6312,95 @@
             <p:ph type="body" sz="half" idx="2"/>
           </p:nvPr>
         </p:nvSpPr>
-        <p:spPr/>
-        <p:txBody>
-          <a:bodyPr/>
-          <a:lstStyle/>
-          <a:p>
-            <a:r>
-              <a:rPr lang="en-US" dirty="0"/>
-              <a:t>Blink (File|Examples|01.Basics|Blink)</a:t>
-            </a:r>
-          </a:p>
-          <a:p>
-            <a:pPr marL="285750" indent="-285750">
+        <p:spPr>
+          <a:xfrm>
+            <a:off x="273352" y="2441046"/>
+            <a:ext cx="3638248" cy="3811588"/>
+          </a:xfrm>
+        </p:spPr>
+        <p:txBody>
+          <a:bodyPr>
+            <a:normAutofit/>
+          </a:bodyPr>
+          <a:lstStyle/>
+          <a:p>
+            <a:r>
+              <a:rPr lang="en-US" sz="2000" dirty="0"/>
+              <a:t>Change board type</a:t>
+            </a:r>
+          </a:p>
+          <a:p>
+            <a:pPr marL="342900" indent="-342900">
               <a:buFont typeface="Arial" panose="020B0604020202020204" pitchFamily="34" charset="0"/>
               <a:buChar char="•"/>
             </a:pPr>
             <a:r>
-              <a:rPr lang="en-US" dirty="0"/>
-              <a:t>Focus: basic code of a sketch</a:t>
-            </a:r>
-          </a:p>
-          <a:p>
-            <a:pPr marL="285750" indent="-285750">
+              <a:rPr lang="en-US" sz="2000" dirty="0"/>
+              <a:t>Arduino UNO or Arduino UNO clone</a:t>
+            </a:r>
+          </a:p>
+          <a:p>
+            <a:pPr marL="800100" lvl="1" indent="-342900">
               <a:buFont typeface="Arial" panose="020B0604020202020204" pitchFamily="34" charset="0"/>
               <a:buChar char="•"/>
             </a:pPr>
             <a:r>
-              <a:rPr lang="en-US" dirty="0"/>
-              <a:t>Experiment: change the rate of blinking</a:t>
-            </a:r>
-          </a:p>
-          <a:p>
-            <a:endParaRPr lang="en-US" dirty="0"/>
-          </a:p>
-        </p:txBody>
-      </p:sp>
-      <p:sp>
-        <p:nvSpPr>
-          <p:cNvPr id="5" name="Footer Placeholder 4">
+              <a:rPr lang="en-US" sz="1700" dirty="0" err="1"/>
+              <a:t>Tools|Board|Arduino</a:t>
+            </a:r>
+            <a:r>
+              <a:rPr lang="en-US" sz="1700" dirty="0"/>
+              <a:t> AVR </a:t>
+            </a:r>
+            <a:r>
+              <a:rPr lang="en-US" sz="1700" dirty="0" err="1"/>
+              <a:t>Boards|Arduino</a:t>
+            </a:r>
+            <a:r>
+              <a:rPr lang="en-US" sz="1700" dirty="0"/>
+              <a:t>\Genuine UNO</a:t>
+            </a:r>
+          </a:p>
+          <a:p>
+            <a:pPr marL="342900" indent="-342900">
+              <a:buFont typeface="Arial" panose="020B0604020202020204" pitchFamily="34" charset="0"/>
+              <a:buChar char="•"/>
+            </a:pPr>
+            <a:r>
+              <a:rPr lang="en-US" sz="2000" dirty="0"/>
+              <a:t>Arduino Leonardo or Arduino Leonardo clone (Velleman – white board)</a:t>
+            </a:r>
+          </a:p>
+          <a:p>
+            <a:pPr marL="800100" lvl="1" indent="-342900">
+              <a:buFont typeface="Arial" panose="020B0604020202020204" pitchFamily="34" charset="0"/>
+              <a:buChar char="•"/>
+            </a:pPr>
+            <a:r>
+              <a:rPr lang="en-US" sz="1700" dirty="0" err="1"/>
+              <a:t>Tools|Board|Arduino</a:t>
+            </a:r>
+            <a:r>
+              <a:rPr lang="en-US" sz="1700" dirty="0"/>
+              <a:t> AVR </a:t>
+            </a:r>
+            <a:r>
+              <a:rPr lang="en-US" sz="1700" dirty="0" err="1"/>
+              <a:t>Boards|Arduino</a:t>
+            </a:r>
+            <a:r>
+              <a:rPr lang="en-US" sz="1700" dirty="0"/>
+              <a:t> Leonardo</a:t>
+            </a:r>
+          </a:p>
+        </p:txBody>
+      </p:sp>
+      <p:sp>
+        <p:nvSpPr>
+          <p:cNvPr id="3" name="Footer Placeholder 2">
             <a:extLst>
               <a:ext uri="{FF2B5EF4-FFF2-40B4-BE49-F238E27FC236}">
-                <a16:creationId xmlns:a16="http://schemas.microsoft.com/office/drawing/2014/main" id="{2DCCB6F3-B709-4DA9-8218-4F6D4A9ABCD0}"/>
+                <a16:creationId xmlns:a16="http://schemas.microsoft.com/office/drawing/2014/main" id="{95F1DFC8-6304-4C78-908A-2A63585769F2}"/>
               </a:ext>
             </a:extLst>
           </p:cNvPr>
@@ -6440,7 +6411,12 @@
             <p:ph type="ftr" sz="quarter" idx="11"/>
           </p:nvPr>
         </p:nvSpPr>
-        <p:spPr/>
+        <p:spPr>
+          <a:xfrm>
+            <a:off x="5334000" y="6492875"/>
+            <a:ext cx="4648200" cy="365125"/>
+          </a:xfrm>
+        </p:spPr>
         <p:txBody>
           <a:bodyPr/>
           <a:lstStyle/>
@@ -6465,7 +6441,7 @@
           <p:cNvPr id="6" name="Slide Number Placeholder 5">
             <a:extLst>
               <a:ext uri="{FF2B5EF4-FFF2-40B4-BE49-F238E27FC236}">
-                <a16:creationId xmlns:a16="http://schemas.microsoft.com/office/drawing/2014/main" id="{DF176D15-EE8B-4F6E-AA27-FE3D06D7805D}"/>
+                <a16:creationId xmlns:a16="http://schemas.microsoft.com/office/drawing/2014/main" id="{B1A9E0C2-2740-45D4-BF11-BC4381CD561A}"/>
               </a:ext>
             </a:extLst>
           </p:cNvPr>
@@ -6489,6 +6465,215 @@
           </a:p>
         </p:txBody>
       </p:sp>
+      <p:pic>
+        <p:nvPicPr>
+          <p:cNvPr id="10" name="Content Placeholder 9">
+            <a:extLst>
+              <a:ext uri="{FF2B5EF4-FFF2-40B4-BE49-F238E27FC236}">
+                <a16:creationId xmlns:a16="http://schemas.microsoft.com/office/drawing/2014/main" id="{4CD1844F-0F52-4DCD-8185-684503BA3A82}"/>
+              </a:ext>
+            </a:extLst>
+          </p:cNvPr>
+          <p:cNvPicPr>
+            <a:picLocks noGrp="1" noChangeAspect="1"/>
+          </p:cNvPicPr>
+          <p:nvPr>
+            <p:ph idx="1"/>
+          </p:nvPr>
+        </p:nvPicPr>
+        <p:blipFill>
+          <a:blip r:embed="rId3">
+            <a:extLst>
+              <a:ext uri="{28A0092B-C50C-407E-A947-70E740481C1C}">
+                <a14:useLocalDpi xmlns:a14="http://schemas.microsoft.com/office/drawing/2010/main" val="0"/>
+              </a:ext>
+            </a:extLst>
+          </a:blip>
+          <a:stretch>
+            <a:fillRect/>
+          </a:stretch>
+        </p:blipFill>
+        <p:spPr>
+          <a:xfrm>
+            <a:off x="4800600" y="1254404"/>
+            <a:ext cx="6492875" cy="4212668"/>
+          </a:xfrm>
+        </p:spPr>
+      </p:pic>
+    </p:spTree>
+    <p:extLst>
+      <p:ext uri="{BB962C8B-B14F-4D97-AF65-F5344CB8AC3E}">
+        <p14:creationId xmlns:p14="http://schemas.microsoft.com/office/powerpoint/2010/main" val="2322404811"/>
+      </p:ext>
+    </p:extLst>
+  </p:cSld>
+  <p:clrMapOvr>
+    <a:masterClrMapping/>
+  </p:clrMapOvr>
+</p:sld>
+</file>
+
+<file path=ppt/slides/slide15.xml><?xml version="1.0" encoding="utf-8"?>
+<p:sld xmlns:a="http://schemas.openxmlformats.org/drawingml/2006/main" xmlns:r="http://schemas.openxmlformats.org/officeDocument/2006/relationships" xmlns:p="http://schemas.openxmlformats.org/presentationml/2006/main">
+  <p:cSld>
+    <p:spTree>
+      <p:nvGrpSpPr>
+        <p:cNvPr id="1" name=""/>
+        <p:cNvGrpSpPr/>
+        <p:nvPr/>
+      </p:nvGrpSpPr>
+      <p:grpSpPr>
+        <a:xfrm>
+          <a:off x="0" y="0"/>
+          <a:ext cx="0" cy="0"/>
+          <a:chOff x="0" y="0"/>
+          <a:chExt cx="0" cy="0"/>
+        </a:xfrm>
+      </p:grpSpPr>
+      <p:sp>
+        <p:nvSpPr>
+          <p:cNvPr id="2" name="Title 1">
+            <a:extLst>
+              <a:ext uri="{FF2B5EF4-FFF2-40B4-BE49-F238E27FC236}">
+                <a16:creationId xmlns:a16="http://schemas.microsoft.com/office/drawing/2014/main" id="{998F3781-8AFE-42CB-881D-5F921B9B91E7}"/>
+              </a:ext>
+            </a:extLst>
+          </p:cNvPr>
+          <p:cNvSpPr>
+            <a:spLocks noGrp="1"/>
+          </p:cNvSpPr>
+          <p:nvPr>
+            <p:ph type="title"/>
+          </p:nvPr>
+        </p:nvSpPr>
+        <p:spPr/>
+        <p:txBody>
+          <a:bodyPr/>
+          <a:lstStyle/>
+          <a:p>
+            <a:r>
+              <a:rPr lang="en-US" dirty="0"/>
+              <a:t>Sketches and Circuits</a:t>
+            </a:r>
+          </a:p>
+        </p:txBody>
+      </p:sp>
+      <p:sp>
+        <p:nvSpPr>
+          <p:cNvPr id="4" name="Text Placeholder 3">
+            <a:extLst>
+              <a:ext uri="{FF2B5EF4-FFF2-40B4-BE49-F238E27FC236}">
+                <a16:creationId xmlns:a16="http://schemas.microsoft.com/office/drawing/2014/main" id="{21E16F2C-5A42-4369-A418-B58976047D88}"/>
+              </a:ext>
+            </a:extLst>
+          </p:cNvPr>
+          <p:cNvSpPr>
+            <a:spLocks noGrp="1"/>
+          </p:cNvSpPr>
+          <p:nvPr>
+            <p:ph type="body" sz="half" idx="2"/>
+          </p:nvPr>
+        </p:nvSpPr>
+        <p:spPr/>
+        <p:txBody>
+          <a:bodyPr/>
+          <a:lstStyle/>
+          <a:p>
+            <a:r>
+              <a:rPr lang="en-US" dirty="0"/>
+              <a:t>Blink (File|Examples|01.Basics|Blink)</a:t>
+            </a:r>
+          </a:p>
+          <a:p>
+            <a:pPr marL="285750" indent="-285750">
+              <a:buFont typeface="Arial" panose="020B0604020202020204" pitchFamily="34" charset="0"/>
+              <a:buChar char="•"/>
+            </a:pPr>
+            <a:r>
+              <a:rPr lang="en-US" dirty="0"/>
+              <a:t>Focus: basic code of a sketch</a:t>
+            </a:r>
+          </a:p>
+          <a:p>
+            <a:pPr marL="285750" indent="-285750">
+              <a:buFont typeface="Arial" panose="020B0604020202020204" pitchFamily="34" charset="0"/>
+              <a:buChar char="•"/>
+            </a:pPr>
+            <a:r>
+              <a:rPr lang="en-US" dirty="0"/>
+              <a:t>Experiment: change the rate of blinking</a:t>
+            </a:r>
+          </a:p>
+          <a:p>
+            <a:endParaRPr lang="en-US" dirty="0"/>
+          </a:p>
+        </p:txBody>
+      </p:sp>
+      <p:sp>
+        <p:nvSpPr>
+          <p:cNvPr id="5" name="Footer Placeholder 4">
+            <a:extLst>
+              <a:ext uri="{FF2B5EF4-FFF2-40B4-BE49-F238E27FC236}">
+                <a16:creationId xmlns:a16="http://schemas.microsoft.com/office/drawing/2014/main" id="{2DCCB6F3-B709-4DA9-8218-4F6D4A9ABCD0}"/>
+              </a:ext>
+            </a:extLst>
+          </p:cNvPr>
+          <p:cNvSpPr>
+            <a:spLocks noGrp="1"/>
+          </p:cNvSpPr>
+          <p:nvPr>
+            <p:ph type="ftr" sz="quarter" idx="11"/>
+          </p:nvPr>
+        </p:nvSpPr>
+        <p:spPr/>
+        <p:txBody>
+          <a:bodyPr/>
+          <a:lstStyle/>
+          <a:p>
+            <a:r>
+              <a:rPr lang="en-US" dirty="0"/>
+              <a:t>Rochester </a:t>
+            </a:r>
+            <a:r>
+              <a:rPr lang="en-US" dirty="0" err="1"/>
+              <a:t>MakerSpace</a:t>
+            </a:r>
+            <a:r>
+              <a:rPr lang="en-US" dirty="0"/>
+              <a:t> 2021</a:t>
+            </a:r>
+          </a:p>
+        </p:txBody>
+      </p:sp>
+      <p:sp>
+        <p:nvSpPr>
+          <p:cNvPr id="6" name="Slide Number Placeholder 5">
+            <a:extLst>
+              <a:ext uri="{FF2B5EF4-FFF2-40B4-BE49-F238E27FC236}">
+                <a16:creationId xmlns:a16="http://schemas.microsoft.com/office/drawing/2014/main" id="{DF176D15-EE8B-4F6E-AA27-FE3D06D7805D}"/>
+              </a:ext>
+            </a:extLst>
+          </p:cNvPr>
+          <p:cNvSpPr>
+            <a:spLocks noGrp="1"/>
+          </p:cNvSpPr>
+          <p:nvPr>
+            <p:ph type="sldNum" sz="quarter" idx="12"/>
+          </p:nvPr>
+        </p:nvSpPr>
+        <p:spPr/>
+        <p:txBody>
+          <a:bodyPr/>
+          <a:lstStyle/>
+          <a:p>
+            <a:fld id="{ADDE84BC-4FC7-4B69-BEAA-AA840A7919E3}" type="slidenum">
+              <a:rPr lang="en-US" smtClean="0"/>
+              <a:t>15</a:t>
+            </a:fld>
+            <a:endParaRPr lang="en-US"/>
+          </a:p>
+        </p:txBody>
+      </p:sp>
       <p:sp>
         <p:nvSpPr>
           <p:cNvPr id="9" name="TextBox 8">
@@ -6504,7 +6689,7 @@
         <p:spPr>
           <a:xfrm>
             <a:off x="4402667" y="103863"/>
-            <a:ext cx="3991542" cy="369332"/>
+            <a:ext cx="6174126" cy="369332"/>
           </a:xfrm>
           <a:prstGeom prst="rect">
             <a:avLst/>
@@ -6519,7 +6704,7 @@
           <a:p>
             <a:r>
               <a:rPr lang="en-US" dirty="0"/>
-              <a:t>Can use Built In LED connected to pin 13</a:t>
+              <a:t>Can use Built In LED connected to pin 13 instead of external LED</a:t>
             </a:r>
           </a:p>
         </p:txBody>
@@ -6633,7 +6818,7 @@
 </p:sld>
 </file>
 
-<file path=ppt/slides/slide15.xml><?xml version="1.0" encoding="utf-8"?>
+<file path=ppt/slides/slide16.xml><?xml version="1.0" encoding="utf-8"?>
 <p:sld xmlns:a="http://schemas.openxmlformats.org/drawingml/2006/main" xmlns:r="http://schemas.openxmlformats.org/officeDocument/2006/relationships" xmlns:p="http://schemas.openxmlformats.org/presentationml/2006/main">
   <p:cSld>
     <p:spTree>
@@ -6793,7 +6978,7 @@
           <a:p>
             <a:fld id="{ADDE84BC-4FC7-4B69-BEAA-AA840A7919E3}" type="slidenum">
               <a:rPr lang="en-US" smtClean="0"/>
-              <a:t>15</a:t>
+              <a:t>16</a:t>
             </a:fld>
             <a:endParaRPr lang="en-US"/>
           </a:p>
@@ -6943,7 +7128,7 @@
 </p:sld>
 </file>
 
-<file path=ppt/slides/slide16.xml><?xml version="1.0" encoding="utf-8"?>
+<file path=ppt/slides/slide17.xml><?xml version="1.0" encoding="utf-8"?>
 <p:sld xmlns:a="http://schemas.openxmlformats.org/drawingml/2006/main" xmlns:r="http://schemas.openxmlformats.org/officeDocument/2006/relationships" xmlns:p="http://schemas.openxmlformats.org/presentationml/2006/main">
   <p:cSld>
     <p:spTree>
@@ -7107,7 +7292,7 @@
           <a:p>
             <a:fld id="{ADDE84BC-4FC7-4B69-BEAA-AA840A7919E3}" type="slidenum">
               <a:rPr lang="en-US" smtClean="0"/>
-              <a:t>16</a:t>
+              <a:t>17</a:t>
             </a:fld>
             <a:endParaRPr lang="en-US"/>
           </a:p>
@@ -7222,7 +7407,7 @@
 </p:sld>
 </file>
 
-<file path=ppt/slides/slide17.xml><?xml version="1.0" encoding="utf-8"?>
+<file path=ppt/slides/slide18.xml><?xml version="1.0" encoding="utf-8"?>
 <p:sld xmlns:a="http://schemas.openxmlformats.org/drawingml/2006/main" xmlns:r="http://schemas.openxmlformats.org/officeDocument/2006/relationships" xmlns:p="http://schemas.openxmlformats.org/presentationml/2006/main">
   <p:cSld>
     <p:spTree>
@@ -7382,7 +7567,7 @@
           <a:p>
             <a:fld id="{ADDE84BC-4FC7-4B69-BEAA-AA840A7919E3}" type="slidenum">
               <a:rPr lang="en-US" smtClean="0"/>
-              <a:t>17</a:t>
+              <a:t>18</a:t>
             </a:fld>
             <a:endParaRPr lang="en-US"/>
           </a:p>
@@ -7497,7 +7682,7 @@
 </p:sld>
 </file>
 
-<file path=ppt/slides/slide18.xml><?xml version="1.0" encoding="utf-8"?>
+<file path=ppt/slides/slide19.xml><?xml version="1.0" encoding="utf-8"?>
 <p:sld xmlns:a="http://schemas.openxmlformats.org/drawingml/2006/main" xmlns:r="http://schemas.openxmlformats.org/officeDocument/2006/relationships" xmlns:p="http://schemas.openxmlformats.org/presentationml/2006/main">
   <p:cSld>
     <p:spTree>
@@ -7665,7 +7850,7 @@
           <a:p>
             <a:fld id="{ADDE84BC-4FC7-4B69-BEAA-AA840A7919E3}" type="slidenum">
               <a:rPr lang="en-US" smtClean="0"/>
-              <a:t>18</a:t>
+              <a:t>19</a:t>
             </a:fld>
             <a:endParaRPr lang="en-US"/>
           </a:p>
@@ -7780,7 +7965,7 @@
 </p:sld>
 </file>
 
-<file path=ppt/slides/slide19.xml><?xml version="1.0" encoding="utf-8"?>
+<file path=ppt/slides/slide2.xml><?xml version="1.0" encoding="utf-8"?>
 <p:sld xmlns:a="http://schemas.openxmlformats.org/drawingml/2006/main" xmlns:r="http://schemas.openxmlformats.org/officeDocument/2006/relationships" xmlns:p="http://schemas.openxmlformats.org/presentationml/2006/main">
   <p:cSld>
     <p:spTree>
@@ -7799,6 +7984,209 @@
       </p:grpSpPr>
       <p:sp>
         <p:nvSpPr>
+          <p:cNvPr id="2" name="Title 1"/>
+          <p:cNvSpPr>
+            <a:spLocks noGrp="1"/>
+          </p:cNvSpPr>
+          <p:nvPr>
+            <p:ph type="title"/>
+          </p:nvPr>
+        </p:nvSpPr>
+        <p:spPr/>
+        <p:txBody>
+          <a:bodyPr/>
+          <a:lstStyle/>
+          <a:p>
+            <a:r>
+              <a:rPr lang="en-US" dirty="0"/>
+              <a:t>Class Objectives</a:t>
+            </a:r>
+          </a:p>
+        </p:txBody>
+      </p:sp>
+      <p:sp>
+        <p:nvSpPr>
+          <p:cNvPr id="3" name="Content Placeholder 2"/>
+          <p:cNvSpPr>
+            <a:spLocks noGrp="1"/>
+          </p:cNvSpPr>
+          <p:nvPr>
+            <p:ph idx="1"/>
+          </p:nvPr>
+        </p:nvSpPr>
+        <p:spPr/>
+        <p:txBody>
+          <a:bodyPr/>
+          <a:lstStyle/>
+          <a:p>
+            <a:pPr marL="514350" indent="-514350">
+              <a:buFont typeface="+mj-lt"/>
+              <a:buAutoNum type="arabicPeriod"/>
+            </a:pPr>
+            <a:r>
+              <a:rPr lang="en-US" dirty="0"/>
+              <a:t>Become familiar with Arduino hardware and software</a:t>
+            </a:r>
+          </a:p>
+          <a:p>
+            <a:pPr marL="514350" indent="-514350">
+              <a:buFont typeface="+mj-lt"/>
+              <a:buAutoNum type="arabicPeriod"/>
+            </a:pPr>
+            <a:r>
+              <a:rPr lang="en-US" dirty="0"/>
+              <a:t>Be aware of the range of Arduino-supported boards and how to choose one for your project</a:t>
+            </a:r>
+          </a:p>
+          <a:p>
+            <a:pPr marL="514350" indent="-514350">
+              <a:buFont typeface="+mj-lt"/>
+              <a:buAutoNum type="arabicPeriod"/>
+            </a:pPr>
+            <a:r>
+              <a:rPr lang="en-US" dirty="0"/>
+              <a:t>Understand how to connect and operate Arduino hardware from a PC or Mac</a:t>
+            </a:r>
+          </a:p>
+          <a:p>
+            <a:pPr marL="514350" indent="-514350">
+              <a:buFont typeface="+mj-lt"/>
+              <a:buAutoNum type="arabicPeriod"/>
+            </a:pPr>
+            <a:r>
+              <a:rPr lang="en-US" dirty="0"/>
+              <a:t>Understand how to create and run a program on an Arduino</a:t>
+            </a:r>
+          </a:p>
+          <a:p>
+            <a:pPr marL="514350" indent="-514350">
+              <a:buFont typeface="+mj-lt"/>
+              <a:buAutoNum type="arabicPeriod"/>
+            </a:pPr>
+            <a:r>
+              <a:rPr lang="en-US" dirty="0"/>
+              <a:t>Understand how to control a simple circuit from an Arduino</a:t>
+            </a:r>
+          </a:p>
+          <a:p>
+            <a:pPr marL="514350" indent="-514350">
+              <a:buFont typeface="+mj-lt"/>
+              <a:buAutoNum type="arabicPeriod"/>
+            </a:pPr>
+            <a:r>
+              <a:rPr lang="en-US" dirty="0"/>
+              <a:t>Get a starter list of resources for learning more </a:t>
+            </a:r>
+          </a:p>
+          <a:p>
+            <a:pPr marL="514350" indent="-514350">
+              <a:buFont typeface="+mj-lt"/>
+              <a:buAutoNum type="arabicPeriod"/>
+            </a:pPr>
+            <a:r>
+              <a:rPr lang="en-US" dirty="0"/>
+              <a:t>Be excited by the possibilities!</a:t>
+            </a:r>
+          </a:p>
+        </p:txBody>
+      </p:sp>
+      <p:sp>
+        <p:nvSpPr>
+          <p:cNvPr id="4" name="Footer Placeholder 3">
+            <a:extLst>
+              <a:ext uri="{FF2B5EF4-FFF2-40B4-BE49-F238E27FC236}">
+                <a16:creationId xmlns:a16="http://schemas.microsoft.com/office/drawing/2014/main" id="{3B8AE874-E26C-4127-8064-81B41BF731D9}"/>
+              </a:ext>
+            </a:extLst>
+          </p:cNvPr>
+          <p:cNvSpPr>
+            <a:spLocks noGrp="1"/>
+          </p:cNvSpPr>
+          <p:nvPr>
+            <p:ph type="ftr" sz="quarter" idx="11"/>
+          </p:nvPr>
+        </p:nvSpPr>
+        <p:spPr/>
+        <p:txBody>
+          <a:bodyPr/>
+          <a:lstStyle/>
+          <a:p>
+            <a:r>
+              <a:rPr lang="en-US" dirty="0"/>
+              <a:t>Rochester </a:t>
+            </a:r>
+            <a:r>
+              <a:rPr lang="en-US" dirty="0" err="1"/>
+              <a:t>MakerSpace</a:t>
+            </a:r>
+            <a:r>
+              <a:rPr lang="en-US" dirty="0"/>
+              <a:t> 2021</a:t>
+            </a:r>
+          </a:p>
+        </p:txBody>
+      </p:sp>
+      <p:sp>
+        <p:nvSpPr>
+          <p:cNvPr id="5" name="Slide Number Placeholder 4">
+            <a:extLst>
+              <a:ext uri="{FF2B5EF4-FFF2-40B4-BE49-F238E27FC236}">
+                <a16:creationId xmlns:a16="http://schemas.microsoft.com/office/drawing/2014/main" id="{32BA1D67-5A2F-4DA7-A8E0-FA788D26B5A5}"/>
+              </a:ext>
+            </a:extLst>
+          </p:cNvPr>
+          <p:cNvSpPr>
+            <a:spLocks noGrp="1"/>
+          </p:cNvSpPr>
+          <p:nvPr>
+            <p:ph type="sldNum" sz="quarter" idx="12"/>
+          </p:nvPr>
+        </p:nvSpPr>
+        <p:spPr/>
+        <p:txBody>
+          <a:bodyPr/>
+          <a:lstStyle/>
+          <a:p>
+            <a:fld id="{ADDE84BC-4FC7-4B69-BEAA-AA840A7919E3}" type="slidenum">
+              <a:rPr lang="en-US" smtClean="0"/>
+              <a:t>2</a:t>
+            </a:fld>
+            <a:endParaRPr lang="en-US"/>
+          </a:p>
+        </p:txBody>
+      </p:sp>
+    </p:spTree>
+    <p:extLst>
+      <p:ext uri="{BB962C8B-B14F-4D97-AF65-F5344CB8AC3E}">
+        <p14:creationId xmlns:p14="http://schemas.microsoft.com/office/powerpoint/2010/main" val="3524642869"/>
+      </p:ext>
+    </p:extLst>
+  </p:cSld>
+  <p:clrMapOvr>
+    <a:masterClrMapping/>
+  </p:clrMapOvr>
+</p:sld>
+</file>
+
+<file path=ppt/slides/slide20.xml><?xml version="1.0" encoding="utf-8"?>
+<p:sld xmlns:a="http://schemas.openxmlformats.org/drawingml/2006/main" xmlns:r="http://schemas.openxmlformats.org/officeDocument/2006/relationships" xmlns:p="http://schemas.openxmlformats.org/presentationml/2006/main">
+  <p:cSld>
+    <p:spTree>
+      <p:nvGrpSpPr>
+        <p:cNvPr id="1" name=""/>
+        <p:cNvGrpSpPr/>
+        <p:nvPr/>
+      </p:nvGrpSpPr>
+      <p:grpSpPr>
+        <a:xfrm>
+          <a:off x="0" y="0"/>
+          <a:ext cx="0" cy="0"/>
+          <a:chOff x="0" y="0"/>
+          <a:chExt cx="0" cy="0"/>
+        </a:xfrm>
+      </p:grpSpPr>
+      <p:sp>
+        <p:nvSpPr>
           <p:cNvPr id="2" name="Title 1">
             <a:extLst>
               <a:ext uri="{FF2B5EF4-FFF2-40B4-BE49-F238E27FC236}">
@@ -7944,7 +8332,7 @@
           <a:p>
             <a:fld id="{ADDE84BC-4FC7-4B69-BEAA-AA840A7919E3}" type="slidenum">
               <a:rPr lang="en-US" smtClean="0"/>
-              <a:t>19</a:t>
+              <a:t>20</a:t>
             </a:fld>
             <a:endParaRPr lang="en-US"/>
           </a:p>
@@ -7965,7 +8353,7 @@
         <p:spPr>
           <a:xfrm>
             <a:off x="4402667" y="103863"/>
-            <a:ext cx="3991542" cy="369332"/>
+            <a:ext cx="6174126" cy="369332"/>
           </a:xfrm>
           <a:prstGeom prst="rect">
             <a:avLst/>
@@ -7980,7 +8368,7 @@
           <a:p>
             <a:r>
               <a:rPr lang="en-US" dirty="0"/>
-              <a:t>Can use Built In LED connected to pin 13</a:t>
+              <a:t>Can use Built In LED connected to pin 13 instead of external LED</a:t>
             </a:r>
           </a:p>
         </p:txBody>
@@ -8092,7 +8480,7 @@
 </p:sld>
 </file>
 
-<file path=ppt/slides/slide2.xml><?xml version="1.0" encoding="utf-8"?>
+<file path=ppt/slides/slide21.xml><?xml version="1.0" encoding="utf-8"?>
 <p:sld xmlns:a="http://schemas.openxmlformats.org/drawingml/2006/main" xmlns:r="http://schemas.openxmlformats.org/officeDocument/2006/relationships" xmlns:p="http://schemas.openxmlformats.org/presentationml/2006/main">
   <p:cSld>
     <p:spTree>
@@ -8111,209 +8499,6 @@
       </p:grpSpPr>
       <p:sp>
         <p:nvSpPr>
-          <p:cNvPr id="2" name="Title 1"/>
-          <p:cNvSpPr>
-            <a:spLocks noGrp="1"/>
-          </p:cNvSpPr>
-          <p:nvPr>
-            <p:ph type="title"/>
-          </p:nvPr>
-        </p:nvSpPr>
-        <p:spPr/>
-        <p:txBody>
-          <a:bodyPr/>
-          <a:lstStyle/>
-          <a:p>
-            <a:r>
-              <a:rPr lang="en-US" dirty="0"/>
-              <a:t>Class Objectives</a:t>
-            </a:r>
-          </a:p>
-        </p:txBody>
-      </p:sp>
-      <p:sp>
-        <p:nvSpPr>
-          <p:cNvPr id="3" name="Content Placeholder 2"/>
-          <p:cNvSpPr>
-            <a:spLocks noGrp="1"/>
-          </p:cNvSpPr>
-          <p:nvPr>
-            <p:ph idx="1"/>
-          </p:nvPr>
-        </p:nvSpPr>
-        <p:spPr/>
-        <p:txBody>
-          <a:bodyPr/>
-          <a:lstStyle/>
-          <a:p>
-            <a:pPr marL="514350" indent="-514350">
-              <a:buFont typeface="+mj-lt"/>
-              <a:buAutoNum type="arabicPeriod"/>
-            </a:pPr>
-            <a:r>
-              <a:rPr lang="en-US" dirty="0"/>
-              <a:t>Become familiar with Arduino hardware and software</a:t>
-            </a:r>
-          </a:p>
-          <a:p>
-            <a:pPr marL="514350" indent="-514350">
-              <a:buFont typeface="+mj-lt"/>
-              <a:buAutoNum type="arabicPeriod"/>
-            </a:pPr>
-            <a:r>
-              <a:rPr lang="en-US" dirty="0"/>
-              <a:t>Be aware of the range of Arduino-supported boards and how to choose one for your project</a:t>
-            </a:r>
-          </a:p>
-          <a:p>
-            <a:pPr marL="514350" indent="-514350">
-              <a:buFont typeface="+mj-lt"/>
-              <a:buAutoNum type="arabicPeriod"/>
-            </a:pPr>
-            <a:r>
-              <a:rPr lang="en-US" dirty="0"/>
-              <a:t>Understand how to connect and operate Arduino hardware from a PC or Mac</a:t>
-            </a:r>
-          </a:p>
-          <a:p>
-            <a:pPr marL="514350" indent="-514350">
-              <a:buFont typeface="+mj-lt"/>
-              <a:buAutoNum type="arabicPeriod"/>
-            </a:pPr>
-            <a:r>
-              <a:rPr lang="en-US" dirty="0"/>
-              <a:t>Understand how to create and run a program on an Arduino</a:t>
-            </a:r>
-          </a:p>
-          <a:p>
-            <a:pPr marL="514350" indent="-514350">
-              <a:buFont typeface="+mj-lt"/>
-              <a:buAutoNum type="arabicPeriod"/>
-            </a:pPr>
-            <a:r>
-              <a:rPr lang="en-US" dirty="0"/>
-              <a:t>Understand how to control a simple circuit from an Arduino</a:t>
-            </a:r>
-          </a:p>
-          <a:p>
-            <a:pPr marL="514350" indent="-514350">
-              <a:buFont typeface="+mj-lt"/>
-              <a:buAutoNum type="arabicPeriod"/>
-            </a:pPr>
-            <a:r>
-              <a:rPr lang="en-US" dirty="0"/>
-              <a:t>Get a starter list of resources for learning more </a:t>
-            </a:r>
-          </a:p>
-          <a:p>
-            <a:pPr marL="514350" indent="-514350">
-              <a:buFont typeface="+mj-lt"/>
-              <a:buAutoNum type="arabicPeriod"/>
-            </a:pPr>
-            <a:r>
-              <a:rPr lang="en-US" dirty="0"/>
-              <a:t>Be excited by the possibilities!</a:t>
-            </a:r>
-          </a:p>
-        </p:txBody>
-      </p:sp>
-      <p:sp>
-        <p:nvSpPr>
-          <p:cNvPr id="4" name="Footer Placeholder 3">
-            <a:extLst>
-              <a:ext uri="{FF2B5EF4-FFF2-40B4-BE49-F238E27FC236}">
-                <a16:creationId xmlns:a16="http://schemas.microsoft.com/office/drawing/2014/main" id="{3B8AE874-E26C-4127-8064-81B41BF731D9}"/>
-              </a:ext>
-            </a:extLst>
-          </p:cNvPr>
-          <p:cNvSpPr>
-            <a:spLocks noGrp="1"/>
-          </p:cNvSpPr>
-          <p:nvPr>
-            <p:ph type="ftr" sz="quarter" idx="11"/>
-          </p:nvPr>
-        </p:nvSpPr>
-        <p:spPr/>
-        <p:txBody>
-          <a:bodyPr/>
-          <a:lstStyle/>
-          <a:p>
-            <a:r>
-              <a:rPr lang="en-US" dirty="0"/>
-              <a:t>Rochester </a:t>
-            </a:r>
-            <a:r>
-              <a:rPr lang="en-US" dirty="0" err="1"/>
-              <a:t>MakerSpace</a:t>
-            </a:r>
-            <a:r>
-              <a:rPr lang="en-US" dirty="0"/>
-              <a:t> 2021</a:t>
-            </a:r>
-          </a:p>
-        </p:txBody>
-      </p:sp>
-      <p:sp>
-        <p:nvSpPr>
-          <p:cNvPr id="5" name="Slide Number Placeholder 4">
-            <a:extLst>
-              <a:ext uri="{FF2B5EF4-FFF2-40B4-BE49-F238E27FC236}">
-                <a16:creationId xmlns:a16="http://schemas.microsoft.com/office/drawing/2014/main" id="{32BA1D67-5A2F-4DA7-A8E0-FA788D26B5A5}"/>
-              </a:ext>
-            </a:extLst>
-          </p:cNvPr>
-          <p:cNvSpPr>
-            <a:spLocks noGrp="1"/>
-          </p:cNvSpPr>
-          <p:nvPr>
-            <p:ph type="sldNum" sz="quarter" idx="12"/>
-          </p:nvPr>
-        </p:nvSpPr>
-        <p:spPr/>
-        <p:txBody>
-          <a:bodyPr/>
-          <a:lstStyle/>
-          <a:p>
-            <a:fld id="{ADDE84BC-4FC7-4B69-BEAA-AA840A7919E3}" type="slidenum">
-              <a:rPr lang="en-US" smtClean="0"/>
-              <a:t>2</a:t>
-            </a:fld>
-            <a:endParaRPr lang="en-US"/>
-          </a:p>
-        </p:txBody>
-      </p:sp>
-    </p:spTree>
-    <p:extLst>
-      <p:ext uri="{BB962C8B-B14F-4D97-AF65-F5344CB8AC3E}">
-        <p14:creationId xmlns:p14="http://schemas.microsoft.com/office/powerpoint/2010/main" val="3524642869"/>
-      </p:ext>
-    </p:extLst>
-  </p:cSld>
-  <p:clrMapOvr>
-    <a:masterClrMapping/>
-  </p:clrMapOvr>
-</p:sld>
-</file>
-
-<file path=ppt/slides/slide20.xml><?xml version="1.0" encoding="utf-8"?>
-<p:sld xmlns:a="http://schemas.openxmlformats.org/drawingml/2006/main" xmlns:r="http://schemas.openxmlformats.org/officeDocument/2006/relationships" xmlns:p="http://schemas.openxmlformats.org/presentationml/2006/main">
-  <p:cSld>
-    <p:spTree>
-      <p:nvGrpSpPr>
-        <p:cNvPr id="1" name=""/>
-        <p:cNvGrpSpPr/>
-        <p:nvPr/>
-      </p:nvGrpSpPr>
-      <p:grpSpPr>
-        <a:xfrm>
-          <a:off x="0" y="0"/>
-          <a:ext cx="0" cy="0"/>
-          <a:chOff x="0" y="0"/>
-          <a:chExt cx="0" cy="0"/>
-        </a:xfrm>
-      </p:grpSpPr>
-      <p:sp>
-        <p:nvSpPr>
           <p:cNvPr id="2" name="Title 1">
             <a:extLst>
               <a:ext uri="{FF2B5EF4-FFF2-40B4-BE49-F238E27FC236}">
@@ -8455,7 +8640,7 @@
           <a:p>
             <a:fld id="{ADDE84BC-4FC7-4B69-BEAA-AA840A7919E3}" type="slidenum">
               <a:rPr lang="en-US" smtClean="0"/>
-              <a:t>20</a:t>
+              <a:t>21</a:t>
             </a:fld>
             <a:endParaRPr lang="en-US"/>
           </a:p>
@@ -8570,7 +8755,7 @@
         <p:spPr>
           <a:xfrm>
             <a:off x="4402667" y="103863"/>
-            <a:ext cx="3991542" cy="369332"/>
+            <a:ext cx="6174126" cy="369332"/>
           </a:xfrm>
           <a:prstGeom prst="rect">
             <a:avLst/>
@@ -8585,7 +8770,7 @@
           <a:p>
             <a:r>
               <a:rPr lang="en-US" dirty="0"/>
-              <a:t>Can use Built In LED connected to pin 13</a:t>
+              <a:t>Can use Built In LED connected to pin 13 instead of external LED</a:t>
             </a:r>
           </a:p>
         </p:txBody>
@@ -8594,356 +8779,6 @@
     <p:extLst>
       <p:ext uri="{BB962C8B-B14F-4D97-AF65-F5344CB8AC3E}">
         <p14:creationId xmlns:p14="http://schemas.microsoft.com/office/powerpoint/2010/main" val="2130612738"/>
-      </p:ext>
-    </p:extLst>
-  </p:cSld>
-  <p:clrMapOvr>
-    <a:masterClrMapping/>
-  </p:clrMapOvr>
-</p:sld>
-</file>
-
-<file path=ppt/slides/slide21.xml><?xml version="1.0" encoding="utf-8"?>
-<p:sld xmlns:a="http://schemas.openxmlformats.org/drawingml/2006/main" xmlns:r="http://schemas.openxmlformats.org/officeDocument/2006/relationships" xmlns:p="http://schemas.openxmlformats.org/presentationml/2006/main">
-  <p:cSld>
-    <p:spTree>
-      <p:nvGrpSpPr>
-        <p:cNvPr id="1" name=""/>
-        <p:cNvGrpSpPr/>
-        <p:nvPr/>
-      </p:nvGrpSpPr>
-      <p:grpSpPr>
-        <a:xfrm>
-          <a:off x="0" y="0"/>
-          <a:ext cx="0" cy="0"/>
-          <a:chOff x="0" y="0"/>
-          <a:chExt cx="0" cy="0"/>
-        </a:xfrm>
-      </p:grpSpPr>
-      <p:sp>
-        <p:nvSpPr>
-          <p:cNvPr id="2" name="Title 1"/>
-          <p:cNvSpPr>
-            <a:spLocks noGrp="1"/>
-          </p:cNvSpPr>
-          <p:nvPr>
-            <p:ph type="title"/>
-          </p:nvPr>
-        </p:nvSpPr>
-        <p:spPr/>
-        <p:txBody>
-          <a:bodyPr/>
-          <a:lstStyle/>
-          <a:p>
-            <a:r>
-              <a:rPr lang="en-US" dirty="0"/>
-              <a:t>Resources</a:t>
-            </a:r>
-          </a:p>
-        </p:txBody>
-      </p:sp>
-      <p:sp>
-        <p:nvSpPr>
-          <p:cNvPr id="3" name="Content Placeholder 2"/>
-          <p:cNvSpPr>
-            <a:spLocks noGrp="1"/>
-          </p:cNvSpPr>
-          <p:nvPr>
-            <p:ph idx="1"/>
-          </p:nvPr>
-        </p:nvSpPr>
-        <p:spPr>
-          <a:xfrm>
-            <a:off x="1097280" y="1845734"/>
-            <a:ext cx="10058400" cy="4351866"/>
-          </a:xfrm>
-        </p:spPr>
-        <p:txBody>
-          <a:bodyPr>
-            <a:normAutofit fontScale="62500" lnSpcReduction="20000"/>
-          </a:bodyPr>
-          <a:lstStyle/>
-          <a:p>
-            <a:r>
-              <a:rPr lang="en-US" dirty="0">
-                <a:hlinkClick r:id="rId2"/>
-              </a:rPr>
-              <a:t>https://www.instructables.com/id/Arduino-Projects/</a:t>
-            </a:r>
-            <a:br>
-              <a:rPr lang="en-US" sz="2000" dirty="0">
-                <a:solidFill>
-                  <a:srgbClr val="00B0F0"/>
-                </a:solidFill>
-              </a:rPr>
-            </a:br>
-            <a:r>
-              <a:rPr lang="en-US" sz="2000" dirty="0"/>
-              <a:t>A great source of inspiration</a:t>
-            </a:r>
-            <a:br>
-              <a:rPr lang="en-US" sz="2000" dirty="0"/>
-            </a:br>
-            <a:r>
-              <a:rPr lang="en-US" sz="2000" dirty="0"/>
-              <a:t>Shows many cool projects you can accomplish with an Arduino</a:t>
-            </a:r>
-          </a:p>
-          <a:p>
-            <a:r>
-              <a:rPr lang="en-US" sz="2000" b="1" dirty="0"/>
-              <a:t>Introduction to Arduino: A piece of cake!</a:t>
-            </a:r>
-            <a:br>
-              <a:rPr lang="en-US" sz="2000" b="1" dirty="0"/>
-            </a:br>
-            <a:r>
-              <a:rPr lang="en-US" sz="2000" dirty="0"/>
-              <a:t>Alan G. Smith (alan@introtoarduino.com)</a:t>
-            </a:r>
-            <a:br>
-              <a:rPr lang="en-US" sz="2000" dirty="0"/>
-            </a:br>
-            <a:r>
-              <a:rPr lang="en-US" sz="2000" dirty="0"/>
-              <a:t>Hardcopy available at </a:t>
-            </a:r>
-            <a:r>
-              <a:rPr lang="en-US" sz="2000" dirty="0">
-                <a:hlinkClick r:id="rId3"/>
-              </a:rPr>
-              <a:t>http://www.amazon.com</a:t>
-            </a:r>
-            <a:br>
-              <a:rPr lang="en-US" sz="2000" dirty="0"/>
-            </a:br>
-            <a:r>
-              <a:rPr lang="en-US" sz="2000" dirty="0"/>
-              <a:t>The most recent PDF is free at </a:t>
-            </a:r>
-            <a:r>
-              <a:rPr lang="en-US" sz="2000" dirty="0">
-                <a:hlinkClick r:id="rId4"/>
-              </a:rPr>
-              <a:t>http://www.introtoarduino.com</a:t>
-            </a:r>
-            <a:endParaRPr lang="en-US" sz="2000" dirty="0"/>
-          </a:p>
-          <a:p>
-            <a:r>
-              <a:rPr lang="en-US" sz="2000" dirty="0">
-                <a:hlinkClick r:id="rId5"/>
-              </a:rPr>
-              <a:t>https://www.arduino.cc</a:t>
-            </a:r>
-            <a:br>
-              <a:rPr lang="en-US" sz="2000" dirty="0"/>
-            </a:br>
-            <a:r>
-              <a:rPr lang="en-US" sz="2000" dirty="0"/>
-              <a:t>The official web site for Arduino</a:t>
-            </a:r>
-            <a:br>
-              <a:rPr lang="en-US" sz="2000" dirty="0"/>
-            </a:br>
-            <a:r>
-              <a:rPr lang="en-US" sz="2000" dirty="0"/>
-              <a:t>Tutorials, documentation, example projects, shop</a:t>
-            </a:r>
-          </a:p>
-          <a:p>
-            <a:r>
-              <a:rPr lang="en-US" sz="2000" dirty="0">
-                <a:hlinkClick r:id="rId6"/>
-              </a:rPr>
-              <a:t>https://www.adafruit.com</a:t>
-            </a:r>
-            <a:br>
-              <a:rPr lang="en-US" sz="2000" dirty="0"/>
-            </a:br>
-            <a:r>
-              <a:rPr lang="en-US" sz="2000" dirty="0"/>
-              <a:t>A DIY site loaded with Arduino and Raspberry Pi products</a:t>
-            </a:r>
-            <a:br>
-              <a:rPr lang="en-US" sz="2000" dirty="0"/>
-            </a:br>
-            <a:r>
-              <a:rPr lang="en-US" sz="2000" dirty="0"/>
-              <a:t>Tutorials, step-by-step instructions, example projects, shop</a:t>
-            </a:r>
-          </a:p>
-          <a:p>
-            <a:r>
-              <a:rPr lang="en-US" sz="2000" dirty="0">
-                <a:hlinkClick r:id="rId7"/>
-              </a:rPr>
-              <a:t>https://www.sparkfun.com/</a:t>
-            </a:r>
-            <a:br>
-              <a:rPr lang="en-US" sz="2000" dirty="0"/>
-            </a:br>
-            <a:r>
-              <a:rPr lang="en-US" sz="2000" dirty="0"/>
-              <a:t>An electronics retailer with lots of Arduino and Raspberry Pi products</a:t>
-            </a:r>
-          </a:p>
-          <a:p>
-            <a:r>
-              <a:rPr lang="en-US" sz="2000" dirty="0">
-                <a:hlinkClick r:id="rId8"/>
-              </a:rPr>
-              <a:t>https://www.pololu.com/</a:t>
-            </a:r>
-            <a:br>
-              <a:rPr lang="en-US" sz="2000" dirty="0"/>
-            </a:br>
-            <a:r>
-              <a:rPr lang="en-US" sz="2000" dirty="0"/>
-              <a:t>An online retailer with lots of robotics components</a:t>
-            </a:r>
-          </a:p>
-          <a:p>
-            <a:r>
-              <a:rPr lang="en-US" sz="2000" dirty="0">
-                <a:hlinkClick r:id="rId9"/>
-              </a:rPr>
-              <a:t>https://www.seeedstudio.com/</a:t>
-            </a:r>
-            <a:br>
-              <a:rPr lang="en-US" sz="2000" dirty="0">
-                <a:hlinkClick r:id="rId9"/>
-              </a:rPr>
-            </a:br>
-            <a:r>
-              <a:rPr lang="en-US" sz="2000" dirty="0"/>
-              <a:t>An online retailer of project components</a:t>
-            </a:r>
-          </a:p>
-          <a:p>
-            <a:r>
-              <a:rPr lang="en-US" sz="2000" dirty="0">
-                <a:hlinkClick r:id="rId8"/>
-              </a:rPr>
-              <a:t>https://</a:t>
-            </a:r>
-            <a:r>
-              <a:rPr lang="en-US" sz="2000" dirty="0">
-                <a:hlinkClick r:id="rId10"/>
-              </a:rPr>
-              <a:t> blog.tinkercad.com/official-guide-to-</a:t>
-            </a:r>
-            <a:r>
-              <a:rPr lang="en-US" sz="2000" dirty="0" err="1">
-                <a:hlinkClick r:id="rId10"/>
-              </a:rPr>
-              <a:t>tinkercad</a:t>
-            </a:r>
-            <a:r>
-              <a:rPr lang="en-US" sz="2000" dirty="0">
-                <a:hlinkClick r:id="rId10"/>
-              </a:rPr>
-              <a:t>-circuits </a:t>
-            </a:r>
-            <a:r>
-              <a:rPr lang="en-US" sz="2000" dirty="0">
-                <a:hlinkClick r:id="rId8"/>
-              </a:rPr>
-              <a:t>/</a:t>
-            </a:r>
-            <a:br>
-              <a:rPr lang="en-US" sz="2000" dirty="0"/>
-            </a:br>
-            <a:r>
-              <a:rPr lang="en-US" sz="2000" dirty="0"/>
-              <a:t>Cloud-based 3D CAD and Circuit design tool</a:t>
-            </a:r>
-            <a:endParaRPr lang="en-US" sz="2000" dirty="0">
-              <a:hlinkClick r:id="rId10"/>
-            </a:endParaRPr>
-          </a:p>
-          <a:p>
-            <a:endParaRPr lang="en-US" sz="2000" dirty="0">
-              <a:hlinkClick r:id="rId10"/>
-            </a:endParaRPr>
-          </a:p>
-          <a:p>
-            <a:endParaRPr lang="en-US" sz="2000" dirty="0"/>
-          </a:p>
-          <a:p>
-            <a:endParaRPr lang="en-US" sz="2000" dirty="0"/>
-          </a:p>
-        </p:txBody>
-      </p:sp>
-      <p:sp>
-        <p:nvSpPr>
-          <p:cNvPr id="4" name="Footer Placeholder 3">
-            <a:extLst>
-              <a:ext uri="{FF2B5EF4-FFF2-40B4-BE49-F238E27FC236}">
-                <a16:creationId xmlns:a16="http://schemas.microsoft.com/office/drawing/2014/main" id="{4FCB6260-4EB3-4A30-815F-5BC5D7FF33A0}"/>
-              </a:ext>
-            </a:extLst>
-          </p:cNvPr>
-          <p:cNvSpPr>
-            <a:spLocks noGrp="1"/>
-          </p:cNvSpPr>
-          <p:nvPr>
-            <p:ph type="ftr" sz="quarter" idx="11"/>
-          </p:nvPr>
-        </p:nvSpPr>
-        <p:spPr/>
-        <p:txBody>
-          <a:bodyPr/>
-          <a:lstStyle/>
-          <a:p>
-            <a:r>
-              <a:rPr lang="en-US" dirty="0"/>
-              <a:t>Rochester </a:t>
-            </a:r>
-            <a:r>
-              <a:rPr lang="en-US" dirty="0" err="1"/>
-              <a:t>MakerSpace</a:t>
-            </a:r>
-            <a:r>
-              <a:rPr lang="en-US" dirty="0"/>
-              <a:t> 2021</a:t>
-            </a:r>
-          </a:p>
-        </p:txBody>
-      </p:sp>
-      <p:sp>
-        <p:nvSpPr>
-          <p:cNvPr id="5" name="Slide Number Placeholder 4">
-            <a:extLst>
-              <a:ext uri="{FF2B5EF4-FFF2-40B4-BE49-F238E27FC236}">
-                <a16:creationId xmlns:a16="http://schemas.microsoft.com/office/drawing/2014/main" id="{E12CFC6C-6991-446E-9917-14CB670D3BB0}"/>
-              </a:ext>
-            </a:extLst>
-          </p:cNvPr>
-          <p:cNvSpPr>
-            <a:spLocks noGrp="1"/>
-          </p:cNvSpPr>
-          <p:nvPr>
-            <p:ph type="sldNum" sz="quarter" idx="12"/>
-          </p:nvPr>
-        </p:nvSpPr>
-        <p:spPr/>
-        <p:txBody>
-          <a:bodyPr/>
-          <a:lstStyle/>
-          <a:p>
-            <a:fld id="{ADDE84BC-4FC7-4B69-BEAA-AA840A7919E3}" type="slidenum">
-              <a:rPr lang="en-US" smtClean="0"/>
-              <a:t>21</a:t>
-            </a:fld>
-            <a:endParaRPr lang="en-US"/>
-          </a:p>
-        </p:txBody>
-      </p:sp>
-    </p:spTree>
-    <p:extLst>
-      <p:ext uri="{BB962C8B-B14F-4D97-AF65-F5344CB8AC3E}">
-        <p14:creationId xmlns:p14="http://schemas.microsoft.com/office/powerpoint/2010/main" val="3863090859"/>
       </p:ext>
     </p:extLst>
   </p:cSld>
@@ -8987,7 +8822,7 @@
           <a:p>
             <a:r>
               <a:rPr lang="en-US" dirty="0"/>
-              <a:t>Nightlight example</a:t>
+              <a:t>Resources</a:t>
             </a:r>
           </a:p>
         </p:txBody>
@@ -9002,61 +8837,226 @@
             <p:ph idx="1"/>
           </p:nvPr>
         </p:nvSpPr>
-        <p:spPr/>
+        <p:spPr>
+          <a:xfrm>
+            <a:off x="1097280" y="1845734"/>
+            <a:ext cx="10058400" cy="4351866"/>
+          </a:xfrm>
+        </p:spPr>
         <p:txBody>
           <a:bodyPr>
-            <a:normAutofit/>
+            <a:normAutofit fontScale="62500" lnSpcReduction="20000"/>
           </a:bodyPr>
           <a:lstStyle/>
           <a:p>
             <a:r>
-              <a:rPr lang="en-US" sz="2400" dirty="0"/>
-              <a:t>Night Light – a simple circuit to switch on an LED when it gets dark</a:t>
-            </a:r>
-          </a:p>
-          <a:p>
-            <a:pPr lvl="1"/>
-            <a:r>
-              <a:rPr lang="en-US" sz="2000" dirty="0" err="1"/>
-              <a:t>Open|Maker</a:t>
-            </a:r>
+              <a:rPr lang="en-US" dirty="0">
+                <a:hlinkClick r:id="rId2"/>
+              </a:rPr>
+              <a:t>https://www.instructables.com/id/Arduino-Projects/</a:t>
+            </a:r>
+            <a:br>
+              <a:rPr lang="en-US" sz="2000" dirty="0">
+                <a:solidFill>
+                  <a:srgbClr val="00B0F0"/>
+                </a:solidFill>
+              </a:rPr>
+            </a:br>
             <a:r>
               <a:rPr lang="en-US" sz="2000" dirty="0"/>
-              <a:t>/Documents/</a:t>
-            </a:r>
-            <a:r>
-              <a:rPr lang="en-US" sz="2000" dirty="0" err="1"/>
-              <a:t>ArduinoClass</a:t>
-            </a:r>
-            <a:r>
+              <a:t>A great source of inspiration</a:t>
+            </a:r>
+            <a:br>
               <a:rPr lang="en-US" sz="2000" dirty="0"/>
-              <a:t>/nightlight/</a:t>
-            </a:r>
-            <a:r>
-              <a:rPr lang="en-US" sz="2000" dirty="0" err="1"/>
-              <a:t>nightlight.ino</a:t>
+            </a:br>
+            <a:r>
+              <a:rPr lang="en-US" sz="2000" dirty="0"/>
+              <a:t>Shows many cool projects you can accomplish with an Arduino</a:t>
+            </a:r>
+          </a:p>
+          <a:p>
+            <a:r>
+              <a:rPr lang="en-US" sz="2000" b="1" dirty="0"/>
+              <a:t>Introduction to Arduino: A piece of cake!</a:t>
+            </a:r>
+            <a:br>
+              <a:rPr lang="en-US" sz="2000" b="1" dirty="0"/>
+            </a:br>
+            <a:r>
+              <a:rPr lang="en-US" sz="2000" dirty="0"/>
+              <a:t>Alan G. Smith (alan@introtoarduino.com)</a:t>
+            </a:r>
+            <a:br>
+              <a:rPr lang="en-US" sz="2000" dirty="0"/>
+            </a:br>
+            <a:r>
+              <a:rPr lang="en-US" sz="2000" dirty="0"/>
+              <a:t>Hardcopy available at </a:t>
+            </a:r>
+            <a:r>
+              <a:rPr lang="en-US" sz="2000" dirty="0">
+                <a:hlinkClick r:id="rId3"/>
+              </a:rPr>
+              <a:t>http://www.amazon.com</a:t>
+            </a:r>
+            <a:br>
+              <a:rPr lang="en-US" sz="2000" dirty="0"/>
+            </a:br>
+            <a:r>
+              <a:rPr lang="en-US" sz="2000" dirty="0"/>
+              <a:t>The most recent PDF is free at </a:t>
+            </a:r>
+            <a:r>
+              <a:rPr lang="en-US" sz="2000" dirty="0">
+                <a:hlinkClick r:id="rId4"/>
+              </a:rPr>
+              <a:t>http://www.introtoarduino.com</a:t>
             </a:r>
             <a:endParaRPr lang="en-US" sz="2000" dirty="0"/>
           </a:p>
           <a:p>
-            <a:pPr lvl="1"/>
-            <a:r>
+            <a:r>
+              <a:rPr lang="en-US" sz="2000" dirty="0">
+                <a:hlinkClick r:id="rId5"/>
+              </a:rPr>
+              <a:t>https://www.arduino.cc</a:t>
+            </a:r>
+            <a:br>
               <a:rPr lang="en-US" sz="2000" dirty="0"/>
-              <a:t>Demonstrates use of analog input and digital output</a:t>
-            </a:r>
-          </a:p>
-          <a:p>
-            <a:pPr lvl="1"/>
+            </a:br>
             <a:r>
               <a:rPr lang="en-US" sz="2000" dirty="0"/>
-              <a:t>Demo: https://www.youtube.com/watch?v=2GqKbUyhUww</a:t>
-            </a:r>
-          </a:p>
-          <a:p>
-            <a:pPr marL="0" indent="0">
-              <a:buNone/>
-            </a:pPr>
-            <a:endParaRPr lang="en-US" sz="2400" dirty="0"/>
+              <a:t>The official web site for Arduino</a:t>
+            </a:r>
+            <a:br>
+              <a:rPr lang="en-US" sz="2000" dirty="0"/>
+            </a:br>
+            <a:r>
+              <a:rPr lang="en-US" sz="2000" dirty="0"/>
+              <a:t>Tutorials, documentation, example projects, shop</a:t>
+            </a:r>
+          </a:p>
+          <a:p>
+            <a:r>
+              <a:rPr lang="en-US" sz="2000" dirty="0">
+                <a:hlinkClick r:id="rId6"/>
+              </a:rPr>
+              <a:t>https://www.adafruit.com</a:t>
+            </a:r>
+            <a:br>
+              <a:rPr lang="en-US" sz="2000" dirty="0"/>
+            </a:br>
+            <a:r>
+              <a:rPr lang="en-US" sz="2000" dirty="0"/>
+              <a:t>A DIY site loaded with Arduino and Raspberry Pi products</a:t>
+            </a:r>
+            <a:br>
+              <a:rPr lang="en-US" sz="2000" dirty="0"/>
+            </a:br>
+            <a:r>
+              <a:rPr lang="en-US" sz="2000" dirty="0"/>
+              <a:t>Tutorials, step-by-step instructions, example projects, shop</a:t>
+            </a:r>
+          </a:p>
+          <a:p>
+            <a:r>
+              <a:rPr lang="en-US" sz="2000" dirty="0">
+                <a:hlinkClick r:id="rId7"/>
+              </a:rPr>
+              <a:t>https://www.sparkfun.com/</a:t>
+            </a:r>
+            <a:br>
+              <a:rPr lang="en-US" sz="2000" dirty="0"/>
+            </a:br>
+            <a:r>
+              <a:rPr lang="en-US" sz="2000" dirty="0"/>
+              <a:t>An electronics retailer with lots of Arduino and Raspberry Pi products</a:t>
+            </a:r>
+          </a:p>
+          <a:p>
+            <a:r>
+              <a:rPr lang="en-US" sz="2000" dirty="0">
+                <a:hlinkClick r:id="rId8"/>
+              </a:rPr>
+              <a:t>https://www.pololu.com/</a:t>
+            </a:r>
+            <a:br>
+              <a:rPr lang="en-US" sz="2000" dirty="0"/>
+            </a:br>
+            <a:r>
+              <a:rPr lang="en-US" sz="2000" dirty="0"/>
+              <a:t>An online retailer with lots of robotics components</a:t>
+            </a:r>
+          </a:p>
+          <a:p>
+            <a:r>
+              <a:rPr lang="en-US" sz="2000" dirty="0">
+                <a:hlinkClick r:id="rId9"/>
+              </a:rPr>
+              <a:t>https://www.seeedstudio.com/</a:t>
+            </a:r>
+            <a:br>
+              <a:rPr lang="en-US" sz="2000" dirty="0">
+                <a:hlinkClick r:id="rId9"/>
+              </a:rPr>
+            </a:br>
+            <a:r>
+              <a:rPr lang="en-US" sz="2000" dirty="0"/>
+              <a:t>An online retailer of project components</a:t>
+            </a:r>
+          </a:p>
+          <a:p>
+            <a:r>
+              <a:rPr lang="en-US" sz="2000" dirty="0">
+                <a:hlinkClick r:id="rId8"/>
+              </a:rPr>
+              <a:t>https://</a:t>
+            </a:r>
+            <a:r>
+              <a:rPr lang="en-US" sz="2000" dirty="0">
+                <a:hlinkClick r:id="rId10"/>
+              </a:rPr>
+              <a:t> blog.tinkercad.com/official-guide-to-</a:t>
+            </a:r>
+            <a:r>
+              <a:rPr lang="en-US" sz="2000" dirty="0" err="1">
+                <a:hlinkClick r:id="rId10"/>
+              </a:rPr>
+              <a:t>tinkercad</a:t>
+            </a:r>
+            <a:r>
+              <a:rPr lang="en-US" sz="2000" dirty="0">
+                <a:hlinkClick r:id="rId10"/>
+              </a:rPr>
+              <a:t>-circuits </a:t>
+            </a:r>
+            <a:r>
+              <a:rPr lang="en-US" sz="2000" dirty="0">
+                <a:hlinkClick r:id="rId8"/>
+              </a:rPr>
+              <a:t>/</a:t>
+            </a:r>
+            <a:br>
+              <a:rPr lang="en-US" sz="2000" dirty="0"/>
+            </a:br>
+            <a:r>
+              <a:rPr lang="en-US" sz="2000" dirty="0"/>
+              <a:t>Cloud-based 3D CAD and Circuit design tool</a:t>
+            </a:r>
+            <a:endParaRPr lang="en-US" sz="2000" dirty="0">
+              <a:hlinkClick r:id="rId10"/>
+            </a:endParaRPr>
+          </a:p>
+          <a:p>
+            <a:endParaRPr lang="en-US" sz="2000" dirty="0">
+              <a:hlinkClick r:id="rId10"/>
+            </a:endParaRPr>
+          </a:p>
+          <a:p>
+            <a:endParaRPr lang="en-US" sz="2000" dirty="0"/>
+          </a:p>
+          <a:p>
+            <a:endParaRPr lang="en-US" sz="2000" dirty="0"/>
           </a:p>
         </p:txBody>
       </p:sp>
@@ -9065,7 +9065,7 @@
           <p:cNvPr id="4" name="Footer Placeholder 3">
             <a:extLst>
               <a:ext uri="{FF2B5EF4-FFF2-40B4-BE49-F238E27FC236}">
-                <a16:creationId xmlns:a16="http://schemas.microsoft.com/office/drawing/2014/main" id="{45085D77-B385-4DA1-AAB9-DEDEBAA95851}"/>
+                <a16:creationId xmlns:a16="http://schemas.microsoft.com/office/drawing/2014/main" id="{4FCB6260-4EB3-4A30-815F-5BC5D7FF33A0}"/>
               </a:ext>
             </a:extLst>
           </p:cNvPr>
@@ -9101,7 +9101,7 @@
           <p:cNvPr id="5" name="Slide Number Placeholder 4">
             <a:extLst>
               <a:ext uri="{FF2B5EF4-FFF2-40B4-BE49-F238E27FC236}">
-                <a16:creationId xmlns:a16="http://schemas.microsoft.com/office/drawing/2014/main" id="{B7AE9DE6-3593-4BCA-83C3-4D5C78DE11A9}"/>
+                <a16:creationId xmlns:a16="http://schemas.microsoft.com/office/drawing/2014/main" id="{E12CFC6C-6991-446E-9917-14CB670D3BB0}"/>
               </a:ext>
             </a:extLst>
           </p:cNvPr>
@@ -9128,7 +9128,7 @@
     </p:spTree>
     <p:extLst>
       <p:ext uri="{BB962C8B-B14F-4D97-AF65-F5344CB8AC3E}">
-        <p14:creationId xmlns:p14="http://schemas.microsoft.com/office/powerpoint/2010/main" val="3039060087"/>
+        <p14:creationId xmlns:p14="http://schemas.microsoft.com/office/powerpoint/2010/main" val="3863090859"/>
       </p:ext>
     </p:extLst>
   </p:cSld>
@@ -9172,8 +9172,76 @@
           <a:p>
             <a:r>
               <a:rPr lang="en-US" dirty="0"/>
-              <a:t>Nightlight example - Breadboard</a:t>
-            </a:r>
+              <a:t>Nightlight example</a:t>
+            </a:r>
+          </a:p>
+        </p:txBody>
+      </p:sp>
+      <p:sp>
+        <p:nvSpPr>
+          <p:cNvPr id="3" name="Content Placeholder 2"/>
+          <p:cNvSpPr>
+            <a:spLocks noGrp="1"/>
+          </p:cNvSpPr>
+          <p:nvPr>
+            <p:ph idx="1"/>
+          </p:nvPr>
+        </p:nvSpPr>
+        <p:spPr/>
+        <p:txBody>
+          <a:bodyPr>
+            <a:normAutofit/>
+          </a:bodyPr>
+          <a:lstStyle/>
+          <a:p>
+            <a:r>
+              <a:rPr lang="en-US" sz="2400" dirty="0"/>
+              <a:t>Night Light – a simple circuit to switch on an LED when it gets dark</a:t>
+            </a:r>
+          </a:p>
+          <a:p>
+            <a:pPr lvl="1"/>
+            <a:r>
+              <a:rPr lang="en-US" sz="2000" dirty="0" err="1"/>
+              <a:t>Open|Maker</a:t>
+            </a:r>
+            <a:r>
+              <a:rPr lang="en-US" sz="2000" dirty="0"/>
+              <a:t>/Documents/</a:t>
+            </a:r>
+            <a:r>
+              <a:rPr lang="en-US" sz="2000" dirty="0" err="1"/>
+              <a:t>ArduinoClass</a:t>
+            </a:r>
+            <a:r>
+              <a:rPr lang="en-US" sz="2000" dirty="0"/>
+              <a:t>/nightlight/</a:t>
+            </a:r>
+            <a:r>
+              <a:rPr lang="en-US" sz="2000" dirty="0" err="1"/>
+              <a:t>nightlight.ino</a:t>
+            </a:r>
+            <a:endParaRPr lang="en-US" sz="2000" dirty="0"/>
+          </a:p>
+          <a:p>
+            <a:pPr lvl="1"/>
+            <a:r>
+              <a:rPr lang="en-US" sz="2000" dirty="0"/>
+              <a:t>Demonstrates use of analog input and digital output</a:t>
+            </a:r>
+          </a:p>
+          <a:p>
+            <a:pPr lvl="1"/>
+            <a:r>
+              <a:rPr lang="en-US" sz="2000" dirty="0"/>
+              <a:t>Demo: https://www.youtube.com/watch?v=2GqKbUyhUww</a:t>
+            </a:r>
+          </a:p>
+          <a:p>
+            <a:pPr marL="0" indent="0">
+              <a:buNone/>
+            </a:pPr>
+            <a:endParaRPr lang="en-US" sz="2400" dirty="0"/>
           </a:p>
         </p:txBody>
       </p:sp>
@@ -9242,45 +9310,10 @@
           </a:p>
         </p:txBody>
       </p:sp>
-      <p:pic>
-        <p:nvPicPr>
-          <p:cNvPr id="12" name="Content Placeholder 11">
-            <a:extLst>
-              <a:ext uri="{FF2B5EF4-FFF2-40B4-BE49-F238E27FC236}">
-                <a16:creationId xmlns:a16="http://schemas.microsoft.com/office/drawing/2014/main" id="{E67D9ABD-AFBA-4BC2-A3B5-278F144DE6EB}"/>
-              </a:ext>
-            </a:extLst>
-          </p:cNvPr>
-          <p:cNvPicPr>
-            <a:picLocks noGrp="1" noChangeAspect="1"/>
-          </p:cNvPicPr>
-          <p:nvPr>
-            <p:ph idx="1"/>
-          </p:nvPr>
-        </p:nvPicPr>
-        <p:blipFill>
-          <a:blip r:embed="rId2" cstate="print">
-            <a:extLst>
-              <a:ext uri="{28A0092B-C50C-407E-A947-70E740481C1C}">
-                <a14:useLocalDpi xmlns:a14="http://schemas.microsoft.com/office/drawing/2010/main" val="0"/>
-              </a:ext>
-            </a:extLst>
-          </a:blip>
-          <a:stretch>
-            <a:fillRect/>
-          </a:stretch>
-        </p:blipFill>
-        <p:spPr>
-          <a:xfrm>
-            <a:off x="2438851" y="1878294"/>
-            <a:ext cx="5985481" cy="4440557"/>
-          </a:xfrm>
-        </p:spPr>
-      </p:pic>
     </p:spTree>
     <p:extLst>
       <p:ext uri="{BB962C8B-B14F-4D97-AF65-F5344CB8AC3E}">
-        <p14:creationId xmlns:p14="http://schemas.microsoft.com/office/powerpoint/2010/main" val="1002215281"/>
+        <p14:creationId xmlns:p14="http://schemas.microsoft.com/office/powerpoint/2010/main" val="3039060087"/>
       </p:ext>
     </p:extLst>
   </p:cSld>
@@ -9324,7 +9357,7 @@
           <a:p>
             <a:r>
               <a:rPr lang="en-US" dirty="0"/>
-              <a:t>Nightlight example - Schematic</a:t>
+              <a:t>Nightlight example - Breadboard</a:t>
             </a:r>
           </a:p>
         </p:txBody>
@@ -9396,10 +9429,10 @@
       </p:sp>
       <p:pic>
         <p:nvPicPr>
-          <p:cNvPr id="13" name="Content Placeholder 12">
+          <p:cNvPr id="8" name="Content Placeholder 7">
             <a:extLst>
               <a:ext uri="{FF2B5EF4-FFF2-40B4-BE49-F238E27FC236}">
-                <a16:creationId xmlns:a16="http://schemas.microsoft.com/office/drawing/2014/main" id="{0FB12B0E-84FA-482C-BF39-E73A990164DC}"/>
+                <a16:creationId xmlns:a16="http://schemas.microsoft.com/office/drawing/2014/main" id="{0C49F22C-D7B5-4178-A9A1-1C21E6B002EC}"/>
               </a:ext>
             </a:extLst>
           </p:cNvPr>
@@ -9411,7 +9444,7 @@
           </p:nvPr>
         </p:nvPicPr>
         <p:blipFill>
-          <a:blip r:embed="rId2">
+          <a:blip r:embed="rId2" cstate="print">
             <a:extLst>
               <a:ext uri="{28A0092B-C50C-407E-A947-70E740481C1C}">
                 <a14:useLocalDpi xmlns:a14="http://schemas.microsoft.com/office/drawing/2010/main" val="0"/>
@@ -9424,8 +9457,160 @@
         </p:blipFill>
         <p:spPr>
           <a:xfrm>
-            <a:off x="3598333" y="1845733"/>
-            <a:ext cx="4386439" cy="4386439"/>
+            <a:off x="2667816" y="2201863"/>
+            <a:ext cx="5511227" cy="4022725"/>
+          </a:xfrm>
+        </p:spPr>
+      </p:pic>
+    </p:spTree>
+    <p:extLst>
+      <p:ext uri="{BB962C8B-B14F-4D97-AF65-F5344CB8AC3E}">
+        <p14:creationId xmlns:p14="http://schemas.microsoft.com/office/powerpoint/2010/main" val="1002215281"/>
+      </p:ext>
+    </p:extLst>
+  </p:cSld>
+  <p:clrMapOvr>
+    <a:masterClrMapping/>
+  </p:clrMapOvr>
+</p:sld>
+</file>
+
+<file path=ppt/slides/slide25.xml><?xml version="1.0" encoding="utf-8"?>
+<p:sld xmlns:a="http://schemas.openxmlformats.org/drawingml/2006/main" xmlns:r="http://schemas.openxmlformats.org/officeDocument/2006/relationships" xmlns:p="http://schemas.openxmlformats.org/presentationml/2006/main">
+  <p:cSld>
+    <p:spTree>
+      <p:nvGrpSpPr>
+        <p:cNvPr id="1" name=""/>
+        <p:cNvGrpSpPr/>
+        <p:nvPr/>
+      </p:nvGrpSpPr>
+      <p:grpSpPr>
+        <a:xfrm>
+          <a:off x="0" y="0"/>
+          <a:ext cx="0" cy="0"/>
+          <a:chOff x="0" y="0"/>
+          <a:chExt cx="0" cy="0"/>
+        </a:xfrm>
+      </p:grpSpPr>
+      <p:sp>
+        <p:nvSpPr>
+          <p:cNvPr id="2" name="Title 1"/>
+          <p:cNvSpPr>
+            <a:spLocks noGrp="1"/>
+          </p:cNvSpPr>
+          <p:nvPr>
+            <p:ph type="title"/>
+          </p:nvPr>
+        </p:nvSpPr>
+        <p:spPr/>
+        <p:txBody>
+          <a:bodyPr/>
+          <a:lstStyle/>
+          <a:p>
+            <a:r>
+              <a:rPr lang="en-US" dirty="0"/>
+              <a:t>Nightlight example - Schematic</a:t>
+            </a:r>
+          </a:p>
+        </p:txBody>
+      </p:sp>
+      <p:sp>
+        <p:nvSpPr>
+          <p:cNvPr id="4" name="Footer Placeholder 3">
+            <a:extLst>
+              <a:ext uri="{FF2B5EF4-FFF2-40B4-BE49-F238E27FC236}">
+                <a16:creationId xmlns:a16="http://schemas.microsoft.com/office/drawing/2014/main" id="{45085D77-B385-4DA1-AAB9-DEDEBAA95851}"/>
+              </a:ext>
+            </a:extLst>
+          </p:cNvPr>
+          <p:cNvSpPr>
+            <a:spLocks noGrp="1"/>
+          </p:cNvSpPr>
+          <p:nvPr>
+            <p:ph type="ftr" sz="quarter" idx="11"/>
+          </p:nvPr>
+        </p:nvSpPr>
+        <p:spPr/>
+        <p:txBody>
+          <a:bodyPr/>
+          <a:lstStyle/>
+          <a:p>
+            <a:r>
+              <a:rPr lang="en-US" dirty="0"/>
+              <a:t>Rochester </a:t>
+            </a:r>
+            <a:r>
+              <a:rPr lang="en-US" dirty="0" err="1"/>
+              <a:t>MakerSpace</a:t>
+            </a:r>
+            <a:r>
+              <a:rPr lang="en-US" dirty="0"/>
+              <a:t> 2021</a:t>
+            </a:r>
+          </a:p>
+        </p:txBody>
+      </p:sp>
+      <p:sp>
+        <p:nvSpPr>
+          <p:cNvPr id="5" name="Slide Number Placeholder 4">
+            <a:extLst>
+              <a:ext uri="{FF2B5EF4-FFF2-40B4-BE49-F238E27FC236}">
+                <a16:creationId xmlns:a16="http://schemas.microsoft.com/office/drawing/2014/main" id="{B7AE9DE6-3593-4BCA-83C3-4D5C78DE11A9}"/>
+              </a:ext>
+            </a:extLst>
+          </p:cNvPr>
+          <p:cNvSpPr>
+            <a:spLocks noGrp="1"/>
+          </p:cNvSpPr>
+          <p:nvPr>
+            <p:ph type="sldNum" sz="quarter" idx="12"/>
+          </p:nvPr>
+        </p:nvSpPr>
+        <p:spPr/>
+        <p:txBody>
+          <a:bodyPr/>
+          <a:lstStyle/>
+          <a:p>
+            <a:fld id="{ADDE84BC-4FC7-4B69-BEAA-AA840A7919E3}" type="slidenum">
+              <a:rPr lang="en-US" smtClean="0"/>
+              <a:t>25</a:t>
+            </a:fld>
+            <a:endParaRPr lang="en-US"/>
+          </a:p>
+        </p:txBody>
+      </p:sp>
+      <p:pic>
+        <p:nvPicPr>
+          <p:cNvPr id="8" name="Content Placeholder 7">
+            <a:extLst>
+              <a:ext uri="{FF2B5EF4-FFF2-40B4-BE49-F238E27FC236}">
+                <a16:creationId xmlns:a16="http://schemas.microsoft.com/office/drawing/2014/main" id="{6BB5BF72-78AE-4141-8C4B-6E3EBC7F506E}"/>
+              </a:ext>
+            </a:extLst>
+          </p:cNvPr>
+          <p:cNvPicPr>
+            <a:picLocks noGrp="1" noChangeAspect="1"/>
+          </p:cNvPicPr>
+          <p:nvPr>
+            <p:ph idx="1"/>
+          </p:nvPr>
+        </p:nvPicPr>
+        <p:blipFill>
+          <a:blip r:embed="rId2">
+            <a:extLst>
+              <a:ext uri="{28A0092B-C50C-407E-A947-70E740481C1C}">
+                <a14:useLocalDpi xmlns:a14="http://schemas.microsoft.com/office/drawing/2010/main" val="0"/>
+              </a:ext>
+            </a:extLst>
+          </a:blip>
+          <a:stretch>
+            <a:fillRect/>
+          </a:stretch>
+        </p:blipFill>
+        <p:spPr>
+          <a:xfrm>
+            <a:off x="3251200" y="1858149"/>
+            <a:ext cx="4343400" cy="4398378"/>
           </a:xfrm>
         </p:spPr>
       </p:pic>
@@ -9461,7 +9646,13 @@
       </p:grpSpPr>
       <p:sp>
         <p:nvSpPr>
-          <p:cNvPr id="2" name="Title 1"/>
+          <p:cNvPr id="2" name="Title 1">
+            <a:extLst>
+              <a:ext uri="{FF2B5EF4-FFF2-40B4-BE49-F238E27FC236}">
+                <a16:creationId xmlns:a16="http://schemas.microsoft.com/office/drawing/2014/main" id="{9BBF530D-04A4-4463-950E-BCABA2186448}"/>
+              </a:ext>
+            </a:extLst>
+          </p:cNvPr>
           <p:cNvSpPr>
             <a:spLocks noGrp="1"/>
           </p:cNvSpPr>
@@ -9476,14 +9667,20 @@
           <a:p>
             <a:r>
               <a:rPr lang="en-US" dirty="0"/>
-              <a:t>Computers, Microcontrollers, Arduino</a:t>
-            </a:r>
-          </a:p>
-        </p:txBody>
-      </p:sp>
-      <p:sp>
-        <p:nvSpPr>
-          <p:cNvPr id="3" name="Content Placeholder 2"/>
+              <a:t>Class notes and code</a:t>
+            </a:r>
+          </a:p>
+        </p:txBody>
+      </p:sp>
+      <p:sp>
+        <p:nvSpPr>
+          <p:cNvPr id="3" name="Content Placeholder 2">
+            <a:extLst>
+              <a:ext uri="{FF2B5EF4-FFF2-40B4-BE49-F238E27FC236}">
+                <a16:creationId xmlns:a16="http://schemas.microsoft.com/office/drawing/2014/main" id="{A19D7D03-D494-406C-9BEC-DF21943E5C50}"/>
+              </a:ext>
+            </a:extLst>
+          </p:cNvPr>
           <p:cNvSpPr>
             <a:spLocks noGrp="1"/>
           </p:cNvSpPr>
@@ -9491,68 +9688,37 @@
             <p:ph idx="1"/>
           </p:nvPr>
         </p:nvSpPr>
-        <p:spPr/>
-        <p:txBody>
-          <a:bodyPr>
-            <a:normAutofit/>
-          </a:bodyPr>
-          <a:lstStyle/>
-          <a:p>
-            <a:r>
-              <a:rPr lang="en-US" dirty="0"/>
-              <a:t>Conventional computers can be described by 5 main components:</a:t>
+        <p:spPr>
+          <a:xfrm>
+            <a:off x="1185332" y="1845734"/>
+            <a:ext cx="9970347" cy="4023360"/>
+          </a:xfrm>
+        </p:spPr>
+        <p:txBody>
+          <a:bodyPr/>
+          <a:lstStyle/>
+          <a:p>
+            <a:r>
+              <a:rPr lang="en-US" dirty="0"/>
+              <a:t>All the class notes and code can be downloaded from GitHub:</a:t>
             </a:r>
           </a:p>
           <a:p>
             <a:pPr lvl="1"/>
             <a:r>
-              <a:rPr lang="en-US" dirty="0"/>
-              <a:t>CPU – the Central Processing Unit executes instructions</a:t>
-            </a:r>
-          </a:p>
-          <a:p>
-            <a:pPr lvl="1"/>
-            <a:r>
-              <a:rPr lang="en-US" dirty="0"/>
-              <a:t>Program memory – the instructions</a:t>
-            </a:r>
-          </a:p>
-          <a:p>
-            <a:pPr lvl="1"/>
-            <a:r>
-              <a:rPr lang="en-US" dirty="0"/>
-              <a:t>Data memory – the data</a:t>
-            </a:r>
-          </a:p>
-          <a:p>
-            <a:pPr lvl="1"/>
-            <a:r>
-              <a:rPr lang="en-US" dirty="0"/>
-              <a:t>I/O interfaces and devices – connecting disks, screens, keyboards, mice, etc.</a:t>
-            </a:r>
-          </a:p>
-          <a:p>
-            <a:pPr lvl="1"/>
-            <a:r>
-              <a:rPr lang="en-US" dirty="0"/>
-              <a:t>Software -  Operating system, utility programs, applications</a:t>
-            </a:r>
-          </a:p>
-          <a:p>
-            <a:r>
-              <a:rPr lang="en-US" dirty="0"/>
-              <a:t>Microcontrollers are a computers on a chip typically including a CPU, and program and data memory with connectors for General Purpose Input and Output (GPIO).</a:t>
-            </a:r>
-          </a:p>
-          <a:p>
-            <a:r>
-              <a:rPr lang="en-US" dirty="0"/>
-              <a:t>Arduino is an open-source board design, originally designed in 2006, that is combined with a free, basic development environment</a:t>
-            </a:r>
-          </a:p>
-          <a:p>
+              <a:rPr lang="en-US" dirty="0">
+                <a:hlinkClick r:id="rId2"/>
+              </a:rPr>
+              <a:t>https://github.com/RochesterMakerSpace/ArduinoClass</a:t>
+            </a:r>
             <a:endParaRPr lang="en-US" dirty="0"/>
           </a:p>
+          <a:p>
+            <a:r>
+              <a:rPr lang="en-US" dirty="0"/>
+              <a:t>Pull down the green “Code” button and select “Download ZIP”</a:t>
+            </a:r>
+          </a:p>
         </p:txBody>
       </p:sp>
       <p:sp>
@@ -9560,7 +9726,7 @@
           <p:cNvPr id="4" name="Footer Placeholder 3">
             <a:extLst>
               <a:ext uri="{FF2B5EF4-FFF2-40B4-BE49-F238E27FC236}">
-                <a16:creationId xmlns:a16="http://schemas.microsoft.com/office/drawing/2014/main" id="{ED1E0ABD-C52B-43F1-B461-4C7F7639E2D9}"/>
+                <a16:creationId xmlns:a16="http://schemas.microsoft.com/office/drawing/2014/main" id="{7E8FD915-7D8F-4CDF-93FA-FDAF5A72D867}"/>
               </a:ext>
             </a:extLst>
           </p:cNvPr>
@@ -9596,7 +9762,7 @@
           <p:cNvPr id="5" name="Slide Number Placeholder 4">
             <a:extLst>
               <a:ext uri="{FF2B5EF4-FFF2-40B4-BE49-F238E27FC236}">
-                <a16:creationId xmlns:a16="http://schemas.microsoft.com/office/drawing/2014/main" id="{712063B0-C600-4D8A-9481-6A8CCDA6E16E}"/>
+                <a16:creationId xmlns:a16="http://schemas.microsoft.com/office/drawing/2014/main" id="{62FFA67B-4FDB-4052-8201-56A1D6EF18DB}"/>
               </a:ext>
             </a:extLst>
           </p:cNvPr>
@@ -9623,7 +9789,7 @@
     </p:spTree>
     <p:extLst>
       <p:ext uri="{BB962C8B-B14F-4D97-AF65-F5344CB8AC3E}">
-        <p14:creationId xmlns:p14="http://schemas.microsoft.com/office/powerpoint/2010/main" val="1669430859"/>
+        <p14:creationId xmlns:p14="http://schemas.microsoft.com/office/powerpoint/2010/main" val="3808349069"/>
       </p:ext>
     </p:extLst>
   </p:cSld>
@@ -9652,6 +9818,197 @@
       </p:grpSpPr>
       <p:sp>
         <p:nvSpPr>
+          <p:cNvPr id="2" name="Title 1"/>
+          <p:cNvSpPr>
+            <a:spLocks noGrp="1"/>
+          </p:cNvSpPr>
+          <p:nvPr>
+            <p:ph type="title"/>
+          </p:nvPr>
+        </p:nvSpPr>
+        <p:spPr/>
+        <p:txBody>
+          <a:bodyPr/>
+          <a:lstStyle/>
+          <a:p>
+            <a:r>
+              <a:rPr lang="en-US" dirty="0"/>
+              <a:t>Computers, Microcontrollers, Arduino</a:t>
+            </a:r>
+          </a:p>
+        </p:txBody>
+      </p:sp>
+      <p:sp>
+        <p:nvSpPr>
+          <p:cNvPr id="3" name="Content Placeholder 2"/>
+          <p:cNvSpPr>
+            <a:spLocks noGrp="1"/>
+          </p:cNvSpPr>
+          <p:nvPr>
+            <p:ph idx="1"/>
+          </p:nvPr>
+        </p:nvSpPr>
+        <p:spPr/>
+        <p:txBody>
+          <a:bodyPr>
+            <a:normAutofit/>
+          </a:bodyPr>
+          <a:lstStyle/>
+          <a:p>
+            <a:r>
+              <a:rPr lang="en-US" dirty="0"/>
+              <a:t>Conventional computers can be described by 5 main components:</a:t>
+            </a:r>
+          </a:p>
+          <a:p>
+            <a:pPr lvl="1"/>
+            <a:r>
+              <a:rPr lang="en-US" dirty="0"/>
+              <a:t>CPU – the Central Processing Unit executes instructions</a:t>
+            </a:r>
+          </a:p>
+          <a:p>
+            <a:pPr lvl="1"/>
+            <a:r>
+              <a:rPr lang="en-US" dirty="0"/>
+              <a:t>Program memory – the instructions</a:t>
+            </a:r>
+          </a:p>
+          <a:p>
+            <a:pPr lvl="1"/>
+            <a:r>
+              <a:rPr lang="en-US" dirty="0"/>
+              <a:t>Data memory – the data</a:t>
+            </a:r>
+          </a:p>
+          <a:p>
+            <a:pPr lvl="1"/>
+            <a:r>
+              <a:rPr lang="en-US" dirty="0"/>
+              <a:t>I/O interfaces and devices – connecting disks, screens, keyboards, mice, etc.</a:t>
+            </a:r>
+          </a:p>
+          <a:p>
+            <a:pPr lvl="1"/>
+            <a:r>
+              <a:rPr lang="en-US" dirty="0"/>
+              <a:t>Software -  Operating system, utility programs, applications</a:t>
+            </a:r>
+          </a:p>
+          <a:p>
+            <a:r>
+              <a:rPr lang="en-US" dirty="0"/>
+              <a:t>Microcontrollers are a computers on a chip typically including a CPU, and program and data memory with connectors for General Purpose Input and Output (GPIO).</a:t>
+            </a:r>
+          </a:p>
+          <a:p>
+            <a:r>
+              <a:rPr lang="en-US" dirty="0"/>
+              <a:t>Arduino is an open-source board design, originally designed in 2006, that is combined with a free, basic development environment</a:t>
+            </a:r>
+          </a:p>
+          <a:p>
+            <a:endParaRPr lang="en-US" dirty="0"/>
+          </a:p>
+        </p:txBody>
+      </p:sp>
+      <p:sp>
+        <p:nvSpPr>
+          <p:cNvPr id="4" name="Footer Placeholder 3">
+            <a:extLst>
+              <a:ext uri="{FF2B5EF4-FFF2-40B4-BE49-F238E27FC236}">
+                <a16:creationId xmlns:a16="http://schemas.microsoft.com/office/drawing/2014/main" id="{ED1E0ABD-C52B-43F1-B461-4C7F7639E2D9}"/>
+              </a:ext>
+            </a:extLst>
+          </p:cNvPr>
+          <p:cNvSpPr>
+            <a:spLocks noGrp="1"/>
+          </p:cNvSpPr>
+          <p:nvPr>
+            <p:ph type="ftr" sz="quarter" idx="11"/>
+          </p:nvPr>
+        </p:nvSpPr>
+        <p:spPr/>
+        <p:txBody>
+          <a:bodyPr/>
+          <a:lstStyle/>
+          <a:p>
+            <a:r>
+              <a:rPr lang="en-US" dirty="0"/>
+              <a:t>Rochester </a:t>
+            </a:r>
+            <a:r>
+              <a:rPr lang="en-US" dirty="0" err="1"/>
+              <a:t>MakerSpace</a:t>
+            </a:r>
+            <a:r>
+              <a:rPr lang="en-US" dirty="0"/>
+              <a:t> 2021</a:t>
+            </a:r>
+          </a:p>
+        </p:txBody>
+      </p:sp>
+      <p:sp>
+        <p:nvSpPr>
+          <p:cNvPr id="5" name="Slide Number Placeholder 4">
+            <a:extLst>
+              <a:ext uri="{FF2B5EF4-FFF2-40B4-BE49-F238E27FC236}">
+                <a16:creationId xmlns:a16="http://schemas.microsoft.com/office/drawing/2014/main" id="{712063B0-C600-4D8A-9481-6A8CCDA6E16E}"/>
+              </a:ext>
+            </a:extLst>
+          </p:cNvPr>
+          <p:cNvSpPr>
+            <a:spLocks noGrp="1"/>
+          </p:cNvSpPr>
+          <p:nvPr>
+            <p:ph type="sldNum" sz="quarter" idx="12"/>
+          </p:nvPr>
+        </p:nvSpPr>
+        <p:spPr/>
+        <p:txBody>
+          <a:bodyPr/>
+          <a:lstStyle/>
+          <a:p>
+            <a:fld id="{ADDE84BC-4FC7-4B69-BEAA-AA840A7919E3}" type="slidenum">
+              <a:rPr lang="en-US" smtClean="0"/>
+              <a:t>4</a:t>
+            </a:fld>
+            <a:endParaRPr lang="en-US"/>
+          </a:p>
+        </p:txBody>
+      </p:sp>
+    </p:spTree>
+    <p:extLst>
+      <p:ext uri="{BB962C8B-B14F-4D97-AF65-F5344CB8AC3E}">
+        <p14:creationId xmlns:p14="http://schemas.microsoft.com/office/powerpoint/2010/main" val="1669430859"/>
+      </p:ext>
+    </p:extLst>
+  </p:cSld>
+  <p:clrMapOvr>
+    <a:masterClrMapping/>
+  </p:clrMapOvr>
+</p:sld>
+</file>
+
+<file path=ppt/slides/slide5.xml><?xml version="1.0" encoding="utf-8"?>
+<p:sld xmlns:a="http://schemas.openxmlformats.org/drawingml/2006/main" xmlns:r="http://schemas.openxmlformats.org/officeDocument/2006/relationships" xmlns:p="http://schemas.openxmlformats.org/presentationml/2006/main">
+  <p:cSld>
+    <p:spTree>
+      <p:nvGrpSpPr>
+        <p:cNvPr id="1" name=""/>
+        <p:cNvGrpSpPr/>
+        <p:nvPr/>
+      </p:nvGrpSpPr>
+      <p:grpSpPr>
+        <a:xfrm>
+          <a:off x="0" y="0"/>
+          <a:ext cx="0" cy="0"/>
+          <a:chOff x="0" y="0"/>
+          <a:chExt cx="0" cy="0"/>
+        </a:xfrm>
+      </p:grpSpPr>
+      <p:sp>
+        <p:nvSpPr>
           <p:cNvPr id="2" name="Title 1">
             <a:extLst>
               <a:ext uri="{FF2B5EF4-FFF2-40B4-BE49-F238E27FC236}">
@@ -9778,7 +10135,7 @@
           <a:p>
             <a:fld id="{ADDE84BC-4FC7-4B69-BEAA-AA840A7919E3}" type="slidenum">
               <a:rPr lang="en-US" smtClean="0"/>
-              <a:t>4</a:t>
+              <a:t>5</a:t>
             </a:fld>
             <a:endParaRPr lang="en-US"/>
           </a:p>
@@ -9972,279 +10329,6 @@
 </p:sld>
 </file>
 
-<file path=ppt/slides/slide5.xml><?xml version="1.0" encoding="utf-8"?>
-<p:sld xmlns:a="http://schemas.openxmlformats.org/drawingml/2006/main" xmlns:r="http://schemas.openxmlformats.org/officeDocument/2006/relationships" xmlns:p="http://schemas.openxmlformats.org/presentationml/2006/main">
-  <p:cSld>
-    <p:spTree>
-      <p:nvGrpSpPr>
-        <p:cNvPr id="1" name=""/>
-        <p:cNvGrpSpPr/>
-        <p:nvPr/>
-      </p:nvGrpSpPr>
-      <p:grpSpPr>
-        <a:xfrm>
-          <a:off x="0" y="0"/>
-          <a:ext cx="0" cy="0"/>
-          <a:chOff x="0" y="0"/>
-          <a:chExt cx="0" cy="0"/>
-        </a:xfrm>
-      </p:grpSpPr>
-      <p:sp>
-        <p:nvSpPr>
-          <p:cNvPr id="2" name="Title 1"/>
-          <p:cNvSpPr>
-            <a:spLocks noGrp="1"/>
-          </p:cNvSpPr>
-          <p:nvPr>
-            <p:ph type="title"/>
-          </p:nvPr>
-        </p:nvSpPr>
-        <p:spPr>
-          <a:xfrm>
-            <a:off x="839788" y="457200"/>
-            <a:ext cx="4483326" cy="1600200"/>
-          </a:xfrm>
-        </p:spPr>
-        <p:txBody>
-          <a:bodyPr>
-            <a:normAutofit/>
-          </a:bodyPr>
-          <a:lstStyle/>
-          <a:p>
-            <a:r>
-              <a:rPr lang="en-US" dirty="0"/>
-              <a:t>Arduino Uno R3</a:t>
-            </a:r>
-          </a:p>
-        </p:txBody>
-      </p:sp>
-      <p:pic>
-        <p:nvPicPr>
-          <p:cNvPr id="8" name="Content Placeholder 7"/>
-          <p:cNvPicPr>
-            <a:picLocks noGrp="1" noChangeAspect="1"/>
-          </p:cNvPicPr>
-          <p:nvPr>
-            <p:ph idx="1"/>
-          </p:nvPr>
-        </p:nvPicPr>
-        <p:blipFill>
-          <a:blip r:embed="rId3">
-            <a:extLst>
-              <a:ext uri="{28A0092B-C50C-407E-A947-70E740481C1C}">
-                <a14:useLocalDpi xmlns:a14="http://schemas.microsoft.com/office/drawing/2010/main" val="0"/>
-              </a:ext>
-            </a:extLst>
-          </a:blip>
-          <a:stretch>
-            <a:fillRect/>
-          </a:stretch>
-        </p:blipFill>
-        <p:spPr>
-          <a:xfrm>
-            <a:off x="5665787" y="1574800"/>
-            <a:ext cx="4762500" cy="3571875"/>
-          </a:xfrm>
-        </p:spPr>
-      </p:pic>
-      <p:sp>
-        <p:nvSpPr>
-          <p:cNvPr id="7" name="Text Placeholder 6"/>
-          <p:cNvSpPr>
-            <a:spLocks noGrp="1"/>
-          </p:cNvSpPr>
-          <p:nvPr>
-            <p:ph type="body" sz="half" idx="2"/>
-          </p:nvPr>
-        </p:nvSpPr>
-        <p:spPr>
-          <a:xfrm>
-            <a:off x="839788" y="2057400"/>
-            <a:ext cx="3206918" cy="3811588"/>
-          </a:xfrm>
-        </p:spPr>
-        <p:txBody>
-          <a:bodyPr>
-            <a:noAutofit/>
-          </a:bodyPr>
-          <a:lstStyle/>
-          <a:p>
-            <a:r>
-              <a:rPr lang="en-US" sz="1600" dirty="0"/>
-              <a:t>The canonical Arduino design</a:t>
-            </a:r>
-          </a:p>
-          <a:p>
-            <a:r>
-              <a:rPr lang="en-US" sz="1600" dirty="0"/>
-              <a:t>Focus is on experimentation and learning</a:t>
-            </a:r>
-          </a:p>
-          <a:p>
-            <a:r>
-              <a:rPr lang="en-US" sz="1600" dirty="0"/>
-              <a:t>A simple, low-cost, small computer</a:t>
-            </a:r>
-          </a:p>
-          <a:p>
-            <a:pPr marL="285750" indent="-285750">
-              <a:buFont typeface="Arial" panose="020B0604020202020204" pitchFamily="34" charset="0"/>
-              <a:buChar char="•"/>
-            </a:pPr>
-            <a:r>
-              <a:rPr lang="en-US" sz="1400" dirty="0"/>
-              <a:t>Genuine: $22, Clone: $11</a:t>
-            </a:r>
-          </a:p>
-          <a:p>
-            <a:pPr marL="285750" indent="-285750">
-              <a:buFont typeface="Arial" panose="020B0604020202020204" pitchFamily="34" charset="0"/>
-              <a:buChar char="•"/>
-            </a:pPr>
-            <a:r>
-              <a:rPr lang="en-US" sz="1400" dirty="0"/>
-              <a:t>Modest processing power (16 </a:t>
-            </a:r>
-            <a:r>
-              <a:rPr lang="en-US" sz="1400" dirty="0" err="1"/>
-              <a:t>Mhz</a:t>
-            </a:r>
-            <a:r>
-              <a:rPr lang="en-US" sz="1400" dirty="0"/>
-              <a:t>)</a:t>
-            </a:r>
-          </a:p>
-          <a:p>
-            <a:pPr marL="285750" indent="-285750">
-              <a:buFont typeface="Arial" panose="020B0604020202020204" pitchFamily="34" charset="0"/>
-              <a:buChar char="•"/>
-            </a:pPr>
-            <a:r>
-              <a:rPr lang="en-US" sz="1400" dirty="0"/>
-              <a:t>Small space for code (32KB)</a:t>
-            </a:r>
-          </a:p>
-          <a:p>
-            <a:pPr marL="285750" indent="-285750">
-              <a:buFont typeface="Arial" panose="020B0604020202020204" pitchFamily="34" charset="0"/>
-              <a:buChar char="•"/>
-            </a:pPr>
-            <a:r>
-              <a:rPr lang="en-US" sz="1400" dirty="0"/>
-              <a:t>Small space for data (2KB)</a:t>
-            </a:r>
-          </a:p>
-          <a:p>
-            <a:pPr marL="285750" indent="-285750">
-              <a:buFont typeface="Arial" panose="020B0604020202020204" pitchFamily="34" charset="0"/>
-              <a:buChar char="•"/>
-            </a:pPr>
-            <a:r>
-              <a:rPr lang="en-US" sz="1400" dirty="0"/>
-              <a:t>Wide range of GPIO connectivity options for devices or circuits</a:t>
-            </a:r>
-          </a:p>
-          <a:p>
-            <a:pPr marL="285750" indent="-285750">
-              <a:buFont typeface="Arial" panose="020B0604020202020204" pitchFamily="34" charset="0"/>
-              <a:buChar char="•"/>
-            </a:pPr>
-            <a:r>
-              <a:rPr lang="en-US" sz="1400" dirty="0"/>
-              <a:t>Easy USB connection and good, free software development environment</a:t>
-            </a:r>
-          </a:p>
-          <a:p>
-            <a:r>
-              <a:rPr lang="en-US" sz="1600" dirty="0"/>
-              <a:t>Huge community of ‘makers’ providing videos, tutorials, examples, projects, devices, advice</a:t>
-            </a:r>
-          </a:p>
-        </p:txBody>
-      </p:sp>
-      <p:sp>
-        <p:nvSpPr>
-          <p:cNvPr id="4" name="Slide Number Placeholder 3">
-            <a:extLst>
-              <a:ext uri="{FF2B5EF4-FFF2-40B4-BE49-F238E27FC236}">
-                <a16:creationId xmlns:a16="http://schemas.microsoft.com/office/drawing/2014/main" id="{525ADA2A-1A32-4BF6-A3DA-634ABCF5687F}"/>
-              </a:ext>
-            </a:extLst>
-          </p:cNvPr>
-          <p:cNvSpPr>
-            <a:spLocks noGrp="1"/>
-          </p:cNvSpPr>
-          <p:nvPr>
-            <p:ph type="sldNum" sz="quarter" idx="12"/>
-          </p:nvPr>
-        </p:nvSpPr>
-        <p:spPr/>
-        <p:txBody>
-          <a:bodyPr/>
-          <a:lstStyle/>
-          <a:p>
-            <a:fld id="{ADDE84BC-4FC7-4B69-BEAA-AA840A7919E3}" type="slidenum">
-              <a:rPr lang="en-US" smtClean="0"/>
-              <a:t>5</a:t>
-            </a:fld>
-            <a:endParaRPr lang="en-US"/>
-          </a:p>
-        </p:txBody>
-      </p:sp>
-      <p:sp>
-        <p:nvSpPr>
-          <p:cNvPr id="9" name="Footer Placeholder 2">
-            <a:extLst>
-              <a:ext uri="{FF2B5EF4-FFF2-40B4-BE49-F238E27FC236}">
-                <a16:creationId xmlns:a16="http://schemas.microsoft.com/office/drawing/2014/main" id="{19DE2255-227A-465B-BD11-A9B273904678}"/>
-              </a:ext>
-            </a:extLst>
-          </p:cNvPr>
-          <p:cNvSpPr>
-            <a:spLocks noGrp="1"/>
-          </p:cNvSpPr>
-          <p:nvPr>
-            <p:ph type="ftr" sz="quarter" idx="11"/>
-          </p:nvPr>
-        </p:nvSpPr>
-        <p:spPr>
-          <a:xfrm>
-            <a:off x="5334000" y="6492875"/>
-            <a:ext cx="4648200" cy="365125"/>
-          </a:xfrm>
-        </p:spPr>
-        <p:txBody>
-          <a:bodyPr/>
-          <a:lstStyle/>
-          <a:p>
-            <a:r>
-              <a:rPr lang="en-US" dirty="0"/>
-              <a:t>Rochester </a:t>
-            </a:r>
-            <a:r>
-              <a:rPr lang="en-US" dirty="0" err="1"/>
-              <a:t>MakerSpace</a:t>
-            </a:r>
-            <a:r>
-              <a:rPr lang="en-US" dirty="0"/>
-              <a:t> 2021</a:t>
-            </a:r>
-          </a:p>
-        </p:txBody>
-      </p:sp>
-    </p:spTree>
-    <p:extLst>
-      <p:ext uri="{BB962C8B-B14F-4D97-AF65-F5344CB8AC3E}">
-        <p14:creationId xmlns:p14="http://schemas.microsoft.com/office/powerpoint/2010/main" val="3944537188"/>
-      </p:ext>
-    </p:extLst>
-  </p:cSld>
-  <p:clrMapOvr>
-    <a:masterClrMapping/>
-  </p:clrMapOvr>
-</p:sld>
-</file>
-
 <file path=ppt/slides/slide6.xml><?xml version="1.0" encoding="utf-8"?>
 <p:sld xmlns:a="http://schemas.openxmlformats.org/drawingml/2006/main" xmlns:r="http://schemas.openxmlformats.org/officeDocument/2006/relationships" xmlns:p="http://schemas.openxmlformats.org/presentationml/2006/main">
   <p:cSld>
@@ -10264,7 +10348,7 @@
       </p:grpSpPr>
       <p:sp>
         <p:nvSpPr>
-          <p:cNvPr id="5" name="Title 4"/>
+          <p:cNvPr id="2" name="Title 1"/>
           <p:cNvSpPr>
             <a:spLocks noGrp="1"/>
           </p:cNvSpPr>
@@ -10272,28 +10356,28 @@
             <p:ph type="title"/>
           </p:nvPr>
         </p:nvSpPr>
-        <p:spPr/>
-        <p:txBody>
-          <a:bodyPr/>
-          <a:lstStyle/>
-          <a:p>
-            <a:r>
-              <a:rPr lang="en-US" dirty="0"/>
-              <a:t>Many Arduino </a:t>
-            </a:r>
-            <a:br>
-              <a:rPr lang="en-US" dirty="0"/>
-            </a:br>
-            <a:r>
-              <a:rPr lang="en-US" dirty="0"/>
-              <a:t>variants</a:t>
+        <p:spPr>
+          <a:xfrm>
+            <a:off x="839788" y="457200"/>
+            <a:ext cx="4483326" cy="1600200"/>
+          </a:xfrm>
+        </p:spPr>
+        <p:txBody>
+          <a:bodyPr>
+            <a:normAutofit/>
+          </a:bodyPr>
+          <a:lstStyle/>
+          <a:p>
+            <a:r>
+              <a:rPr lang="en-US" dirty="0"/>
+              <a:t>Arduino Uno R3</a:t>
             </a:r>
           </a:p>
         </p:txBody>
       </p:sp>
       <p:pic>
         <p:nvPicPr>
-          <p:cNvPr id="9" name="Content Placeholder 8"/>
+          <p:cNvPr id="8" name="Content Placeholder 7"/>
           <p:cNvPicPr>
             <a:picLocks noGrp="1" noChangeAspect="1"/>
           </p:cNvPicPr>
@@ -10302,7 +10386,7 @@
           </p:nvPr>
         </p:nvPicPr>
         <p:blipFill>
-          <a:blip r:embed="rId2" cstate="print">
+          <a:blip r:embed="rId3">
             <a:extLst>
               <a:ext uri="{28A0092B-C50C-407E-A947-70E740481C1C}">
                 <a14:useLocalDpi xmlns:a14="http://schemas.microsoft.com/office/drawing/2010/main" val="0"/>
@@ -10315,8 +10399,8 @@
         </p:blipFill>
         <p:spPr>
           <a:xfrm>
-            <a:off x="3167520" y="457200"/>
-            <a:ext cx="9013370" cy="5633357"/>
+            <a:off x="5665787" y="1574800"/>
+            <a:ext cx="4762500" cy="3571875"/>
           </a:xfrm>
         </p:spPr>
       </p:pic>
@@ -10330,59 +10414,117 @@
             <p:ph type="body" sz="half" idx="2"/>
           </p:nvPr>
         </p:nvSpPr>
-        <p:spPr/>
+        <p:spPr>
+          <a:xfrm>
+            <a:off x="839788" y="2057400"/>
+            <a:ext cx="3206918" cy="3811588"/>
+          </a:xfrm>
+        </p:spPr>
         <p:txBody>
           <a:bodyPr>
-            <a:normAutofit/>
+            <a:noAutofit/>
           </a:bodyPr>
           <a:lstStyle/>
           <a:p>
             <a:r>
-              <a:rPr lang="en-US" sz="2000" dirty="0"/>
-              <a:t>Faster processor</a:t>
-            </a:r>
-          </a:p>
-          <a:p>
-            <a:r>
-              <a:rPr lang="en-US" sz="2000" dirty="0"/>
-              <a:t>Bigger programs</a:t>
-            </a:r>
-          </a:p>
-          <a:p>
-            <a:r>
-              <a:rPr lang="en-US" sz="2000" dirty="0"/>
-              <a:t>More data</a:t>
-            </a:r>
-          </a:p>
-          <a:p>
-            <a:r>
-              <a:rPr lang="en-US" sz="2000" dirty="0"/>
-              <a:t>More pins to connect devices</a:t>
-            </a:r>
-          </a:p>
-          <a:p>
-            <a:r>
-              <a:rPr lang="en-US" sz="2000" dirty="0"/>
-              <a:t>More portable</a:t>
-            </a:r>
-          </a:p>
-          <a:p>
-            <a:r>
-              <a:rPr lang="en-US" sz="2000" dirty="0"/>
-              <a:t>Different form factor</a:t>
-            </a:r>
-          </a:p>
-          <a:p>
-            <a:endParaRPr lang="en-US" sz="2000" dirty="0"/>
-          </a:p>
-        </p:txBody>
-      </p:sp>
-      <p:sp>
-        <p:nvSpPr>
-          <p:cNvPr id="3" name="Slide Number Placeholder 2">
+              <a:rPr lang="en-US" sz="1600" dirty="0"/>
+              <a:t>The canonical Arduino design</a:t>
+            </a:r>
+          </a:p>
+          <a:p>
+            <a:r>
+              <a:rPr lang="en-US" sz="1600" dirty="0"/>
+              <a:t>Focus is on experimentation and learning</a:t>
+            </a:r>
+          </a:p>
+          <a:p>
+            <a:r>
+              <a:rPr lang="en-US" sz="1600" dirty="0"/>
+              <a:t>A simple, low-cost, small computer</a:t>
+            </a:r>
+          </a:p>
+          <a:p>
+            <a:pPr marL="285750" indent="-285750">
+              <a:buFont typeface="Arial" panose="020B0604020202020204" pitchFamily="34" charset="0"/>
+              <a:buChar char="•"/>
+            </a:pPr>
+            <a:r>
+              <a:rPr lang="en-US" sz="1400" dirty="0"/>
+              <a:t>Genuine: $22, Clone: $11</a:t>
+            </a:r>
+          </a:p>
+          <a:p>
+            <a:pPr marL="285750" indent="-285750">
+              <a:buFont typeface="Arial" panose="020B0604020202020204" pitchFamily="34" charset="0"/>
+              <a:buChar char="•"/>
+            </a:pPr>
+            <a:r>
+              <a:rPr lang="en-US" sz="1400" dirty="0"/>
+              <a:t>Modest processing power (16 </a:t>
+            </a:r>
+            <a:r>
+              <a:rPr lang="en-US" sz="1400" dirty="0" err="1"/>
+              <a:t>Mhz</a:t>
+            </a:r>
+            <a:r>
+              <a:rPr lang="en-US" sz="1400" dirty="0"/>
+              <a:t>)</a:t>
+            </a:r>
+          </a:p>
+          <a:p>
+            <a:pPr marL="285750" indent="-285750">
+              <a:buFont typeface="Arial" panose="020B0604020202020204" pitchFamily="34" charset="0"/>
+              <a:buChar char="•"/>
+            </a:pPr>
+            <a:r>
+              <a:rPr lang="en-US" sz="1400" dirty="0"/>
+              <a:t>Small space for code (32KB)</a:t>
+            </a:r>
+          </a:p>
+          <a:p>
+            <a:pPr marL="285750" indent="-285750">
+              <a:buFont typeface="Arial" panose="020B0604020202020204" pitchFamily="34" charset="0"/>
+              <a:buChar char="•"/>
+            </a:pPr>
+            <a:r>
+              <a:rPr lang="en-US" sz="1400" dirty="0"/>
+              <a:t>Small space for data (2KB)</a:t>
+            </a:r>
+          </a:p>
+          <a:p>
+            <a:pPr marL="285750" indent="-285750">
+              <a:buFont typeface="Arial" panose="020B0604020202020204" pitchFamily="34" charset="0"/>
+              <a:buChar char="•"/>
+            </a:pPr>
+            <a:r>
+              <a:rPr lang="en-US" sz="1400" dirty="0"/>
+              <a:t>Wide range of GPIO connectivity options for devices or circuits</a:t>
+            </a:r>
+          </a:p>
+          <a:p>
+            <a:pPr marL="285750" indent="-285750">
+              <a:buFont typeface="Arial" panose="020B0604020202020204" pitchFamily="34" charset="0"/>
+              <a:buChar char="•"/>
+            </a:pPr>
+            <a:r>
+              <a:rPr lang="en-US" sz="1400" dirty="0"/>
+              <a:t>Easy USB connection and good, free software development environment</a:t>
+            </a:r>
+          </a:p>
+          <a:p>
+            <a:r>
+              <a:rPr lang="en-US" sz="1600" dirty="0"/>
+              <a:t>Huge community of ‘makers’ providing videos, tutorials, examples, projects, devices, advice</a:t>
+            </a:r>
+          </a:p>
+        </p:txBody>
+      </p:sp>
+      <p:sp>
+        <p:nvSpPr>
+          <p:cNvPr id="4" name="Slide Number Placeholder 3">
             <a:extLst>
               <a:ext uri="{FF2B5EF4-FFF2-40B4-BE49-F238E27FC236}">
-                <a16:creationId xmlns:a16="http://schemas.microsoft.com/office/drawing/2014/main" id="{EAFBAAD7-5C00-4A81-9238-4C33C87A33F0}"/>
+                <a16:creationId xmlns:a16="http://schemas.microsoft.com/office/drawing/2014/main" id="{525ADA2A-1A32-4BF6-A3DA-634ABCF5687F}"/>
               </a:ext>
             </a:extLst>
           </p:cNvPr>
@@ -10408,10 +10550,10 @@
       </p:sp>
       <p:sp>
         <p:nvSpPr>
-          <p:cNvPr id="8" name="Footer Placeholder 2">
+          <p:cNvPr id="9" name="Footer Placeholder 2">
             <a:extLst>
               <a:ext uri="{FF2B5EF4-FFF2-40B4-BE49-F238E27FC236}">
-                <a16:creationId xmlns:a16="http://schemas.microsoft.com/office/drawing/2014/main" id="{2D8858FB-F3E6-4368-A3E2-20B6B1C387B3}"/>
+                <a16:creationId xmlns:a16="http://schemas.microsoft.com/office/drawing/2014/main" id="{19DE2255-227A-465B-BD11-A9B273904678}"/>
               </a:ext>
             </a:extLst>
           </p:cNvPr>
@@ -10450,7 +10592,7 @@
     </p:spTree>
     <p:extLst>
       <p:ext uri="{BB962C8B-B14F-4D97-AF65-F5344CB8AC3E}">
-        <p14:creationId xmlns:p14="http://schemas.microsoft.com/office/powerpoint/2010/main" val="3454580765"/>
+        <p14:creationId xmlns:p14="http://schemas.microsoft.com/office/powerpoint/2010/main" val="3944537188"/>
       </p:ext>
     </p:extLst>
   </p:cSld>
@@ -10479,6 +10621,221 @@
       </p:grpSpPr>
       <p:sp>
         <p:nvSpPr>
+          <p:cNvPr id="5" name="Title 4"/>
+          <p:cNvSpPr>
+            <a:spLocks noGrp="1"/>
+          </p:cNvSpPr>
+          <p:nvPr>
+            <p:ph type="title"/>
+          </p:nvPr>
+        </p:nvSpPr>
+        <p:spPr/>
+        <p:txBody>
+          <a:bodyPr/>
+          <a:lstStyle/>
+          <a:p>
+            <a:r>
+              <a:rPr lang="en-US" dirty="0"/>
+              <a:t>Many Arduino </a:t>
+            </a:r>
+            <a:br>
+              <a:rPr lang="en-US" dirty="0"/>
+            </a:br>
+            <a:r>
+              <a:rPr lang="en-US" dirty="0"/>
+              <a:t>variants</a:t>
+            </a:r>
+          </a:p>
+        </p:txBody>
+      </p:sp>
+      <p:pic>
+        <p:nvPicPr>
+          <p:cNvPr id="9" name="Content Placeholder 8"/>
+          <p:cNvPicPr>
+            <a:picLocks noGrp="1" noChangeAspect="1"/>
+          </p:cNvPicPr>
+          <p:nvPr>
+            <p:ph idx="1"/>
+          </p:nvPr>
+        </p:nvPicPr>
+        <p:blipFill>
+          <a:blip r:embed="rId2" cstate="print">
+            <a:extLst>
+              <a:ext uri="{28A0092B-C50C-407E-A947-70E740481C1C}">
+                <a14:useLocalDpi xmlns:a14="http://schemas.microsoft.com/office/drawing/2010/main" val="0"/>
+              </a:ext>
+            </a:extLst>
+          </a:blip>
+          <a:stretch>
+            <a:fillRect/>
+          </a:stretch>
+        </p:blipFill>
+        <p:spPr>
+          <a:xfrm>
+            <a:off x="3167520" y="457200"/>
+            <a:ext cx="9013370" cy="5633357"/>
+          </a:xfrm>
+        </p:spPr>
+      </p:pic>
+      <p:sp>
+        <p:nvSpPr>
+          <p:cNvPr id="7" name="Text Placeholder 6"/>
+          <p:cNvSpPr>
+            <a:spLocks noGrp="1"/>
+          </p:cNvSpPr>
+          <p:nvPr>
+            <p:ph type="body" sz="half" idx="2"/>
+          </p:nvPr>
+        </p:nvSpPr>
+        <p:spPr/>
+        <p:txBody>
+          <a:bodyPr>
+            <a:normAutofit/>
+          </a:bodyPr>
+          <a:lstStyle/>
+          <a:p>
+            <a:r>
+              <a:rPr lang="en-US" sz="2000" dirty="0"/>
+              <a:t>Faster processor</a:t>
+            </a:r>
+          </a:p>
+          <a:p>
+            <a:r>
+              <a:rPr lang="en-US" sz="2000" dirty="0"/>
+              <a:t>Bigger programs</a:t>
+            </a:r>
+          </a:p>
+          <a:p>
+            <a:r>
+              <a:rPr lang="en-US" sz="2000" dirty="0"/>
+              <a:t>More data</a:t>
+            </a:r>
+          </a:p>
+          <a:p>
+            <a:r>
+              <a:rPr lang="en-US" sz="2000" dirty="0"/>
+              <a:t>More pins to connect devices</a:t>
+            </a:r>
+          </a:p>
+          <a:p>
+            <a:r>
+              <a:rPr lang="en-US" sz="2000" dirty="0"/>
+              <a:t>More portable</a:t>
+            </a:r>
+          </a:p>
+          <a:p>
+            <a:r>
+              <a:rPr lang="en-US" sz="2000" dirty="0"/>
+              <a:t>Different form factor</a:t>
+            </a:r>
+          </a:p>
+          <a:p>
+            <a:endParaRPr lang="en-US" sz="2000" dirty="0"/>
+          </a:p>
+        </p:txBody>
+      </p:sp>
+      <p:sp>
+        <p:nvSpPr>
+          <p:cNvPr id="3" name="Slide Number Placeholder 2">
+            <a:extLst>
+              <a:ext uri="{FF2B5EF4-FFF2-40B4-BE49-F238E27FC236}">
+                <a16:creationId xmlns:a16="http://schemas.microsoft.com/office/drawing/2014/main" id="{EAFBAAD7-5C00-4A81-9238-4C33C87A33F0}"/>
+              </a:ext>
+            </a:extLst>
+          </p:cNvPr>
+          <p:cNvSpPr>
+            <a:spLocks noGrp="1"/>
+          </p:cNvSpPr>
+          <p:nvPr>
+            <p:ph type="sldNum" sz="quarter" idx="12"/>
+          </p:nvPr>
+        </p:nvSpPr>
+        <p:spPr/>
+        <p:txBody>
+          <a:bodyPr/>
+          <a:lstStyle/>
+          <a:p>
+            <a:fld id="{ADDE84BC-4FC7-4B69-BEAA-AA840A7919E3}" type="slidenum">
+              <a:rPr lang="en-US" smtClean="0"/>
+              <a:t>7</a:t>
+            </a:fld>
+            <a:endParaRPr lang="en-US"/>
+          </a:p>
+        </p:txBody>
+      </p:sp>
+      <p:sp>
+        <p:nvSpPr>
+          <p:cNvPr id="8" name="Footer Placeholder 2">
+            <a:extLst>
+              <a:ext uri="{FF2B5EF4-FFF2-40B4-BE49-F238E27FC236}">
+                <a16:creationId xmlns:a16="http://schemas.microsoft.com/office/drawing/2014/main" id="{2D8858FB-F3E6-4368-A3E2-20B6B1C387B3}"/>
+              </a:ext>
+            </a:extLst>
+          </p:cNvPr>
+          <p:cNvSpPr>
+            <a:spLocks noGrp="1"/>
+          </p:cNvSpPr>
+          <p:nvPr>
+            <p:ph type="ftr" sz="quarter" idx="11"/>
+          </p:nvPr>
+        </p:nvSpPr>
+        <p:spPr>
+          <a:xfrm>
+            <a:off x="5334000" y="6492875"/>
+            <a:ext cx="4648200" cy="365125"/>
+          </a:xfrm>
+        </p:spPr>
+        <p:txBody>
+          <a:bodyPr/>
+          <a:lstStyle/>
+          <a:p>
+            <a:r>
+              <a:rPr lang="en-US" dirty="0"/>
+              <a:t>Rochester </a:t>
+            </a:r>
+            <a:r>
+              <a:rPr lang="en-US" dirty="0" err="1"/>
+              <a:t>MakerSpace</a:t>
+            </a:r>
+            <a:r>
+              <a:rPr lang="en-US" dirty="0"/>
+              <a:t> 2021</a:t>
+            </a:r>
+          </a:p>
+        </p:txBody>
+      </p:sp>
+    </p:spTree>
+    <p:extLst>
+      <p:ext uri="{BB962C8B-B14F-4D97-AF65-F5344CB8AC3E}">
+        <p14:creationId xmlns:p14="http://schemas.microsoft.com/office/powerpoint/2010/main" val="3454580765"/>
+      </p:ext>
+    </p:extLst>
+  </p:cSld>
+  <p:clrMapOvr>
+    <a:masterClrMapping/>
+  </p:clrMapOvr>
+</p:sld>
+</file>
+
+<file path=ppt/slides/slide8.xml><?xml version="1.0" encoding="utf-8"?>
+<p:sld xmlns:a="http://schemas.openxmlformats.org/drawingml/2006/main" xmlns:r="http://schemas.openxmlformats.org/officeDocument/2006/relationships" xmlns:p="http://schemas.openxmlformats.org/presentationml/2006/main">
+  <p:cSld>
+    <p:spTree>
+      <p:nvGrpSpPr>
+        <p:cNvPr id="1" name=""/>
+        <p:cNvGrpSpPr/>
+        <p:nvPr/>
+      </p:nvGrpSpPr>
+      <p:grpSpPr>
+        <a:xfrm>
+          <a:off x="0" y="0"/>
+          <a:ext cx="0" cy="0"/>
+          <a:chOff x="0" y="0"/>
+          <a:chExt cx="0" cy="0"/>
+        </a:xfrm>
+      </p:grpSpPr>
+      <p:sp>
+        <p:nvSpPr>
           <p:cNvPr id="2" name="Title 1">
             <a:extLst>
               <a:ext uri="{FF2B5EF4-FFF2-40B4-BE49-F238E27FC236}">
@@ -10790,7 +11147,7 @@
           <a:p>
             <a:fld id="{ADDE84BC-4FC7-4B69-BEAA-AA840A7919E3}" type="slidenum">
               <a:rPr lang="en-US" smtClean="0"/>
-              <a:t>7</a:t>
+              <a:t>8</a:t>
             </a:fld>
             <a:endParaRPr lang="en-US"/>
           </a:p>
@@ -11139,226 +11496,6 @@
 </p:sld>
 </file>
 
-<file path=ppt/slides/slide8.xml><?xml version="1.0" encoding="utf-8"?>
-<p:sld xmlns:a="http://schemas.openxmlformats.org/drawingml/2006/main" xmlns:r="http://schemas.openxmlformats.org/officeDocument/2006/relationships" xmlns:p="http://schemas.openxmlformats.org/presentationml/2006/main">
-  <p:cSld>
-    <p:spTree>
-      <p:nvGrpSpPr>
-        <p:cNvPr id="1" name=""/>
-        <p:cNvGrpSpPr/>
-        <p:nvPr/>
-      </p:nvGrpSpPr>
-      <p:grpSpPr>
-        <a:xfrm>
-          <a:off x="0" y="0"/>
-          <a:ext cx="0" cy="0"/>
-          <a:chOff x="0" y="0"/>
-          <a:chExt cx="0" cy="0"/>
-        </a:xfrm>
-      </p:grpSpPr>
-      <p:sp>
-        <p:nvSpPr>
-          <p:cNvPr id="2" name="Title 1"/>
-          <p:cNvSpPr>
-            <a:spLocks noGrp="1"/>
-          </p:cNvSpPr>
-          <p:nvPr>
-            <p:ph type="title"/>
-          </p:nvPr>
-        </p:nvSpPr>
-        <p:spPr/>
-        <p:txBody>
-          <a:bodyPr/>
-          <a:lstStyle/>
-          <a:p>
-            <a:r>
-              <a:rPr lang="en-US" dirty="0"/>
-              <a:t>Arduino GPIO</a:t>
-            </a:r>
-          </a:p>
-        </p:txBody>
-      </p:sp>
-      <p:pic>
-        <p:nvPicPr>
-          <p:cNvPr id="5" name="Content Placeholder 4"/>
-          <p:cNvPicPr>
-            <a:picLocks noGrp="1" noChangeAspect="1"/>
-          </p:cNvPicPr>
-          <p:nvPr>
-            <p:ph idx="1"/>
-          </p:nvPr>
-        </p:nvPicPr>
-        <p:blipFill>
-          <a:blip r:embed="rId2">
-            <a:extLst>
-              <a:ext uri="{28A0092B-C50C-407E-A947-70E740481C1C}">
-                <a14:useLocalDpi xmlns:a14="http://schemas.microsoft.com/office/drawing/2010/main" val="0"/>
-              </a:ext>
-            </a:extLst>
-          </a:blip>
-          <a:stretch>
-            <a:fillRect/>
-          </a:stretch>
-        </p:blipFill>
-        <p:spPr>
-          <a:xfrm>
-            <a:off x="4302217" y="751114"/>
-            <a:ext cx="7595222" cy="5117873"/>
-          </a:xfrm>
-        </p:spPr>
-      </p:pic>
-      <p:sp>
-        <p:nvSpPr>
-          <p:cNvPr id="4" name="Text Placeholder 3"/>
-          <p:cNvSpPr>
-            <a:spLocks noGrp="1"/>
-          </p:cNvSpPr>
-          <p:nvPr>
-            <p:ph type="body" sz="half" idx="2"/>
-          </p:nvPr>
-        </p:nvSpPr>
-        <p:spPr/>
-        <p:txBody>
-          <a:bodyPr>
-            <a:normAutofit fontScale="85000" lnSpcReduction="20000"/>
-          </a:bodyPr>
-          <a:lstStyle/>
-          <a:p>
-            <a:r>
-              <a:rPr lang="en-US" sz="2000" dirty="0"/>
-              <a:t>Simple direct connection for digital input and output</a:t>
-            </a:r>
-          </a:p>
-          <a:p>
-            <a:r>
-              <a:rPr lang="en-US" sz="2000" dirty="0"/>
-              <a:t>Simple direct connection for analog input</a:t>
-            </a:r>
-          </a:p>
-          <a:p>
-            <a:r>
-              <a:rPr lang="en-US" sz="2000" dirty="0"/>
-              <a:t>Onboard pulse width modulation (PWM)</a:t>
-            </a:r>
-          </a:p>
-          <a:p>
-            <a:r>
-              <a:rPr lang="en-US" sz="2000" dirty="0"/>
-              <a:t>4 ways to connect to other chips:</a:t>
-            </a:r>
-          </a:p>
-          <a:p>
-            <a:r>
-              <a:rPr lang="en-US" sz="2000" dirty="0"/>
-              <a:t>GPIO – Digital I/O or Analog Input</a:t>
-            </a:r>
-          </a:p>
-          <a:p>
-            <a:r>
-              <a:rPr lang="en-US" sz="2000" dirty="0"/>
-              <a:t>I2C – Inter-Integrated-Circuit</a:t>
-            </a:r>
-          </a:p>
-          <a:p>
-            <a:r>
-              <a:rPr lang="en-US" sz="2000" dirty="0"/>
-              <a:t>SPI – Serial Peripheral Interface</a:t>
-            </a:r>
-          </a:p>
-          <a:p>
-            <a:r>
-              <a:rPr lang="en-US" sz="2000" dirty="0"/>
-              <a:t>Serial – asynchronous serial</a:t>
-            </a:r>
-          </a:p>
-          <a:p>
-            <a:endParaRPr lang="en-US" sz="2000" dirty="0"/>
-          </a:p>
-        </p:txBody>
-      </p:sp>
-      <p:sp>
-        <p:nvSpPr>
-          <p:cNvPr id="6" name="Slide Number Placeholder 5">
-            <a:extLst>
-              <a:ext uri="{FF2B5EF4-FFF2-40B4-BE49-F238E27FC236}">
-                <a16:creationId xmlns:a16="http://schemas.microsoft.com/office/drawing/2014/main" id="{7030B9E2-7975-43BC-BCE7-5F3D33D9074F}"/>
-              </a:ext>
-            </a:extLst>
-          </p:cNvPr>
-          <p:cNvSpPr>
-            <a:spLocks noGrp="1"/>
-          </p:cNvSpPr>
-          <p:nvPr>
-            <p:ph type="sldNum" sz="quarter" idx="12"/>
-          </p:nvPr>
-        </p:nvSpPr>
-        <p:spPr/>
-        <p:txBody>
-          <a:bodyPr/>
-          <a:lstStyle/>
-          <a:p>
-            <a:fld id="{ADDE84BC-4FC7-4B69-BEAA-AA840A7919E3}" type="slidenum">
-              <a:rPr lang="en-US" smtClean="0"/>
-              <a:t>8</a:t>
-            </a:fld>
-            <a:endParaRPr lang="en-US"/>
-          </a:p>
-        </p:txBody>
-      </p:sp>
-      <p:sp>
-        <p:nvSpPr>
-          <p:cNvPr id="7" name="Footer Placeholder 2">
-            <a:extLst>
-              <a:ext uri="{FF2B5EF4-FFF2-40B4-BE49-F238E27FC236}">
-                <a16:creationId xmlns:a16="http://schemas.microsoft.com/office/drawing/2014/main" id="{9DD7AE80-FC64-4E6B-90D8-B501BAF76339}"/>
-              </a:ext>
-            </a:extLst>
-          </p:cNvPr>
-          <p:cNvSpPr>
-            <a:spLocks noGrp="1"/>
-          </p:cNvSpPr>
-          <p:nvPr>
-            <p:ph type="ftr" sz="quarter" idx="11"/>
-          </p:nvPr>
-        </p:nvSpPr>
-        <p:spPr>
-          <a:xfrm>
-            <a:off x="5334000" y="6492875"/>
-            <a:ext cx="4648200" cy="365125"/>
-          </a:xfrm>
-        </p:spPr>
-        <p:txBody>
-          <a:bodyPr/>
-          <a:lstStyle/>
-          <a:p>
-            <a:r>
-              <a:rPr lang="en-US" dirty="0"/>
-              <a:t>Rochester </a:t>
-            </a:r>
-            <a:r>
-              <a:rPr lang="en-US" dirty="0" err="1"/>
-              <a:t>MakerSpace</a:t>
-            </a:r>
-            <a:r>
-              <a:rPr lang="en-US" dirty="0"/>
-              <a:t> 2021</a:t>
-            </a:r>
-          </a:p>
-        </p:txBody>
-      </p:sp>
-    </p:spTree>
-    <p:extLst>
-      <p:ext uri="{BB962C8B-B14F-4D97-AF65-F5344CB8AC3E}">
-        <p14:creationId xmlns:p14="http://schemas.microsoft.com/office/powerpoint/2010/main" val="2971879341"/>
-      </p:ext>
-    </p:extLst>
-  </p:cSld>
-  <p:clrMapOvr>
-    <a:masterClrMapping/>
-  </p:clrMapOvr>
-</p:sld>
-</file>
-
 <file path=ppt/slides/slide9.xml><?xml version="1.0" encoding="utf-8"?>
 <p:sld xmlns:a="http://schemas.openxmlformats.org/drawingml/2006/main" xmlns:r="http://schemas.openxmlformats.org/officeDocument/2006/relationships" xmlns:p="http://schemas.openxmlformats.org/presentationml/2006/main">
   <p:cSld>
@@ -11378,7 +11515,7 @@
       </p:grpSpPr>
       <p:sp>
         <p:nvSpPr>
-          <p:cNvPr id="5" name="Title 4"/>
+          <p:cNvPr id="2" name="Title 1"/>
           <p:cNvSpPr>
             <a:spLocks noGrp="1"/>
           </p:cNvSpPr>
@@ -11393,120 +11530,20 @@
           <a:p>
             <a:r>
               <a:rPr lang="en-US" dirty="0"/>
-              <a:t>I2C</a:t>
-            </a:r>
-          </a:p>
-        </p:txBody>
-      </p:sp>
-      <p:sp>
-        <p:nvSpPr>
-          <p:cNvPr id="6" name="Content Placeholder 5"/>
-          <p:cNvSpPr>
-            <a:spLocks noGrp="1"/>
-          </p:cNvSpPr>
-          <p:nvPr>
-            <p:ph idx="1"/>
-          </p:nvPr>
-        </p:nvSpPr>
-        <p:spPr/>
-        <p:txBody>
-          <a:bodyPr/>
-          <a:lstStyle/>
-          <a:p>
-            <a:r>
-              <a:rPr lang="en-US" dirty="0"/>
-              <a:t>I²C ( Inter-Integrated Circuit ), pronounced I-squared-C , is a synchronous , multi-master, multi-slave , packet switched , single-ended , serial computer bus invented in 1982 by Philips Semiconductor (now NXP Semiconductors ). It is widely used for attaching lower-speed peripheral ICs to processors and microcontrollers in short-distance, intra-board communication. Alternatively I²C is spelled I2C (pronounced I-two-C) or IIC (pronounced I-I-C).</a:t>
-            </a:r>
-          </a:p>
-          <a:p>
-            <a:pPr marL="0" indent="0">
-              <a:buNone/>
-            </a:pPr>
-            <a:r>
-              <a:rPr lang="en-US" dirty="0"/>
-              <a:t>								Wikipedia</a:t>
-            </a:r>
-          </a:p>
-        </p:txBody>
-      </p:sp>
-      <p:sp>
-        <p:nvSpPr>
-          <p:cNvPr id="2" name="Footer Placeholder 1">
-            <a:extLst>
-              <a:ext uri="{FF2B5EF4-FFF2-40B4-BE49-F238E27FC236}">
-                <a16:creationId xmlns:a16="http://schemas.microsoft.com/office/drawing/2014/main" id="{D4B7E5A5-76BD-4285-96A4-A5DB195F83D6}"/>
-              </a:ext>
-            </a:extLst>
-          </p:cNvPr>
-          <p:cNvSpPr>
-            <a:spLocks noGrp="1"/>
-          </p:cNvSpPr>
-          <p:nvPr>
-            <p:ph type="ftr" sz="quarter" idx="11"/>
-          </p:nvPr>
-        </p:nvSpPr>
-        <p:spPr/>
-        <p:txBody>
-          <a:bodyPr/>
-          <a:lstStyle/>
-          <a:p>
-            <a:r>
-              <a:rPr lang="en-US" dirty="0"/>
-              <a:t>Rochester </a:t>
-            </a:r>
-            <a:r>
-              <a:rPr lang="en-US" dirty="0" err="1"/>
-              <a:t>MakerSpace</a:t>
-            </a:r>
-            <a:r>
-              <a:rPr lang="en-US" dirty="0"/>
-              <a:t> 2021</a:t>
-            </a:r>
-          </a:p>
-        </p:txBody>
-      </p:sp>
-      <p:sp>
-        <p:nvSpPr>
-          <p:cNvPr id="3" name="Slide Number Placeholder 2">
-            <a:extLst>
-              <a:ext uri="{FF2B5EF4-FFF2-40B4-BE49-F238E27FC236}">
-                <a16:creationId xmlns:a16="http://schemas.microsoft.com/office/drawing/2014/main" id="{F8F509E3-8B64-4169-96B6-2028505F61DB}"/>
-              </a:ext>
-            </a:extLst>
-          </p:cNvPr>
-          <p:cNvSpPr>
-            <a:spLocks noGrp="1"/>
-          </p:cNvSpPr>
-          <p:nvPr>
-            <p:ph type="sldNum" sz="quarter" idx="12"/>
-          </p:nvPr>
-        </p:nvSpPr>
-        <p:spPr/>
-        <p:txBody>
-          <a:bodyPr/>
-          <a:lstStyle/>
-          <a:p>
-            <a:fld id="{ADDE84BC-4FC7-4B69-BEAA-AA840A7919E3}" type="slidenum">
-              <a:rPr lang="en-US" smtClean="0"/>
-              <a:t>9</a:t>
-            </a:fld>
-            <a:endParaRPr lang="en-US"/>
+              <a:t>Arduino GPIO</a:t>
+            </a:r>
           </a:p>
         </p:txBody>
       </p:sp>
       <p:pic>
         <p:nvPicPr>
-          <p:cNvPr id="7" name="Picture 6">
-            <a:extLst>
-              <a:ext uri="{FF2B5EF4-FFF2-40B4-BE49-F238E27FC236}">
-                <a16:creationId xmlns:a16="http://schemas.microsoft.com/office/drawing/2014/main" id="{AEE8F0F6-01E6-4F6D-88B9-E419E370DA89}"/>
-              </a:ext>
-            </a:extLst>
-          </p:cNvPr>
+          <p:cNvPr id="5" name="Content Placeholder 4"/>
           <p:cNvPicPr>
-            <a:picLocks noChangeAspect="1"/>
+            <a:picLocks noGrp="1" noChangeAspect="1"/>
           </p:cNvPicPr>
-          <p:nvPr/>
+          <p:nvPr>
+            <p:ph idx="1"/>
+          </p:nvPr>
         </p:nvPicPr>
         <p:blipFill>
           <a:blip r:embed="rId2">
@@ -11522,18 +11559,154 @@
         </p:blipFill>
         <p:spPr>
           <a:xfrm>
-            <a:off x="2538128" y="3693437"/>
-            <a:ext cx="4067743" cy="2095792"/>
+            <a:off x="4302217" y="751114"/>
+            <a:ext cx="7595222" cy="5117873"/>
           </a:xfrm>
-          <a:prstGeom prst="rect">
-            <a:avLst/>
-          </a:prstGeom>
         </p:spPr>
       </p:pic>
+      <p:sp>
+        <p:nvSpPr>
+          <p:cNvPr id="4" name="Text Placeholder 3"/>
+          <p:cNvSpPr>
+            <a:spLocks noGrp="1"/>
+          </p:cNvSpPr>
+          <p:nvPr>
+            <p:ph type="body" sz="half" idx="2"/>
+          </p:nvPr>
+        </p:nvSpPr>
+        <p:spPr/>
+        <p:txBody>
+          <a:bodyPr>
+            <a:normAutofit fontScale="85000" lnSpcReduction="20000"/>
+          </a:bodyPr>
+          <a:lstStyle/>
+          <a:p>
+            <a:r>
+              <a:rPr lang="en-US" sz="2000" dirty="0"/>
+              <a:t>Simple direct connection for digital input and output</a:t>
+            </a:r>
+          </a:p>
+          <a:p>
+            <a:r>
+              <a:rPr lang="en-US" sz="2000" dirty="0"/>
+              <a:t>Simple direct connection for analog input</a:t>
+            </a:r>
+          </a:p>
+          <a:p>
+            <a:r>
+              <a:rPr lang="en-US" sz="2000" dirty="0"/>
+              <a:t>Onboard pulse width modulation (PWM)</a:t>
+            </a:r>
+          </a:p>
+          <a:p>
+            <a:r>
+              <a:rPr lang="en-US" sz="2000" dirty="0"/>
+              <a:t>4 ways to connect to other chips:</a:t>
+            </a:r>
+          </a:p>
+          <a:p>
+            <a:r>
+              <a:rPr lang="en-US" sz="2000" dirty="0"/>
+              <a:t>GPIO – Digital I/O or Analog Input</a:t>
+            </a:r>
+          </a:p>
+          <a:p>
+            <a:r>
+              <a:rPr lang="en-US" sz="2000" dirty="0"/>
+              <a:t>I2C – Inter-Integrated-Circuit</a:t>
+            </a:r>
+          </a:p>
+          <a:p>
+            <a:r>
+              <a:rPr lang="en-US" sz="2000" dirty="0"/>
+              <a:t>SPI – Serial Peripheral Interface</a:t>
+            </a:r>
+          </a:p>
+          <a:p>
+            <a:r>
+              <a:rPr lang="en-US" sz="2000" dirty="0"/>
+              <a:t>Serial – asynchronous serial</a:t>
+            </a:r>
+          </a:p>
+          <a:p>
+            <a:endParaRPr lang="en-US" sz="2000" dirty="0"/>
+          </a:p>
+        </p:txBody>
+      </p:sp>
+      <p:sp>
+        <p:nvSpPr>
+          <p:cNvPr id="6" name="Slide Number Placeholder 5">
+            <a:extLst>
+              <a:ext uri="{FF2B5EF4-FFF2-40B4-BE49-F238E27FC236}">
+                <a16:creationId xmlns:a16="http://schemas.microsoft.com/office/drawing/2014/main" id="{7030B9E2-7975-43BC-BCE7-5F3D33D9074F}"/>
+              </a:ext>
+            </a:extLst>
+          </p:cNvPr>
+          <p:cNvSpPr>
+            <a:spLocks noGrp="1"/>
+          </p:cNvSpPr>
+          <p:nvPr>
+            <p:ph type="sldNum" sz="quarter" idx="12"/>
+          </p:nvPr>
+        </p:nvSpPr>
+        <p:spPr/>
+        <p:txBody>
+          <a:bodyPr/>
+          <a:lstStyle/>
+          <a:p>
+            <a:fld id="{ADDE84BC-4FC7-4B69-BEAA-AA840A7919E3}" type="slidenum">
+              <a:rPr lang="en-US" smtClean="0"/>
+              <a:t>9</a:t>
+            </a:fld>
+            <a:endParaRPr lang="en-US"/>
+          </a:p>
+        </p:txBody>
+      </p:sp>
+      <p:sp>
+        <p:nvSpPr>
+          <p:cNvPr id="7" name="Footer Placeholder 2">
+            <a:extLst>
+              <a:ext uri="{FF2B5EF4-FFF2-40B4-BE49-F238E27FC236}">
+                <a16:creationId xmlns:a16="http://schemas.microsoft.com/office/drawing/2014/main" id="{9DD7AE80-FC64-4E6B-90D8-B501BAF76339}"/>
+              </a:ext>
+            </a:extLst>
+          </p:cNvPr>
+          <p:cNvSpPr>
+            <a:spLocks noGrp="1"/>
+          </p:cNvSpPr>
+          <p:nvPr>
+            <p:ph type="ftr" sz="quarter" idx="11"/>
+          </p:nvPr>
+        </p:nvSpPr>
+        <p:spPr>
+          <a:xfrm>
+            <a:off x="5334000" y="6492875"/>
+            <a:ext cx="4648200" cy="365125"/>
+          </a:xfrm>
+        </p:spPr>
+        <p:txBody>
+          <a:bodyPr/>
+          <a:lstStyle/>
+          <a:p>
+            <a:r>
+              <a:rPr lang="en-US" dirty="0"/>
+              <a:t>Rochester </a:t>
+            </a:r>
+            <a:r>
+              <a:rPr lang="en-US" dirty="0" err="1"/>
+              <a:t>MakerSpace</a:t>
+            </a:r>
+            <a:r>
+              <a:rPr lang="en-US" dirty="0"/>
+              <a:t> 2021</a:t>
+            </a:r>
+          </a:p>
+        </p:txBody>
+      </p:sp>
     </p:spTree>
     <p:extLst>
       <p:ext uri="{BB962C8B-B14F-4D97-AF65-F5344CB8AC3E}">
-        <p14:creationId xmlns:p14="http://schemas.microsoft.com/office/powerpoint/2010/main" val="2826264457"/>
+        <p14:creationId xmlns:p14="http://schemas.microsoft.com/office/powerpoint/2010/main" val="2971879341"/>
       </p:ext>
     </p:extLst>
   </p:cSld>

</xml_diff>

<commit_message>
Added 4-pin push button drawing
</commit_message>
<xml_diff>
--- a/docs/Introduction to Arduino.pptx
+++ b/docs/Introduction to Arduino.pptx
@@ -728,7 +728,7 @@
           <a:p>
             <a:fld id="{4A861C55-573A-4575-87D0-721189A62B1A}" type="datetimeFigureOut">
               <a:rPr lang="en-US" smtClean="0"/>
-              <a:t>10/14/2021</a:t>
+              <a:t>1/30/2022</a:t>
             </a:fld>
             <a:endParaRPr lang="en-US"/>
           </a:p>
@@ -1737,7 +1737,7 @@
           <a:p>
             <a:fld id="{535A6ECC-B47E-4333-AF56-7D6B53A728C1}" type="datetime1">
               <a:rPr lang="en-US" smtClean="0"/>
-              <a:t>10/14/2021</a:t>
+              <a:t>1/30/2022</a:t>
             </a:fld>
             <a:endParaRPr lang="en-US"/>
           </a:p>
@@ -1948,7 +1948,7 @@
           <a:p>
             <a:fld id="{3AC83308-0B1A-4095-AE48-6FD04CA62E2F}" type="datetime1">
               <a:rPr lang="en-US" smtClean="0"/>
-              <a:t>10/14/2021</a:t>
+              <a:t>1/30/2022</a:t>
             </a:fld>
             <a:endParaRPr lang="en-US"/>
           </a:p>
@@ -2207,7 +2207,7 @@
           <a:p>
             <a:fld id="{28B83625-5325-4108-BA4A-8AEA791FA3D9}" type="datetime1">
               <a:rPr lang="en-US" smtClean="0"/>
-              <a:t>10/14/2021</a:t>
+              <a:t>1/30/2022</a:t>
             </a:fld>
             <a:endParaRPr lang="en-US"/>
           </a:p>
@@ -2384,7 +2384,7 @@
           <a:p>
             <a:fld id="{DFE20814-A8AC-4A12-AC2A-0C83C165F5B0}" type="datetime1">
               <a:rPr lang="en-US" smtClean="0"/>
-              <a:t>10/14/2021</a:t>
+              <a:t>1/30/2022</a:t>
             </a:fld>
             <a:endParaRPr lang="en-US"/>
           </a:p>
@@ -2730,7 +2730,7 @@
           <a:p>
             <a:fld id="{8FFEFE8B-BC27-47B1-A2BC-08723A697AC2}" type="datetime1">
               <a:rPr lang="en-US" smtClean="0"/>
-              <a:t>10/14/2021</a:t>
+              <a:t>1/30/2022</a:t>
             </a:fld>
             <a:endParaRPr lang="en-US"/>
           </a:p>
@@ -3008,7 +3008,7 @@
           <a:p>
             <a:fld id="{1552D9A3-B737-42EF-8E68-5E109E88E2B3}" type="datetime1">
               <a:rPr lang="en-US" smtClean="0"/>
-              <a:t>10/14/2021</a:t>
+              <a:t>1/30/2022</a:t>
             </a:fld>
             <a:endParaRPr lang="en-US"/>
           </a:p>
@@ -3390,7 +3390,7 @@
           <a:p>
             <a:fld id="{8A10665B-4C1B-49BA-8463-A1FAD4616F0A}" type="datetime1">
               <a:rPr lang="en-US" smtClean="0"/>
-              <a:t>10/14/2021</a:t>
+              <a:t>1/30/2022</a:t>
             </a:fld>
             <a:endParaRPr lang="en-US"/>
           </a:p>
@@ -3511,7 +3511,7 @@
           <a:p>
             <a:fld id="{ED7C0A16-7385-4340-A364-F0ABD84FB76E}" type="datetime1">
               <a:rPr lang="en-US" smtClean="0"/>
-              <a:t>10/14/2021</a:t>
+              <a:t>1/30/2022</a:t>
             </a:fld>
             <a:endParaRPr lang="en-US"/>
           </a:p>
@@ -3685,7 +3685,7 @@
           <a:p>
             <a:fld id="{70DD088D-CD95-400F-B449-841C3EF2C34D}" type="datetime1">
               <a:rPr lang="en-US" smtClean="0"/>
-              <a:t>10/14/2021</a:t>
+              <a:t>1/30/2022</a:t>
             </a:fld>
             <a:endParaRPr lang="en-US"/>
           </a:p>
@@ -4042,7 +4042,7 @@
           <a:p>
             <a:fld id="{8DADA382-CFF3-4E38-B3B0-A0A9802453AA}" type="datetime1">
               <a:rPr lang="en-US" smtClean="0"/>
-              <a:t>10/14/2021</a:t>
+              <a:t>1/30/2022</a:t>
             </a:fld>
             <a:endParaRPr lang="en-US"/>
           </a:p>
@@ -4427,7 +4427,7 @@
           <a:p>
             <a:fld id="{494878A2-9AA6-4CED-BB30-45870680D252}" type="datetime1">
               <a:rPr lang="en-US" smtClean="0"/>
-              <a:t>10/14/2021</a:t>
+              <a:t>1/30/2022</a:t>
             </a:fld>
             <a:endParaRPr lang="en-US"/>
           </a:p>
@@ -4715,7 +4715,7 @@
           <a:p>
             <a:fld id="{D3EE4551-0335-48B6-85FF-7403C6145F24}" type="datetime1">
               <a:rPr lang="en-US" smtClean="0"/>
-              <a:t>10/14/2021</a:t>
+              <a:t>1/30/2022</a:t>
             </a:fld>
             <a:endParaRPr lang="en-US"/>
           </a:p>
@@ -5386,7 +5386,7 @@
           <p:cNvPr id="2" name="Footer Placeholder 1">
             <a:extLst>
               <a:ext uri="{FF2B5EF4-FFF2-40B4-BE49-F238E27FC236}">
-                <a16:creationId xmlns:a16="http://schemas.microsoft.com/office/drawing/2014/main" id="{D4B7E5A5-76BD-4285-96A4-A5DB195F83D6}"/>
+                <a16:creationId xmlns:a16="http://schemas.microsoft.com/office/drawing/2014/main" xmlns="" id="{D4B7E5A5-76BD-4285-96A4-A5DB195F83D6}"/>
               </a:ext>
             </a:extLst>
           </p:cNvPr>
@@ -5422,7 +5422,7 @@
           <p:cNvPr id="3" name="Slide Number Placeholder 2">
             <a:extLst>
               <a:ext uri="{FF2B5EF4-FFF2-40B4-BE49-F238E27FC236}">
-                <a16:creationId xmlns:a16="http://schemas.microsoft.com/office/drawing/2014/main" id="{F8F509E3-8B64-4169-96B6-2028505F61DB}"/>
+                <a16:creationId xmlns:a16="http://schemas.microsoft.com/office/drawing/2014/main" xmlns="" id="{F8F509E3-8B64-4169-96B6-2028505F61DB}"/>
               </a:ext>
             </a:extLst>
           </p:cNvPr>
@@ -5451,7 +5451,7 @@
           <p:cNvPr id="7" name="Picture 6">
             <a:extLst>
               <a:ext uri="{FF2B5EF4-FFF2-40B4-BE49-F238E27FC236}">
-                <a16:creationId xmlns:a16="http://schemas.microsoft.com/office/drawing/2014/main" id="{AEE8F0F6-01E6-4F6D-88B9-E419E370DA89}"/>
+                <a16:creationId xmlns:a16="http://schemas.microsoft.com/office/drawing/2014/main" xmlns="" id="{AEE8F0F6-01E6-4F6D-88B9-E419E370DA89}"/>
               </a:ext>
             </a:extLst>
           </p:cNvPr>
@@ -5693,7 +5693,7 @@
           <p:cNvPr id="3" name="Footer Placeholder 2">
             <a:extLst>
               <a:ext uri="{FF2B5EF4-FFF2-40B4-BE49-F238E27FC236}">
-                <a16:creationId xmlns:a16="http://schemas.microsoft.com/office/drawing/2014/main" id="{48C4A1CF-FF80-4DE4-8EB5-86ED3EE2F475}"/>
+                <a16:creationId xmlns:a16="http://schemas.microsoft.com/office/drawing/2014/main" xmlns="" id="{48C4A1CF-FF80-4DE4-8EB5-86ED3EE2F475}"/>
               </a:ext>
             </a:extLst>
           </p:cNvPr>
@@ -5729,7 +5729,7 @@
           <p:cNvPr id="5" name="Slide Number Placeholder 4">
             <a:extLst>
               <a:ext uri="{FF2B5EF4-FFF2-40B4-BE49-F238E27FC236}">
-                <a16:creationId xmlns:a16="http://schemas.microsoft.com/office/drawing/2014/main" id="{3B9BC356-196E-435E-9C24-CF5477F3BB51}"/>
+                <a16:creationId xmlns:a16="http://schemas.microsoft.com/office/drawing/2014/main" xmlns="" id="{3B9BC356-196E-435E-9C24-CF5477F3BB51}"/>
               </a:ext>
             </a:extLst>
           </p:cNvPr>
@@ -5942,7 +5942,7 @@
           <p:cNvPr id="3" name="Footer Placeholder 2">
             <a:extLst>
               <a:ext uri="{FF2B5EF4-FFF2-40B4-BE49-F238E27FC236}">
-                <a16:creationId xmlns:a16="http://schemas.microsoft.com/office/drawing/2014/main" id="{95F1DFC8-6304-4C78-908A-2A63585769F2}"/>
+                <a16:creationId xmlns:a16="http://schemas.microsoft.com/office/drawing/2014/main" xmlns="" id="{95F1DFC8-6304-4C78-908A-2A63585769F2}"/>
               </a:ext>
             </a:extLst>
           </p:cNvPr>
@@ -5983,7 +5983,7 @@
           <p:cNvPr id="6" name="Slide Number Placeholder 5">
             <a:extLst>
               <a:ext uri="{FF2B5EF4-FFF2-40B4-BE49-F238E27FC236}">
-                <a16:creationId xmlns:a16="http://schemas.microsoft.com/office/drawing/2014/main" id="{B1A9E0C2-2740-45D4-BF11-BC4381CD561A}"/>
+                <a16:creationId xmlns:a16="http://schemas.microsoft.com/office/drawing/2014/main" xmlns="" id="{B1A9E0C2-2740-45D4-BF11-BC4381CD561A}"/>
               </a:ext>
             </a:extLst>
           </p:cNvPr>
@@ -6178,7 +6178,7 @@
           <p:cNvPr id="3" name="Footer Placeholder 2">
             <a:extLst>
               <a:ext uri="{FF2B5EF4-FFF2-40B4-BE49-F238E27FC236}">
-                <a16:creationId xmlns:a16="http://schemas.microsoft.com/office/drawing/2014/main" id="{95F1DFC8-6304-4C78-908A-2A63585769F2}"/>
+                <a16:creationId xmlns:a16="http://schemas.microsoft.com/office/drawing/2014/main" xmlns="" id="{95F1DFC8-6304-4C78-908A-2A63585769F2}"/>
               </a:ext>
             </a:extLst>
           </p:cNvPr>
@@ -6219,7 +6219,7 @@
           <p:cNvPr id="6" name="Slide Number Placeholder 5">
             <a:extLst>
               <a:ext uri="{FF2B5EF4-FFF2-40B4-BE49-F238E27FC236}">
-                <a16:creationId xmlns:a16="http://schemas.microsoft.com/office/drawing/2014/main" id="{B1A9E0C2-2740-45D4-BF11-BC4381CD561A}"/>
+                <a16:creationId xmlns:a16="http://schemas.microsoft.com/office/drawing/2014/main" xmlns="" id="{B1A9E0C2-2740-45D4-BF11-BC4381CD561A}"/>
               </a:ext>
             </a:extLst>
           </p:cNvPr>
@@ -6248,7 +6248,7 @@
           <p:cNvPr id="10" name="Content Placeholder 9">
             <a:extLst>
               <a:ext uri="{FF2B5EF4-FFF2-40B4-BE49-F238E27FC236}">
-                <a16:creationId xmlns:a16="http://schemas.microsoft.com/office/drawing/2014/main" id="{4CD1844F-0F52-4DCD-8185-684503BA3A82}"/>
+                <a16:creationId xmlns:a16="http://schemas.microsoft.com/office/drawing/2014/main" xmlns="" id="{4CD1844F-0F52-4DCD-8185-684503BA3A82}"/>
               </a:ext>
             </a:extLst>
           </p:cNvPr>
@@ -6313,7 +6313,7 @@
           <p:cNvPr id="2050" name="Picture 2" descr="schematic">
             <a:extLst>
               <a:ext uri="{FF2B5EF4-FFF2-40B4-BE49-F238E27FC236}">
-                <a16:creationId xmlns:a16="http://schemas.microsoft.com/office/drawing/2014/main" id="{5757557D-2E6D-4D98-87A6-77A4C336D2ED}"/>
+                <a16:creationId xmlns:a16="http://schemas.microsoft.com/office/drawing/2014/main" xmlns="" id="{5757557D-2E6D-4D98-87A6-77A4C336D2ED}"/>
               </a:ext>
             </a:extLst>
           </p:cNvPr>
@@ -6360,7 +6360,7 @@
           <p:cNvPr id="2054" name="Picture 6" descr="circuit">
             <a:extLst>
               <a:ext uri="{FF2B5EF4-FFF2-40B4-BE49-F238E27FC236}">
-                <a16:creationId xmlns:a16="http://schemas.microsoft.com/office/drawing/2014/main" id="{13417C9B-BDB5-4F37-BD0B-3A6CE3FA88B4}"/>
+                <a16:creationId xmlns:a16="http://schemas.microsoft.com/office/drawing/2014/main" xmlns="" id="{13417C9B-BDB5-4F37-BD0B-3A6CE3FA88B4}"/>
               </a:ext>
             </a:extLst>
           </p:cNvPr>
@@ -6409,7 +6409,7 @@
           <p:cNvPr id="2" name="Title 1">
             <a:extLst>
               <a:ext uri="{FF2B5EF4-FFF2-40B4-BE49-F238E27FC236}">
-                <a16:creationId xmlns:a16="http://schemas.microsoft.com/office/drawing/2014/main" id="{998F3781-8AFE-42CB-881D-5F921B9B91E7}"/>
+                <a16:creationId xmlns:a16="http://schemas.microsoft.com/office/drawing/2014/main" xmlns="" id="{998F3781-8AFE-42CB-881D-5F921B9B91E7}"/>
               </a:ext>
             </a:extLst>
           </p:cNvPr>
@@ -6437,7 +6437,7 @@
           <p:cNvPr id="4" name="Text Placeholder 3">
             <a:extLst>
               <a:ext uri="{FF2B5EF4-FFF2-40B4-BE49-F238E27FC236}">
-                <a16:creationId xmlns:a16="http://schemas.microsoft.com/office/drawing/2014/main" id="{21E16F2C-5A42-4369-A418-B58976047D88}"/>
+                <a16:creationId xmlns:a16="http://schemas.microsoft.com/office/drawing/2014/main" xmlns="" id="{21E16F2C-5A42-4369-A418-B58976047D88}"/>
               </a:ext>
             </a:extLst>
           </p:cNvPr>
@@ -6488,7 +6488,7 @@
           <p:cNvPr id="5" name="Footer Placeholder 4">
             <a:extLst>
               <a:ext uri="{FF2B5EF4-FFF2-40B4-BE49-F238E27FC236}">
-                <a16:creationId xmlns:a16="http://schemas.microsoft.com/office/drawing/2014/main" id="{2DCCB6F3-B709-4DA9-8218-4F6D4A9ABCD0}"/>
+                <a16:creationId xmlns:a16="http://schemas.microsoft.com/office/drawing/2014/main" xmlns="" id="{2DCCB6F3-B709-4DA9-8218-4F6D4A9ABCD0}"/>
               </a:ext>
             </a:extLst>
           </p:cNvPr>
@@ -6524,7 +6524,7 @@
           <p:cNvPr id="6" name="Slide Number Placeholder 5">
             <a:extLst>
               <a:ext uri="{FF2B5EF4-FFF2-40B4-BE49-F238E27FC236}">
-                <a16:creationId xmlns:a16="http://schemas.microsoft.com/office/drawing/2014/main" id="{DF176D15-EE8B-4F6E-AA27-FE3D06D7805D}"/>
+                <a16:creationId xmlns:a16="http://schemas.microsoft.com/office/drawing/2014/main" xmlns="" id="{DF176D15-EE8B-4F6E-AA27-FE3D06D7805D}"/>
               </a:ext>
             </a:extLst>
           </p:cNvPr>
@@ -6553,7 +6553,7 @@
           <p:cNvPr id="9" name="TextBox 8">
             <a:extLst>
               <a:ext uri="{FF2B5EF4-FFF2-40B4-BE49-F238E27FC236}">
-                <a16:creationId xmlns:a16="http://schemas.microsoft.com/office/drawing/2014/main" id="{D6FFB91E-0679-44EB-A8F3-21F6146487E1}"/>
+                <a16:creationId xmlns:a16="http://schemas.microsoft.com/office/drawing/2014/main" xmlns="" id="{D6FFB91E-0679-44EB-A8F3-21F6146487E1}"/>
               </a:ext>
             </a:extLst>
           </p:cNvPr>
@@ -6674,7 +6674,7 @@
           <p:cNvPr id="4" name="Footer Placeholder 3">
             <a:extLst>
               <a:ext uri="{FF2B5EF4-FFF2-40B4-BE49-F238E27FC236}">
-                <a16:creationId xmlns:a16="http://schemas.microsoft.com/office/drawing/2014/main" id="{4FCB6260-4EB3-4A30-815F-5BC5D7FF33A0}"/>
+                <a16:creationId xmlns:a16="http://schemas.microsoft.com/office/drawing/2014/main" xmlns="" id="{4FCB6260-4EB3-4A30-815F-5BC5D7FF33A0}"/>
               </a:ext>
             </a:extLst>
           </p:cNvPr>
@@ -6710,7 +6710,7 @@
           <p:cNvPr id="5" name="Slide Number Placeholder 4">
             <a:extLst>
               <a:ext uri="{FF2B5EF4-FFF2-40B4-BE49-F238E27FC236}">
-                <a16:creationId xmlns:a16="http://schemas.microsoft.com/office/drawing/2014/main" id="{E12CFC6C-6991-446E-9917-14CB670D3BB0}"/>
+                <a16:creationId xmlns:a16="http://schemas.microsoft.com/office/drawing/2014/main" xmlns="" id="{E12CFC6C-6991-446E-9917-14CB670D3BB0}"/>
               </a:ext>
             </a:extLst>
           </p:cNvPr>
@@ -6739,7 +6739,7 @@
           <p:cNvPr id="9" name="Picture 8">
             <a:extLst>
               <a:ext uri="{FF2B5EF4-FFF2-40B4-BE49-F238E27FC236}">
-                <a16:creationId xmlns:a16="http://schemas.microsoft.com/office/drawing/2014/main" id="{453DC37A-7FDB-42A0-AC27-285336F54446}"/>
+                <a16:creationId xmlns:a16="http://schemas.microsoft.com/office/drawing/2014/main" xmlns="" id="{453DC37A-7FDB-42A0-AC27-285336F54446}"/>
               </a:ext>
             </a:extLst>
           </p:cNvPr>
@@ -6775,7 +6775,7 @@
           <p:cNvPr id="7" name="Picture 6">
             <a:extLst>
               <a:ext uri="{FF2B5EF4-FFF2-40B4-BE49-F238E27FC236}">
-                <a16:creationId xmlns:a16="http://schemas.microsoft.com/office/drawing/2014/main" id="{BACB029E-6741-427D-AA2F-7C2A634DFFC7}"/>
+                <a16:creationId xmlns:a16="http://schemas.microsoft.com/office/drawing/2014/main" xmlns="" id="{BACB029E-6741-427D-AA2F-7C2A634DFFC7}"/>
               </a:ext>
             </a:extLst>
           </p:cNvPr>
@@ -6841,7 +6841,7 @@
           <p:cNvPr id="1030" name="Picture 6" descr="schematic">
             <a:extLst>
               <a:ext uri="{FF2B5EF4-FFF2-40B4-BE49-F238E27FC236}">
-                <a16:creationId xmlns:a16="http://schemas.microsoft.com/office/drawing/2014/main" id="{16BA0BB2-ACB7-439C-AD0D-FC29ADC79642}"/>
+                <a16:creationId xmlns:a16="http://schemas.microsoft.com/office/drawing/2014/main" xmlns="" id="{16BA0BB2-ACB7-439C-AD0D-FC29ADC79642}"/>
               </a:ext>
             </a:extLst>
           </p:cNvPr>
@@ -6865,7 +6865,7 @@
         </p:blipFill>
         <p:spPr bwMode="auto">
           <a:xfrm>
-            <a:off x="5424978" y="3671311"/>
+            <a:off x="6644077" y="3429349"/>
             <a:ext cx="5537200" cy="3114675"/>
           </a:xfrm>
           <a:prstGeom prst="rect">
@@ -6888,7 +6888,7 @@
           <p:cNvPr id="2" name="Title 1">
             <a:extLst>
               <a:ext uri="{FF2B5EF4-FFF2-40B4-BE49-F238E27FC236}">
-                <a16:creationId xmlns:a16="http://schemas.microsoft.com/office/drawing/2014/main" id="{998F3781-8AFE-42CB-881D-5F921B9B91E7}"/>
+                <a16:creationId xmlns:a16="http://schemas.microsoft.com/office/drawing/2014/main" xmlns="" id="{998F3781-8AFE-42CB-881D-5F921B9B91E7}"/>
               </a:ext>
             </a:extLst>
           </p:cNvPr>
@@ -6916,7 +6916,7 @@
           <p:cNvPr id="4" name="Text Placeholder 3">
             <a:extLst>
               <a:ext uri="{FF2B5EF4-FFF2-40B4-BE49-F238E27FC236}">
-                <a16:creationId xmlns:a16="http://schemas.microsoft.com/office/drawing/2014/main" id="{21E16F2C-5A42-4369-A418-B58976047D88}"/>
+                <a16:creationId xmlns:a16="http://schemas.microsoft.com/office/drawing/2014/main" xmlns="" id="{21E16F2C-5A42-4369-A418-B58976047D88}"/>
               </a:ext>
             </a:extLst>
           </p:cNvPr>
@@ -6972,7 +6972,7 @@
           <p:cNvPr id="5" name="Footer Placeholder 4">
             <a:extLst>
               <a:ext uri="{FF2B5EF4-FFF2-40B4-BE49-F238E27FC236}">
-                <a16:creationId xmlns:a16="http://schemas.microsoft.com/office/drawing/2014/main" id="{2DCCB6F3-B709-4DA9-8218-4F6D4A9ABCD0}"/>
+                <a16:creationId xmlns:a16="http://schemas.microsoft.com/office/drawing/2014/main" xmlns="" id="{2DCCB6F3-B709-4DA9-8218-4F6D4A9ABCD0}"/>
               </a:ext>
             </a:extLst>
           </p:cNvPr>
@@ -7008,7 +7008,7 @@
           <p:cNvPr id="6" name="Slide Number Placeholder 5">
             <a:extLst>
               <a:ext uri="{FF2B5EF4-FFF2-40B4-BE49-F238E27FC236}">
-                <a16:creationId xmlns:a16="http://schemas.microsoft.com/office/drawing/2014/main" id="{DF176D15-EE8B-4F6E-AA27-FE3D06D7805D}"/>
+                <a16:creationId xmlns:a16="http://schemas.microsoft.com/office/drawing/2014/main" xmlns="" id="{DF176D15-EE8B-4F6E-AA27-FE3D06D7805D}"/>
               </a:ext>
             </a:extLst>
           </p:cNvPr>
@@ -7037,7 +7037,7 @@
           <p:cNvPr id="1026" name="Picture 2" descr="circuit">
             <a:extLst>
               <a:ext uri="{FF2B5EF4-FFF2-40B4-BE49-F238E27FC236}">
-                <a16:creationId xmlns:a16="http://schemas.microsoft.com/office/drawing/2014/main" id="{D9A2F3E9-7A5B-4B22-9B46-CE420F0C71D3}"/>
+                <a16:creationId xmlns:a16="http://schemas.microsoft.com/office/drawing/2014/main" xmlns="" id="{D9A2F3E9-7A5B-4B22-9B46-CE420F0C71D3}"/>
               </a:ext>
             </a:extLst>
           </p:cNvPr>
@@ -7086,7 +7086,7 @@
           <p:cNvPr id="10" name="TextBox 9">
             <a:extLst>
               <a:ext uri="{FF2B5EF4-FFF2-40B4-BE49-F238E27FC236}">
-                <a16:creationId xmlns:a16="http://schemas.microsoft.com/office/drawing/2014/main" id="{D17FE2B8-6090-4777-B9CF-DB3E9428C164}"/>
+                <a16:creationId xmlns:a16="http://schemas.microsoft.com/office/drawing/2014/main" xmlns="" id="{D17FE2B8-6090-4777-B9CF-DB3E9428C164}"/>
               </a:ext>
             </a:extLst>
           </p:cNvPr>
@@ -7116,6 +7116,47 @@
           </a:p>
         </p:txBody>
       </p:sp>
+      <p:pic>
+        <p:nvPicPr>
+          <p:cNvPr id="2050" name="Picture 2" descr="Push Button Pinout/Connections"/>
+          <p:cNvPicPr>
+            <a:picLocks noChangeAspect="1" noChangeArrowheads="1" noCrop="1"/>
+          </p:cNvPicPr>
+          <p:nvPr/>
+        </p:nvPicPr>
+        <p:blipFill>
+          <a:blip r:embed="rId4">
+            <a:extLst>
+              <a:ext uri="{28A0092B-C50C-407E-A947-70E740481C1C}">
+                <a14:useLocalDpi xmlns:a14="http://schemas.microsoft.com/office/drawing/2010/main" val="0"/>
+              </a:ext>
+            </a:extLst>
+          </a:blip>
+          <a:srcRect/>
+          <a:stretch>
+            <a:fillRect/>
+          </a:stretch>
+        </p:blipFill>
+        <p:spPr bwMode="auto">
+          <a:xfrm>
+            <a:off x="4643284" y="4143849"/>
+            <a:ext cx="3104293" cy="1906037"/>
+          </a:xfrm>
+          <a:prstGeom prst="rect">
+            <a:avLst/>
+          </a:prstGeom>
+          <a:noFill/>
+          <a:extLst>
+            <a:ext uri="{909E8E84-426E-40DD-AFC4-6F175D3DCCD1}">
+              <a14:hiddenFill xmlns:a14="http://schemas.microsoft.com/office/drawing/2010/main">
+                <a:solidFill>
+                  <a:srgbClr val="FFFFFF"/>
+                </a:solidFill>
+              </a14:hiddenFill>
+            </a:ext>
+          </a:extLst>
+        </p:spPr>
+      </p:pic>
     </p:spTree>
     <p:extLst>
       <p:ext uri="{BB962C8B-B14F-4D97-AF65-F5344CB8AC3E}">
@@ -7151,7 +7192,7 @@
           <p:cNvPr id="4100" name="Picture 4" descr="simplefade pin9 schem">
             <a:extLst>
               <a:ext uri="{FF2B5EF4-FFF2-40B4-BE49-F238E27FC236}">
-                <a16:creationId xmlns:a16="http://schemas.microsoft.com/office/drawing/2014/main" id="{8FC6803B-09BF-4A76-97C2-E96CB223890D}"/>
+                <a16:creationId xmlns:a16="http://schemas.microsoft.com/office/drawing/2014/main" xmlns="" id="{8FC6803B-09BF-4A76-97C2-E96CB223890D}"/>
               </a:ext>
             </a:extLst>
           </p:cNvPr>
@@ -7198,7 +7239,7 @@
           <p:cNvPr id="2" name="Title 1">
             <a:extLst>
               <a:ext uri="{FF2B5EF4-FFF2-40B4-BE49-F238E27FC236}">
-                <a16:creationId xmlns:a16="http://schemas.microsoft.com/office/drawing/2014/main" id="{998F3781-8AFE-42CB-881D-5F921B9B91E7}"/>
+                <a16:creationId xmlns:a16="http://schemas.microsoft.com/office/drawing/2014/main" xmlns="" id="{998F3781-8AFE-42CB-881D-5F921B9B91E7}"/>
               </a:ext>
             </a:extLst>
           </p:cNvPr>
@@ -7226,7 +7267,7 @@
           <p:cNvPr id="4" name="Text Placeholder 3">
             <a:extLst>
               <a:ext uri="{FF2B5EF4-FFF2-40B4-BE49-F238E27FC236}">
-                <a16:creationId xmlns:a16="http://schemas.microsoft.com/office/drawing/2014/main" id="{21E16F2C-5A42-4369-A418-B58976047D88}"/>
+                <a16:creationId xmlns:a16="http://schemas.microsoft.com/office/drawing/2014/main" xmlns="" id="{21E16F2C-5A42-4369-A418-B58976047D88}"/>
               </a:ext>
             </a:extLst>
           </p:cNvPr>
@@ -7282,7 +7323,7 @@
           <p:cNvPr id="5" name="Footer Placeholder 4">
             <a:extLst>
               <a:ext uri="{FF2B5EF4-FFF2-40B4-BE49-F238E27FC236}">
-                <a16:creationId xmlns:a16="http://schemas.microsoft.com/office/drawing/2014/main" id="{2DCCB6F3-B709-4DA9-8218-4F6D4A9ABCD0}"/>
+                <a16:creationId xmlns:a16="http://schemas.microsoft.com/office/drawing/2014/main" xmlns="" id="{2DCCB6F3-B709-4DA9-8218-4F6D4A9ABCD0}"/>
               </a:ext>
             </a:extLst>
           </p:cNvPr>
@@ -7318,7 +7359,7 @@
           <p:cNvPr id="6" name="Slide Number Placeholder 5">
             <a:extLst>
               <a:ext uri="{FF2B5EF4-FFF2-40B4-BE49-F238E27FC236}">
-                <a16:creationId xmlns:a16="http://schemas.microsoft.com/office/drawing/2014/main" id="{DF176D15-EE8B-4F6E-AA27-FE3D06D7805D}"/>
+                <a16:creationId xmlns:a16="http://schemas.microsoft.com/office/drawing/2014/main" xmlns="" id="{DF176D15-EE8B-4F6E-AA27-FE3D06D7805D}"/>
               </a:ext>
             </a:extLst>
           </p:cNvPr>
@@ -7347,7 +7388,7 @@
           <p:cNvPr id="4098" name="Picture 2" descr="simplefade bb">
             <a:extLst>
               <a:ext uri="{FF2B5EF4-FFF2-40B4-BE49-F238E27FC236}">
-                <a16:creationId xmlns:a16="http://schemas.microsoft.com/office/drawing/2014/main" id="{F33044D7-109E-4823-AE80-741891D923F8}"/>
+                <a16:creationId xmlns:a16="http://schemas.microsoft.com/office/drawing/2014/main" xmlns="" id="{F33044D7-109E-4823-AE80-741891D923F8}"/>
               </a:ext>
             </a:extLst>
           </p:cNvPr>
@@ -7482,7 +7523,7 @@
           <p:cNvPr id="4" name="Footer Placeholder 3">
             <a:extLst>
               <a:ext uri="{FF2B5EF4-FFF2-40B4-BE49-F238E27FC236}">
-                <a16:creationId xmlns:a16="http://schemas.microsoft.com/office/drawing/2014/main" id="{4FCB6260-4EB3-4A30-815F-5BC5D7FF33A0}"/>
+                <a16:creationId xmlns:a16="http://schemas.microsoft.com/office/drawing/2014/main" xmlns="" id="{4FCB6260-4EB3-4A30-815F-5BC5D7FF33A0}"/>
               </a:ext>
             </a:extLst>
           </p:cNvPr>
@@ -7518,7 +7559,7 @@
           <p:cNvPr id="5" name="Slide Number Placeholder 4">
             <a:extLst>
               <a:ext uri="{FF2B5EF4-FFF2-40B4-BE49-F238E27FC236}">
-                <a16:creationId xmlns:a16="http://schemas.microsoft.com/office/drawing/2014/main" id="{E12CFC6C-6991-446E-9917-14CB670D3BB0}"/>
+                <a16:creationId xmlns:a16="http://schemas.microsoft.com/office/drawing/2014/main" xmlns="" id="{E12CFC6C-6991-446E-9917-14CB670D3BB0}"/>
               </a:ext>
             </a:extLst>
           </p:cNvPr>
@@ -7547,7 +7588,7 @@
           <p:cNvPr id="7" name="Picture 6">
             <a:extLst>
               <a:ext uri="{FF2B5EF4-FFF2-40B4-BE49-F238E27FC236}">
-                <a16:creationId xmlns:a16="http://schemas.microsoft.com/office/drawing/2014/main" id="{E48E6F72-14F0-4724-9720-27E0EE261B85}"/>
+                <a16:creationId xmlns:a16="http://schemas.microsoft.com/office/drawing/2014/main" xmlns="" id="{E48E6F72-14F0-4724-9720-27E0EE261B85}"/>
               </a:ext>
             </a:extLst>
           </p:cNvPr>
@@ -7613,7 +7654,7 @@
           <p:cNvPr id="3076" name="Picture 4" descr="schematic">
             <a:extLst>
               <a:ext uri="{FF2B5EF4-FFF2-40B4-BE49-F238E27FC236}">
-                <a16:creationId xmlns:a16="http://schemas.microsoft.com/office/drawing/2014/main" id="{178A6D75-393F-4822-AA6E-2ACE36EFE737}"/>
+                <a16:creationId xmlns:a16="http://schemas.microsoft.com/office/drawing/2014/main" xmlns="" id="{178A6D75-393F-4822-AA6E-2ACE36EFE737}"/>
               </a:ext>
             </a:extLst>
           </p:cNvPr>
@@ -7637,7 +7678,7 @@
         </p:blipFill>
         <p:spPr bwMode="auto">
           <a:xfrm>
-            <a:off x="5515418" y="3569864"/>
+            <a:off x="6375178" y="3607696"/>
             <a:ext cx="5706033" cy="3209644"/>
           </a:xfrm>
           <a:prstGeom prst="rect">
@@ -7660,7 +7701,7 @@
           <p:cNvPr id="2" name="Title 1">
             <a:extLst>
               <a:ext uri="{FF2B5EF4-FFF2-40B4-BE49-F238E27FC236}">
-                <a16:creationId xmlns:a16="http://schemas.microsoft.com/office/drawing/2014/main" id="{998F3781-8AFE-42CB-881D-5F921B9B91E7}"/>
+                <a16:creationId xmlns:a16="http://schemas.microsoft.com/office/drawing/2014/main" xmlns="" id="{998F3781-8AFE-42CB-881D-5F921B9B91E7}"/>
               </a:ext>
             </a:extLst>
           </p:cNvPr>
@@ -7688,7 +7729,7 @@
           <p:cNvPr id="4" name="Text Placeholder 3">
             <a:extLst>
               <a:ext uri="{FF2B5EF4-FFF2-40B4-BE49-F238E27FC236}">
-                <a16:creationId xmlns:a16="http://schemas.microsoft.com/office/drawing/2014/main" id="{21E16F2C-5A42-4369-A418-B58976047D88}"/>
+                <a16:creationId xmlns:a16="http://schemas.microsoft.com/office/drawing/2014/main" xmlns="" id="{21E16F2C-5A42-4369-A418-B58976047D88}"/>
               </a:ext>
             </a:extLst>
           </p:cNvPr>
@@ -7706,7 +7747,9 @@
           </a:xfrm>
         </p:spPr>
         <p:txBody>
-          <a:bodyPr/>
+          <a:bodyPr>
+            <a:normAutofit fontScale="92500" lnSpcReduction="10000"/>
+          </a:bodyPr>
           <a:lstStyle/>
           <a:p>
             <a:r>
@@ -7735,12 +7778,79 @@
             </a:pPr>
             <a:r>
               <a:rPr lang="en-US" dirty="0"/>
-              <a:t>Experiment: convert to use the 3.3v pin</a:t>
-            </a:r>
-          </a:p>
-          <a:p>
+              <a:t>Experiment: convert to use the 3.3v </a:t>
+            </a:r>
+            <a:r>
+              <a:rPr lang="en-US" dirty="0" smtClean="0"/>
+              <a:t>pin</a:t>
+            </a:r>
+          </a:p>
+          <a:p>
+            <a:pPr marL="285750" indent="-285750">
+              <a:buFont typeface="Arial" panose="020B0604020202020204" pitchFamily="34" charset="0"/>
+              <a:buChar char="•"/>
+            </a:pPr>
+            <a:r>
+              <a:rPr lang="en-US" dirty="0" smtClean="0"/>
+              <a:t>Use function to convert sensor value to voltage:</a:t>
+            </a:r>
+          </a:p>
+          <a:p>
+            <a:pPr marL="285750" indent="-285750">
+              <a:buFont typeface="Arial" panose="020B0604020202020204" pitchFamily="34" charset="0"/>
+              <a:buChar char="•"/>
+            </a:pPr>
+            <a:r>
+              <a:rPr lang="en-US" dirty="0" smtClean="0"/>
+              <a:t>float </a:t>
+            </a:r>
+            <a:r>
+              <a:rPr lang="en-US" dirty="0" err="1" smtClean="0"/>
+              <a:t>SensorToVoltage</a:t>
+            </a:r>
+            <a:r>
+              <a:rPr lang="en-US" dirty="0" smtClean="0"/>
+              <a:t>(</a:t>
+            </a:r>
+            <a:r>
+              <a:rPr lang="en-US" dirty="0" err="1" smtClean="0"/>
+              <a:t>int</a:t>
+            </a:r>
+            <a:r>
+              <a:rPr lang="en-US" dirty="0" smtClean="0"/>
+              <a:t> sensor)</a:t>
+            </a:r>
+          </a:p>
+          <a:p>
+            <a:r>
+              <a:rPr lang="en-US" dirty="0"/>
+              <a:t> </a:t>
+            </a:r>
+            <a:r>
+              <a:rPr lang="en-US" dirty="0" smtClean="0"/>
+              <a:t>     {</a:t>
+            </a:r>
+          </a:p>
+          <a:p>
+            <a:r>
+              <a:rPr lang="en-US" dirty="0"/>
+              <a:t> </a:t>
+            </a:r>
+            <a:r>
+              <a:rPr lang="en-US" dirty="0" smtClean="0"/>
+              <a:t>         return sensor * (5.0/1023.0);</a:t>
+            </a:r>
+          </a:p>
+          <a:p>
+            <a:r>
+              <a:rPr lang="en-US" dirty="0" smtClean="0"/>
+              <a:t>      }</a:t>
+            </a:r>
             <a:endParaRPr lang="en-US" dirty="0"/>
           </a:p>
+          <a:p>
+            <a:endParaRPr lang="en-US" dirty="0"/>
+          </a:p>
         </p:txBody>
       </p:sp>
       <p:sp>
@@ -7748,7 +7858,7 @@
           <p:cNvPr id="5" name="Footer Placeholder 4">
             <a:extLst>
               <a:ext uri="{FF2B5EF4-FFF2-40B4-BE49-F238E27FC236}">
-                <a16:creationId xmlns:a16="http://schemas.microsoft.com/office/drawing/2014/main" id="{2DCCB6F3-B709-4DA9-8218-4F6D4A9ABCD0}"/>
+                <a16:creationId xmlns:a16="http://schemas.microsoft.com/office/drawing/2014/main" xmlns="" id="{2DCCB6F3-B709-4DA9-8218-4F6D4A9ABCD0}"/>
               </a:ext>
             </a:extLst>
           </p:cNvPr>
@@ -7784,7 +7894,7 @@
           <p:cNvPr id="6" name="Slide Number Placeholder 5">
             <a:extLst>
               <a:ext uri="{FF2B5EF4-FFF2-40B4-BE49-F238E27FC236}">
-                <a16:creationId xmlns:a16="http://schemas.microsoft.com/office/drawing/2014/main" id="{DF176D15-EE8B-4F6E-AA27-FE3D06D7805D}"/>
+                <a16:creationId xmlns:a16="http://schemas.microsoft.com/office/drawing/2014/main" xmlns="" id="{DF176D15-EE8B-4F6E-AA27-FE3D06D7805D}"/>
               </a:ext>
             </a:extLst>
           </p:cNvPr>
@@ -7813,7 +7923,7 @@
           <p:cNvPr id="3074" name="Picture 2" descr="circuit">
             <a:extLst>
               <a:ext uri="{FF2B5EF4-FFF2-40B4-BE49-F238E27FC236}">
-                <a16:creationId xmlns:a16="http://schemas.microsoft.com/office/drawing/2014/main" id="{C07445C4-18B7-4890-9E25-23083A1274C0}"/>
+                <a16:creationId xmlns:a16="http://schemas.microsoft.com/office/drawing/2014/main" xmlns="" id="{C07445C4-18B7-4890-9E25-23083A1274C0}"/>
               </a:ext>
             </a:extLst>
           </p:cNvPr>
@@ -7841,6 +7951,47 @@
           <a:xfrm>
             <a:off x="4671752" y="0"/>
             <a:ext cx="7064999" cy="3974062"/>
+          </a:xfrm>
+          <a:prstGeom prst="rect">
+            <a:avLst/>
+          </a:prstGeom>
+          <a:noFill/>
+          <a:extLst>
+            <a:ext uri="{909E8E84-426E-40DD-AFC4-6F175D3DCCD1}">
+              <a14:hiddenFill xmlns:a14="http://schemas.microsoft.com/office/drawing/2010/main">
+                <a:solidFill>
+                  <a:srgbClr val="FFFFFF"/>
+                </a:solidFill>
+              </a14:hiddenFill>
+            </a:ext>
+          </a:extLst>
+        </p:spPr>
+      </p:pic>
+      <p:pic>
+        <p:nvPicPr>
+          <p:cNvPr id="1026" name="Picture 2" descr="Push Button Pinout/Connections"/>
+          <p:cNvPicPr>
+            <a:picLocks noChangeAspect="1" noChangeArrowheads="1" noCrop="1"/>
+          </p:cNvPicPr>
+          <p:nvPr/>
+        </p:nvPicPr>
+        <p:blipFill>
+          <a:blip r:embed="rId4">
+            <a:extLst>
+              <a:ext uri="{28A0092B-C50C-407E-A947-70E740481C1C}">
+                <a14:useLocalDpi xmlns:a14="http://schemas.microsoft.com/office/drawing/2010/main" val="0"/>
+              </a:ext>
+            </a:extLst>
+          </a:blip>
+          <a:srcRect/>
+          <a:stretch>
+            <a:fillRect/>
+          </a:stretch>
+        </p:blipFill>
+        <p:spPr bwMode="auto">
+          <a:xfrm>
+            <a:off x="4896465" y="4497772"/>
+            <a:ext cx="2328162" cy="1429492"/>
           </a:xfrm>
           <a:prstGeom prst="rect">
             <a:avLst/>
@@ -8000,7 +8151,7 @@
           <p:cNvPr id="4" name="Footer Placeholder 3">
             <a:extLst>
               <a:ext uri="{FF2B5EF4-FFF2-40B4-BE49-F238E27FC236}">
-                <a16:creationId xmlns:a16="http://schemas.microsoft.com/office/drawing/2014/main" id="{3B8AE874-E26C-4127-8064-81B41BF731D9}"/>
+                <a16:creationId xmlns:a16="http://schemas.microsoft.com/office/drawing/2014/main" xmlns="" id="{3B8AE874-E26C-4127-8064-81B41BF731D9}"/>
               </a:ext>
             </a:extLst>
           </p:cNvPr>
@@ -8036,7 +8187,7 @@
           <p:cNvPr id="5" name="Slide Number Placeholder 4">
             <a:extLst>
               <a:ext uri="{FF2B5EF4-FFF2-40B4-BE49-F238E27FC236}">
-                <a16:creationId xmlns:a16="http://schemas.microsoft.com/office/drawing/2014/main" id="{32BA1D67-5A2F-4DA7-A8E0-FA788D26B5A5}"/>
+                <a16:creationId xmlns:a16="http://schemas.microsoft.com/office/drawing/2014/main" xmlns="" id="{32BA1D67-5A2F-4DA7-A8E0-FA788D26B5A5}"/>
               </a:ext>
             </a:extLst>
           </p:cNvPr>
@@ -8095,7 +8246,7 @@
           <p:cNvPr id="2" name="Title 1">
             <a:extLst>
               <a:ext uri="{FF2B5EF4-FFF2-40B4-BE49-F238E27FC236}">
-                <a16:creationId xmlns:a16="http://schemas.microsoft.com/office/drawing/2014/main" id="{998F3781-8AFE-42CB-881D-5F921B9B91E7}"/>
+                <a16:creationId xmlns:a16="http://schemas.microsoft.com/office/drawing/2014/main" xmlns="" id="{998F3781-8AFE-42CB-881D-5F921B9B91E7}"/>
               </a:ext>
             </a:extLst>
           </p:cNvPr>
@@ -8123,7 +8274,7 @@
           <p:cNvPr id="4" name="Text Placeholder 3">
             <a:extLst>
               <a:ext uri="{FF2B5EF4-FFF2-40B4-BE49-F238E27FC236}">
-                <a16:creationId xmlns:a16="http://schemas.microsoft.com/office/drawing/2014/main" id="{21E16F2C-5A42-4369-A418-B58976047D88}"/>
+                <a16:creationId xmlns:a16="http://schemas.microsoft.com/office/drawing/2014/main" xmlns="" id="{21E16F2C-5A42-4369-A418-B58976047D88}"/>
               </a:ext>
             </a:extLst>
           </p:cNvPr>
@@ -8187,7 +8338,7 @@
           <p:cNvPr id="5" name="Footer Placeholder 4">
             <a:extLst>
               <a:ext uri="{FF2B5EF4-FFF2-40B4-BE49-F238E27FC236}">
-                <a16:creationId xmlns:a16="http://schemas.microsoft.com/office/drawing/2014/main" id="{2DCCB6F3-B709-4DA9-8218-4F6D4A9ABCD0}"/>
+                <a16:creationId xmlns:a16="http://schemas.microsoft.com/office/drawing/2014/main" xmlns="" id="{2DCCB6F3-B709-4DA9-8218-4F6D4A9ABCD0}"/>
               </a:ext>
             </a:extLst>
           </p:cNvPr>
@@ -8223,7 +8374,7 @@
           <p:cNvPr id="6" name="Slide Number Placeholder 5">
             <a:extLst>
               <a:ext uri="{FF2B5EF4-FFF2-40B4-BE49-F238E27FC236}">
-                <a16:creationId xmlns:a16="http://schemas.microsoft.com/office/drawing/2014/main" id="{DF176D15-EE8B-4F6E-AA27-FE3D06D7805D}"/>
+                <a16:creationId xmlns:a16="http://schemas.microsoft.com/office/drawing/2014/main" xmlns="" id="{DF176D15-EE8B-4F6E-AA27-FE3D06D7805D}"/>
               </a:ext>
             </a:extLst>
           </p:cNvPr>
@@ -8252,7 +8403,7 @@
           <p:cNvPr id="5122" name="Picture 2" descr="sweep bb">
             <a:extLst>
               <a:ext uri="{FF2B5EF4-FFF2-40B4-BE49-F238E27FC236}">
-                <a16:creationId xmlns:a16="http://schemas.microsoft.com/office/drawing/2014/main" id="{7C539F1B-FC79-470B-83F8-FD4C73D7B9CA}"/>
+                <a16:creationId xmlns:a16="http://schemas.microsoft.com/office/drawing/2014/main" xmlns="" id="{7C539F1B-FC79-470B-83F8-FD4C73D7B9CA}"/>
               </a:ext>
             </a:extLst>
           </p:cNvPr>
@@ -8301,7 +8452,7 @@
           <p:cNvPr id="5124" name="Picture 4" descr="sweep schem">
             <a:extLst>
               <a:ext uri="{FF2B5EF4-FFF2-40B4-BE49-F238E27FC236}">
-                <a16:creationId xmlns:a16="http://schemas.microsoft.com/office/drawing/2014/main" id="{21713AEE-48CE-4B13-9C76-F4E2BBEF3AEE}"/>
+                <a16:creationId xmlns:a16="http://schemas.microsoft.com/office/drawing/2014/main" xmlns="" id="{21713AEE-48CE-4B13-9C76-F4E2BBEF3AEE}"/>
               </a:ext>
             </a:extLst>
           </p:cNvPr>
@@ -8405,7 +8556,7 @@
           <p:cNvPr id="4" name="Footer Placeholder 3">
             <a:extLst>
               <a:ext uri="{FF2B5EF4-FFF2-40B4-BE49-F238E27FC236}">
-                <a16:creationId xmlns:a16="http://schemas.microsoft.com/office/drawing/2014/main" id="{4FCB6260-4EB3-4A30-815F-5BC5D7FF33A0}"/>
+                <a16:creationId xmlns:a16="http://schemas.microsoft.com/office/drawing/2014/main" xmlns="" id="{4FCB6260-4EB3-4A30-815F-5BC5D7FF33A0}"/>
               </a:ext>
             </a:extLst>
           </p:cNvPr>
@@ -8441,7 +8592,7 @@
           <p:cNvPr id="5" name="Slide Number Placeholder 4">
             <a:extLst>
               <a:ext uri="{FF2B5EF4-FFF2-40B4-BE49-F238E27FC236}">
-                <a16:creationId xmlns:a16="http://schemas.microsoft.com/office/drawing/2014/main" id="{E12CFC6C-6991-446E-9917-14CB670D3BB0}"/>
+                <a16:creationId xmlns:a16="http://schemas.microsoft.com/office/drawing/2014/main" xmlns="" id="{E12CFC6C-6991-446E-9917-14CB670D3BB0}"/>
               </a:ext>
             </a:extLst>
           </p:cNvPr>
@@ -8470,7 +8621,7 @@
           <p:cNvPr id="8" name="Picture 7">
             <a:extLst>
               <a:ext uri="{FF2B5EF4-FFF2-40B4-BE49-F238E27FC236}">
-                <a16:creationId xmlns:a16="http://schemas.microsoft.com/office/drawing/2014/main" id="{D52C7498-EF93-477C-B412-16B1224F5DD4}"/>
+                <a16:creationId xmlns:a16="http://schemas.microsoft.com/office/drawing/2014/main" xmlns="" id="{D52C7498-EF93-477C-B412-16B1224F5DD4}"/>
               </a:ext>
             </a:extLst>
           </p:cNvPr>
@@ -8506,7 +8657,7 @@
           <p:cNvPr id="10" name="Content Placeholder 9">
             <a:extLst>
               <a:ext uri="{FF2B5EF4-FFF2-40B4-BE49-F238E27FC236}">
-                <a16:creationId xmlns:a16="http://schemas.microsoft.com/office/drawing/2014/main" id="{D4220E92-F001-4681-A1AC-770921755A3E}"/>
+                <a16:creationId xmlns:a16="http://schemas.microsoft.com/office/drawing/2014/main" xmlns="" id="{D4220E92-F001-4681-A1AC-770921755A3E}"/>
               </a:ext>
             </a:extLst>
           </p:cNvPr>
@@ -8567,7 +8718,7 @@
           <p:cNvPr id="11" name="Picture 2" descr="schematic">
             <a:extLst>
               <a:ext uri="{FF2B5EF4-FFF2-40B4-BE49-F238E27FC236}">
-                <a16:creationId xmlns:a16="http://schemas.microsoft.com/office/drawing/2014/main" id="{76F14AE4-B7FA-4EE7-8E40-736CA2774049}"/>
+                <a16:creationId xmlns:a16="http://schemas.microsoft.com/office/drawing/2014/main" xmlns="" id="{76F14AE4-B7FA-4EE7-8E40-736CA2774049}"/>
               </a:ext>
             </a:extLst>
           </p:cNvPr>
@@ -8614,7 +8765,7 @@
           <p:cNvPr id="12" name="Picture 6" descr="circuit">
             <a:extLst>
               <a:ext uri="{FF2B5EF4-FFF2-40B4-BE49-F238E27FC236}">
-                <a16:creationId xmlns:a16="http://schemas.microsoft.com/office/drawing/2014/main" id="{05CCB8E0-2027-46C2-A269-97B464625CE0}"/>
+                <a16:creationId xmlns:a16="http://schemas.microsoft.com/office/drawing/2014/main" xmlns="" id="{05CCB8E0-2027-46C2-A269-97B464625CE0}"/>
               </a:ext>
             </a:extLst>
           </p:cNvPr>
@@ -8661,7 +8812,7 @@
           <p:cNvPr id="2" name="Title 1">
             <a:extLst>
               <a:ext uri="{FF2B5EF4-FFF2-40B4-BE49-F238E27FC236}">
-                <a16:creationId xmlns:a16="http://schemas.microsoft.com/office/drawing/2014/main" id="{998F3781-8AFE-42CB-881D-5F921B9B91E7}"/>
+                <a16:creationId xmlns:a16="http://schemas.microsoft.com/office/drawing/2014/main" xmlns="" id="{998F3781-8AFE-42CB-881D-5F921B9B91E7}"/>
               </a:ext>
             </a:extLst>
           </p:cNvPr>
@@ -8689,7 +8840,7 @@
           <p:cNvPr id="4" name="Text Placeholder 3">
             <a:extLst>
               <a:ext uri="{FF2B5EF4-FFF2-40B4-BE49-F238E27FC236}">
-                <a16:creationId xmlns:a16="http://schemas.microsoft.com/office/drawing/2014/main" id="{21E16F2C-5A42-4369-A418-B58976047D88}"/>
+                <a16:creationId xmlns:a16="http://schemas.microsoft.com/office/drawing/2014/main" xmlns="" id="{21E16F2C-5A42-4369-A418-B58976047D88}"/>
               </a:ext>
             </a:extLst>
           </p:cNvPr>
@@ -8749,7 +8900,7 @@
           <p:cNvPr id="5" name="Footer Placeholder 4">
             <a:extLst>
               <a:ext uri="{FF2B5EF4-FFF2-40B4-BE49-F238E27FC236}">
-                <a16:creationId xmlns:a16="http://schemas.microsoft.com/office/drawing/2014/main" id="{2DCCB6F3-B709-4DA9-8218-4F6D4A9ABCD0}"/>
+                <a16:creationId xmlns:a16="http://schemas.microsoft.com/office/drawing/2014/main" xmlns="" id="{2DCCB6F3-B709-4DA9-8218-4F6D4A9ABCD0}"/>
               </a:ext>
             </a:extLst>
           </p:cNvPr>
@@ -8785,7 +8936,7 @@
           <p:cNvPr id="6" name="Slide Number Placeholder 5">
             <a:extLst>
               <a:ext uri="{FF2B5EF4-FFF2-40B4-BE49-F238E27FC236}">
-                <a16:creationId xmlns:a16="http://schemas.microsoft.com/office/drawing/2014/main" id="{DF176D15-EE8B-4F6E-AA27-FE3D06D7805D}"/>
+                <a16:creationId xmlns:a16="http://schemas.microsoft.com/office/drawing/2014/main" xmlns="" id="{DF176D15-EE8B-4F6E-AA27-FE3D06D7805D}"/>
               </a:ext>
             </a:extLst>
           </p:cNvPr>
@@ -8814,7 +8965,7 @@
           <p:cNvPr id="10" name="TextBox 9">
             <a:extLst>
               <a:ext uri="{FF2B5EF4-FFF2-40B4-BE49-F238E27FC236}">
-                <a16:creationId xmlns:a16="http://schemas.microsoft.com/office/drawing/2014/main" id="{D43B569E-8FBD-4B9F-A089-595F7779129D}"/>
+                <a16:creationId xmlns:a16="http://schemas.microsoft.com/office/drawing/2014/main" xmlns="" id="{D43B569E-8FBD-4B9F-A089-595F7779129D}"/>
               </a:ext>
             </a:extLst>
           </p:cNvPr>
@@ -8879,7 +9030,7 @@
           <p:cNvPr id="8" name="Picture 6" descr="schematic">
             <a:extLst>
               <a:ext uri="{FF2B5EF4-FFF2-40B4-BE49-F238E27FC236}">
-                <a16:creationId xmlns:a16="http://schemas.microsoft.com/office/drawing/2014/main" id="{8B2C6042-04C0-4E37-8D70-53EA61054437}"/>
+                <a16:creationId xmlns:a16="http://schemas.microsoft.com/office/drawing/2014/main" xmlns="" id="{8B2C6042-04C0-4E37-8D70-53EA61054437}"/>
               </a:ext>
             </a:extLst>
           </p:cNvPr>
@@ -8926,7 +9077,7 @@
           <p:cNvPr id="2" name="Title 1">
             <a:extLst>
               <a:ext uri="{FF2B5EF4-FFF2-40B4-BE49-F238E27FC236}">
-                <a16:creationId xmlns:a16="http://schemas.microsoft.com/office/drawing/2014/main" id="{998F3781-8AFE-42CB-881D-5F921B9B91E7}"/>
+                <a16:creationId xmlns:a16="http://schemas.microsoft.com/office/drawing/2014/main" xmlns="" id="{998F3781-8AFE-42CB-881D-5F921B9B91E7}"/>
               </a:ext>
             </a:extLst>
           </p:cNvPr>
@@ -8954,7 +9105,7 @@
           <p:cNvPr id="4" name="Text Placeholder 3">
             <a:extLst>
               <a:ext uri="{FF2B5EF4-FFF2-40B4-BE49-F238E27FC236}">
-                <a16:creationId xmlns:a16="http://schemas.microsoft.com/office/drawing/2014/main" id="{21E16F2C-5A42-4369-A418-B58976047D88}"/>
+                <a16:creationId xmlns:a16="http://schemas.microsoft.com/office/drawing/2014/main" xmlns="" id="{21E16F2C-5A42-4369-A418-B58976047D88}"/>
               </a:ext>
             </a:extLst>
           </p:cNvPr>
@@ -9010,7 +9161,7 @@
           <p:cNvPr id="5" name="Footer Placeholder 4">
             <a:extLst>
               <a:ext uri="{FF2B5EF4-FFF2-40B4-BE49-F238E27FC236}">
-                <a16:creationId xmlns:a16="http://schemas.microsoft.com/office/drawing/2014/main" id="{2DCCB6F3-B709-4DA9-8218-4F6D4A9ABCD0}"/>
+                <a16:creationId xmlns:a16="http://schemas.microsoft.com/office/drawing/2014/main" xmlns="" id="{2DCCB6F3-B709-4DA9-8218-4F6D4A9ABCD0}"/>
               </a:ext>
             </a:extLst>
           </p:cNvPr>
@@ -9046,7 +9197,7 @@
           <p:cNvPr id="6" name="Slide Number Placeholder 5">
             <a:extLst>
               <a:ext uri="{FF2B5EF4-FFF2-40B4-BE49-F238E27FC236}">
-                <a16:creationId xmlns:a16="http://schemas.microsoft.com/office/drawing/2014/main" id="{DF176D15-EE8B-4F6E-AA27-FE3D06D7805D}"/>
+                <a16:creationId xmlns:a16="http://schemas.microsoft.com/office/drawing/2014/main" xmlns="" id="{DF176D15-EE8B-4F6E-AA27-FE3D06D7805D}"/>
               </a:ext>
             </a:extLst>
           </p:cNvPr>
@@ -9075,7 +9226,7 @@
           <p:cNvPr id="7" name="Picture 2" descr="circuit">
             <a:extLst>
               <a:ext uri="{FF2B5EF4-FFF2-40B4-BE49-F238E27FC236}">
-                <a16:creationId xmlns:a16="http://schemas.microsoft.com/office/drawing/2014/main" id="{55CD7D32-2D41-419C-926B-BCBA39F53700}"/>
+                <a16:creationId xmlns:a16="http://schemas.microsoft.com/office/drawing/2014/main" xmlns="" id="{55CD7D32-2D41-419C-926B-BCBA39F53700}"/>
               </a:ext>
             </a:extLst>
           </p:cNvPr>
@@ -9122,7 +9273,7 @@
           <p:cNvPr id="9" name="TextBox 8">
             <a:extLst>
               <a:ext uri="{FF2B5EF4-FFF2-40B4-BE49-F238E27FC236}">
-                <a16:creationId xmlns:a16="http://schemas.microsoft.com/office/drawing/2014/main" id="{7C8EAA15-4AE1-40B1-9145-3553016FA314}"/>
+                <a16:creationId xmlns:a16="http://schemas.microsoft.com/office/drawing/2014/main" xmlns="" id="{7C8EAA15-4AE1-40B1-9145-3553016FA314}"/>
               </a:ext>
             </a:extLst>
           </p:cNvPr>
@@ -9209,7 +9360,7 @@
           <p:cNvPr id="4" name="Footer Placeholder 3">
             <a:extLst>
               <a:ext uri="{FF2B5EF4-FFF2-40B4-BE49-F238E27FC236}">
-                <a16:creationId xmlns:a16="http://schemas.microsoft.com/office/drawing/2014/main" id="{4FCB6260-4EB3-4A30-815F-5BC5D7FF33A0}"/>
+                <a16:creationId xmlns:a16="http://schemas.microsoft.com/office/drawing/2014/main" xmlns="" id="{4FCB6260-4EB3-4A30-815F-5BC5D7FF33A0}"/>
               </a:ext>
             </a:extLst>
           </p:cNvPr>
@@ -9245,7 +9396,7 @@
           <p:cNvPr id="5" name="Slide Number Placeholder 4">
             <a:extLst>
               <a:ext uri="{FF2B5EF4-FFF2-40B4-BE49-F238E27FC236}">
-                <a16:creationId xmlns:a16="http://schemas.microsoft.com/office/drawing/2014/main" id="{E12CFC6C-6991-446E-9917-14CB670D3BB0}"/>
+                <a16:creationId xmlns:a16="http://schemas.microsoft.com/office/drawing/2014/main" xmlns="" id="{E12CFC6C-6991-446E-9917-14CB670D3BB0}"/>
               </a:ext>
             </a:extLst>
           </p:cNvPr>
@@ -9296,6 +9447,14 @@
                 <a:hlinkClick r:id="rId2"/>
               </a:rPr>
               <a:t>https://www.instructables.com/id/Arduino-Projects/</a:t>
+            </a:r>
+            <a:r>
+              <a:rPr lang="en-US" sz="2000" dirty="0">
+                <a:solidFill>
+                  <a:srgbClr val="00B0F0"/>
+                </a:solidFill>
+              </a:rPr>
+              <a:t/>
             </a:r>
             <a:br>
               <a:rPr lang="en-US" sz="2000" dirty="0">
@@ -9341,6 +9500,10 @@
               </a:rPr>
               <a:t>http://www.amazon.com</a:t>
             </a:r>
+            <a:r>
+              <a:rPr lang="en-US" sz="2000" dirty="0"/>
+              <a:t/>
+            </a:r>
             <a:br>
               <a:rPr lang="en-US" sz="2000" dirty="0"/>
             </a:br>
@@ -9363,6 +9526,10 @@
               </a:rPr>
               <a:t>https://www.arduino.cc</a:t>
             </a:r>
+            <a:r>
+              <a:rPr lang="en-US" sz="2000" dirty="0"/>
+              <a:t/>
+            </a:r>
             <a:br>
               <a:rPr lang="en-US" sz="2000" dirty="0"/>
             </a:br>
@@ -9385,6 +9552,10 @@
               </a:rPr>
               <a:t>https://www.adafruit.com</a:t>
             </a:r>
+            <a:r>
+              <a:rPr lang="en-US" sz="2000" dirty="0"/>
+              <a:t/>
+            </a:r>
             <a:br>
               <a:rPr lang="en-US" sz="2000" dirty="0"/>
             </a:br>
@@ -9407,6 +9578,10 @@
               </a:rPr>
               <a:t>https://www.sparkfun.com/</a:t>
             </a:r>
+            <a:r>
+              <a:rPr lang="en-US" sz="2000" dirty="0"/>
+              <a:t/>
+            </a:r>
             <a:br>
               <a:rPr lang="en-US" sz="2000" dirty="0"/>
             </a:br>
@@ -9421,6 +9596,10 @@
                 <a:hlinkClick r:id="rId8"/>
               </a:rPr>
               <a:t>https://www.pololu.com/</a:t>
+            </a:r>
+            <a:r>
+              <a:rPr lang="en-US" sz="2000" dirty="0"/>
+              <a:t/>
             </a:r>
             <a:br>
               <a:rPr lang="en-US" sz="2000" dirty="0"/>
@@ -9477,6 +9656,10 @@
                 <a:hlinkClick r:id="rId8"/>
               </a:rPr>
               <a:t>/</a:t>
+            </a:r>
+            <a:r>
+              <a:rPr lang="en-US" sz="2000" dirty="0"/>
+              <a:t/>
             </a:r>
             <a:br>
               <a:rPr lang="en-US" sz="2000" dirty="0"/>
@@ -9627,7 +9810,7 @@
           <p:cNvPr id="4" name="Footer Placeholder 3">
             <a:extLst>
               <a:ext uri="{FF2B5EF4-FFF2-40B4-BE49-F238E27FC236}">
-                <a16:creationId xmlns:a16="http://schemas.microsoft.com/office/drawing/2014/main" id="{45085D77-B385-4DA1-AAB9-DEDEBAA95851}"/>
+                <a16:creationId xmlns:a16="http://schemas.microsoft.com/office/drawing/2014/main" xmlns="" id="{45085D77-B385-4DA1-AAB9-DEDEBAA95851}"/>
               </a:ext>
             </a:extLst>
           </p:cNvPr>
@@ -9663,7 +9846,7 @@
           <p:cNvPr id="5" name="Slide Number Placeholder 4">
             <a:extLst>
               <a:ext uri="{FF2B5EF4-FFF2-40B4-BE49-F238E27FC236}">
-                <a16:creationId xmlns:a16="http://schemas.microsoft.com/office/drawing/2014/main" id="{B7AE9DE6-3593-4BCA-83C3-4D5C78DE11A9}"/>
+                <a16:creationId xmlns:a16="http://schemas.microsoft.com/office/drawing/2014/main" xmlns="" id="{B7AE9DE6-3593-4BCA-83C3-4D5C78DE11A9}"/>
               </a:ext>
             </a:extLst>
           </p:cNvPr>
@@ -9744,7 +9927,7 @@
           <p:cNvPr id="4" name="Footer Placeholder 3">
             <a:extLst>
               <a:ext uri="{FF2B5EF4-FFF2-40B4-BE49-F238E27FC236}">
-                <a16:creationId xmlns:a16="http://schemas.microsoft.com/office/drawing/2014/main" id="{45085D77-B385-4DA1-AAB9-DEDEBAA95851}"/>
+                <a16:creationId xmlns:a16="http://schemas.microsoft.com/office/drawing/2014/main" xmlns="" id="{45085D77-B385-4DA1-AAB9-DEDEBAA95851}"/>
               </a:ext>
             </a:extLst>
           </p:cNvPr>
@@ -9780,7 +9963,7 @@
           <p:cNvPr id="5" name="Slide Number Placeholder 4">
             <a:extLst>
               <a:ext uri="{FF2B5EF4-FFF2-40B4-BE49-F238E27FC236}">
-                <a16:creationId xmlns:a16="http://schemas.microsoft.com/office/drawing/2014/main" id="{B7AE9DE6-3593-4BCA-83C3-4D5C78DE11A9}"/>
+                <a16:creationId xmlns:a16="http://schemas.microsoft.com/office/drawing/2014/main" xmlns="" id="{B7AE9DE6-3593-4BCA-83C3-4D5C78DE11A9}"/>
               </a:ext>
             </a:extLst>
           </p:cNvPr>
@@ -9809,7 +9992,7 @@
           <p:cNvPr id="8" name="Content Placeholder 7">
             <a:extLst>
               <a:ext uri="{FF2B5EF4-FFF2-40B4-BE49-F238E27FC236}">
-                <a16:creationId xmlns:a16="http://schemas.microsoft.com/office/drawing/2014/main" id="{0C49F22C-D7B5-4178-A9A1-1C21E6B002EC}"/>
+                <a16:creationId xmlns:a16="http://schemas.microsoft.com/office/drawing/2014/main" xmlns="" id="{0C49F22C-D7B5-4178-A9A1-1C21E6B002EC}"/>
               </a:ext>
             </a:extLst>
           </p:cNvPr>
@@ -9896,7 +10079,7 @@
           <p:cNvPr id="4" name="Footer Placeholder 3">
             <a:extLst>
               <a:ext uri="{FF2B5EF4-FFF2-40B4-BE49-F238E27FC236}">
-                <a16:creationId xmlns:a16="http://schemas.microsoft.com/office/drawing/2014/main" id="{45085D77-B385-4DA1-AAB9-DEDEBAA95851}"/>
+                <a16:creationId xmlns:a16="http://schemas.microsoft.com/office/drawing/2014/main" xmlns="" id="{45085D77-B385-4DA1-AAB9-DEDEBAA95851}"/>
               </a:ext>
             </a:extLst>
           </p:cNvPr>
@@ -9932,7 +10115,7 @@
           <p:cNvPr id="5" name="Slide Number Placeholder 4">
             <a:extLst>
               <a:ext uri="{FF2B5EF4-FFF2-40B4-BE49-F238E27FC236}">
-                <a16:creationId xmlns:a16="http://schemas.microsoft.com/office/drawing/2014/main" id="{B7AE9DE6-3593-4BCA-83C3-4D5C78DE11A9}"/>
+                <a16:creationId xmlns:a16="http://schemas.microsoft.com/office/drawing/2014/main" xmlns="" id="{B7AE9DE6-3593-4BCA-83C3-4D5C78DE11A9}"/>
               </a:ext>
             </a:extLst>
           </p:cNvPr>
@@ -9961,7 +10144,7 @@
           <p:cNvPr id="8" name="Content Placeholder 7">
             <a:extLst>
               <a:ext uri="{FF2B5EF4-FFF2-40B4-BE49-F238E27FC236}">
-                <a16:creationId xmlns:a16="http://schemas.microsoft.com/office/drawing/2014/main" id="{6BB5BF72-78AE-4141-8C4B-6E3EBC7F506E}"/>
+                <a16:creationId xmlns:a16="http://schemas.microsoft.com/office/drawing/2014/main" xmlns="" id="{6BB5BF72-78AE-4141-8C4B-6E3EBC7F506E}"/>
               </a:ext>
             </a:extLst>
           </p:cNvPr>
@@ -10026,7 +10209,7 @@
           <p:cNvPr id="2" name="Title 1">
             <a:extLst>
               <a:ext uri="{FF2B5EF4-FFF2-40B4-BE49-F238E27FC236}">
-                <a16:creationId xmlns:a16="http://schemas.microsoft.com/office/drawing/2014/main" id="{9BBF530D-04A4-4463-950E-BCABA2186448}"/>
+                <a16:creationId xmlns:a16="http://schemas.microsoft.com/office/drawing/2014/main" xmlns="" id="{9BBF530D-04A4-4463-950E-BCABA2186448}"/>
               </a:ext>
             </a:extLst>
           </p:cNvPr>
@@ -10054,7 +10237,7 @@
           <p:cNvPr id="3" name="Content Placeholder 2">
             <a:extLst>
               <a:ext uri="{FF2B5EF4-FFF2-40B4-BE49-F238E27FC236}">
-                <a16:creationId xmlns:a16="http://schemas.microsoft.com/office/drawing/2014/main" id="{A19D7D03-D494-406C-9BEC-DF21943E5C50}"/>
+                <a16:creationId xmlns:a16="http://schemas.microsoft.com/office/drawing/2014/main" xmlns="" id="{A19D7D03-D494-406C-9BEC-DF21943E5C50}"/>
               </a:ext>
             </a:extLst>
           </p:cNvPr>
@@ -10103,7 +10286,7 @@
           <p:cNvPr id="4" name="Footer Placeholder 3">
             <a:extLst>
               <a:ext uri="{FF2B5EF4-FFF2-40B4-BE49-F238E27FC236}">
-                <a16:creationId xmlns:a16="http://schemas.microsoft.com/office/drawing/2014/main" id="{7E8FD915-7D8F-4CDF-93FA-FDAF5A72D867}"/>
+                <a16:creationId xmlns:a16="http://schemas.microsoft.com/office/drawing/2014/main" xmlns="" id="{7E8FD915-7D8F-4CDF-93FA-FDAF5A72D867}"/>
               </a:ext>
             </a:extLst>
           </p:cNvPr>
@@ -10139,7 +10322,7 @@
           <p:cNvPr id="5" name="Slide Number Placeholder 4">
             <a:extLst>
               <a:ext uri="{FF2B5EF4-FFF2-40B4-BE49-F238E27FC236}">
-                <a16:creationId xmlns:a16="http://schemas.microsoft.com/office/drawing/2014/main" id="{62FFA67B-4FDB-4052-8201-56A1D6EF18DB}"/>
+                <a16:creationId xmlns:a16="http://schemas.microsoft.com/office/drawing/2014/main" xmlns="" id="{62FFA67B-4FDB-4052-8201-56A1D6EF18DB}"/>
               </a:ext>
             </a:extLst>
           </p:cNvPr>
@@ -10294,7 +10477,7 @@
           <p:cNvPr id="4" name="Footer Placeholder 3">
             <a:extLst>
               <a:ext uri="{FF2B5EF4-FFF2-40B4-BE49-F238E27FC236}">
-                <a16:creationId xmlns:a16="http://schemas.microsoft.com/office/drawing/2014/main" id="{ED1E0ABD-C52B-43F1-B461-4C7F7639E2D9}"/>
+                <a16:creationId xmlns:a16="http://schemas.microsoft.com/office/drawing/2014/main" xmlns="" id="{ED1E0ABD-C52B-43F1-B461-4C7F7639E2D9}"/>
               </a:ext>
             </a:extLst>
           </p:cNvPr>
@@ -10330,7 +10513,7 @@
           <p:cNvPr id="5" name="Slide Number Placeholder 4">
             <a:extLst>
               <a:ext uri="{FF2B5EF4-FFF2-40B4-BE49-F238E27FC236}">
-                <a16:creationId xmlns:a16="http://schemas.microsoft.com/office/drawing/2014/main" id="{712063B0-C600-4D8A-9481-6A8CCDA6E16E}"/>
+                <a16:creationId xmlns:a16="http://schemas.microsoft.com/office/drawing/2014/main" xmlns="" id="{712063B0-C600-4D8A-9481-6A8CCDA6E16E}"/>
               </a:ext>
             </a:extLst>
           </p:cNvPr>
@@ -10389,7 +10572,7 @@
           <p:cNvPr id="2" name="Title 1">
             <a:extLst>
               <a:ext uri="{FF2B5EF4-FFF2-40B4-BE49-F238E27FC236}">
-                <a16:creationId xmlns:a16="http://schemas.microsoft.com/office/drawing/2014/main" id="{D1139E32-9196-4E5B-9941-EBCDD7379EE6}"/>
+                <a16:creationId xmlns:a16="http://schemas.microsoft.com/office/drawing/2014/main" xmlns="" id="{D1139E32-9196-4E5B-9941-EBCDD7379EE6}"/>
               </a:ext>
             </a:extLst>
           </p:cNvPr>
@@ -10424,7 +10607,7 @@
           <p:cNvPr id="9" name="Content Placeholder 8">
             <a:extLst>
               <a:ext uri="{FF2B5EF4-FFF2-40B4-BE49-F238E27FC236}">
-                <a16:creationId xmlns:a16="http://schemas.microsoft.com/office/drawing/2014/main" id="{EF64D5DE-3082-413D-B171-771ED2718D68}"/>
+                <a16:creationId xmlns:a16="http://schemas.microsoft.com/office/drawing/2014/main" xmlns="" id="{EF64D5DE-3082-413D-B171-771ED2718D68}"/>
               </a:ext>
             </a:extLst>
           </p:cNvPr>
@@ -10458,7 +10641,7 @@
           <p:cNvPr id="3" name="Footer Placeholder 2">
             <a:extLst>
               <a:ext uri="{FF2B5EF4-FFF2-40B4-BE49-F238E27FC236}">
-                <a16:creationId xmlns:a16="http://schemas.microsoft.com/office/drawing/2014/main" id="{A66128E9-CD50-455C-8090-AAEE7D7CB497}"/>
+                <a16:creationId xmlns:a16="http://schemas.microsoft.com/office/drawing/2014/main" xmlns="" id="{A66128E9-CD50-455C-8090-AAEE7D7CB497}"/>
               </a:ext>
             </a:extLst>
           </p:cNvPr>
@@ -10494,7 +10677,7 @@
           <p:cNvPr id="4" name="Slide Number Placeholder 3">
             <a:extLst>
               <a:ext uri="{FF2B5EF4-FFF2-40B4-BE49-F238E27FC236}">
-                <a16:creationId xmlns:a16="http://schemas.microsoft.com/office/drawing/2014/main" id="{4B6A810F-5C1A-43DB-A377-2F5A94015F21}"/>
+                <a16:creationId xmlns:a16="http://schemas.microsoft.com/office/drawing/2014/main" xmlns="" id="{4B6A810F-5C1A-43DB-A377-2F5A94015F21}"/>
               </a:ext>
             </a:extLst>
           </p:cNvPr>
@@ -10523,7 +10706,7 @@
           <p:cNvPr id="10" name="Content Placeholder 8">
             <a:extLst>
               <a:ext uri="{FF2B5EF4-FFF2-40B4-BE49-F238E27FC236}">
-                <a16:creationId xmlns:a16="http://schemas.microsoft.com/office/drawing/2014/main" id="{5F0A76CF-6456-4E16-8F67-96172814C542}"/>
+                <a16:creationId xmlns:a16="http://schemas.microsoft.com/office/drawing/2014/main" xmlns="" id="{5F0A76CF-6456-4E16-8F67-96172814C542}"/>
               </a:ext>
             </a:extLst>
           </p:cNvPr>
@@ -10559,7 +10742,7 @@
           <p:cNvPr id="11" name="Content Placeholder 8">
             <a:extLst>
               <a:ext uri="{FF2B5EF4-FFF2-40B4-BE49-F238E27FC236}">
-                <a16:creationId xmlns:a16="http://schemas.microsoft.com/office/drawing/2014/main" id="{5A07556E-CF33-4E0A-84DA-688949292753}"/>
+                <a16:creationId xmlns:a16="http://schemas.microsoft.com/office/drawing/2014/main" xmlns="" id="{5A07556E-CF33-4E0A-84DA-688949292753}"/>
               </a:ext>
             </a:extLst>
           </p:cNvPr>
@@ -10594,7 +10777,7 @@
           <p:cNvPr id="12" name="Rectangle 11">
             <a:extLst>
               <a:ext uri="{FF2B5EF4-FFF2-40B4-BE49-F238E27FC236}">
-                <a16:creationId xmlns:a16="http://schemas.microsoft.com/office/drawing/2014/main" id="{8AD417D9-2A6F-4F1D-B30D-4A7CB5EC4265}"/>
+                <a16:creationId xmlns:a16="http://schemas.microsoft.com/office/drawing/2014/main" xmlns="" id="{8AD417D9-2A6F-4F1D-B30D-4A7CB5EC4265}"/>
               </a:ext>
             </a:extLst>
           </p:cNvPr>
@@ -10646,7 +10829,7 @@
           <p:cNvPr id="13" name="Rectangle 12">
             <a:extLst>
               <a:ext uri="{FF2B5EF4-FFF2-40B4-BE49-F238E27FC236}">
-                <a16:creationId xmlns:a16="http://schemas.microsoft.com/office/drawing/2014/main" id="{8616D1FD-D785-4651-8EEE-7CED1C19E0A9}"/>
+                <a16:creationId xmlns:a16="http://schemas.microsoft.com/office/drawing/2014/main" xmlns="" id="{8616D1FD-D785-4651-8EEE-7CED1C19E0A9}"/>
               </a:ext>
             </a:extLst>
           </p:cNvPr>
@@ -10901,7 +11084,7 @@
           <p:cNvPr id="4" name="Slide Number Placeholder 3">
             <a:extLst>
               <a:ext uri="{FF2B5EF4-FFF2-40B4-BE49-F238E27FC236}">
-                <a16:creationId xmlns:a16="http://schemas.microsoft.com/office/drawing/2014/main" id="{525ADA2A-1A32-4BF6-A3DA-634ABCF5687F}"/>
+                <a16:creationId xmlns:a16="http://schemas.microsoft.com/office/drawing/2014/main" xmlns="" id="{525ADA2A-1A32-4BF6-A3DA-634ABCF5687F}"/>
               </a:ext>
             </a:extLst>
           </p:cNvPr>
@@ -10930,7 +11113,7 @@
           <p:cNvPr id="9" name="Footer Placeholder 2">
             <a:extLst>
               <a:ext uri="{FF2B5EF4-FFF2-40B4-BE49-F238E27FC236}">
-                <a16:creationId xmlns:a16="http://schemas.microsoft.com/office/drawing/2014/main" id="{19DE2255-227A-465B-BD11-A9B273904678}"/>
+                <a16:creationId xmlns:a16="http://schemas.microsoft.com/office/drawing/2014/main" xmlns="" id="{19DE2255-227A-465B-BD11-A9B273904678}"/>
               </a:ext>
             </a:extLst>
           </p:cNvPr>
@@ -11116,7 +11299,7 @@
           <p:cNvPr id="3" name="Slide Number Placeholder 2">
             <a:extLst>
               <a:ext uri="{FF2B5EF4-FFF2-40B4-BE49-F238E27FC236}">
-                <a16:creationId xmlns:a16="http://schemas.microsoft.com/office/drawing/2014/main" id="{EAFBAAD7-5C00-4A81-9238-4C33C87A33F0}"/>
+                <a16:creationId xmlns:a16="http://schemas.microsoft.com/office/drawing/2014/main" xmlns="" id="{EAFBAAD7-5C00-4A81-9238-4C33C87A33F0}"/>
               </a:ext>
             </a:extLst>
           </p:cNvPr>
@@ -11145,7 +11328,7 @@
           <p:cNvPr id="8" name="Footer Placeholder 2">
             <a:extLst>
               <a:ext uri="{FF2B5EF4-FFF2-40B4-BE49-F238E27FC236}">
-                <a16:creationId xmlns:a16="http://schemas.microsoft.com/office/drawing/2014/main" id="{2D8858FB-F3E6-4368-A3E2-20B6B1C387B3}"/>
+                <a16:creationId xmlns:a16="http://schemas.microsoft.com/office/drawing/2014/main" xmlns="" id="{2D8858FB-F3E6-4368-A3E2-20B6B1C387B3}"/>
               </a:ext>
             </a:extLst>
           </p:cNvPr>
@@ -11216,7 +11399,7 @@
           <p:cNvPr id="2" name="Title 1">
             <a:extLst>
               <a:ext uri="{FF2B5EF4-FFF2-40B4-BE49-F238E27FC236}">
-                <a16:creationId xmlns:a16="http://schemas.microsoft.com/office/drawing/2014/main" id="{8CBCAF01-25C7-4402-8CF1-3EBE85B52DC3}"/>
+                <a16:creationId xmlns:a16="http://schemas.microsoft.com/office/drawing/2014/main" xmlns="" id="{8CBCAF01-25C7-4402-8CF1-3EBE85B52DC3}"/>
               </a:ext>
             </a:extLst>
           </p:cNvPr>
@@ -11249,7 +11432,7 @@
           <p:cNvPr id="4" name="Text Placeholder 3">
             <a:extLst>
               <a:ext uri="{FF2B5EF4-FFF2-40B4-BE49-F238E27FC236}">
-                <a16:creationId xmlns:a16="http://schemas.microsoft.com/office/drawing/2014/main" id="{A5B2A446-D2C9-42D0-A21D-67B3FC0B9BD3}"/>
+                <a16:creationId xmlns:a16="http://schemas.microsoft.com/office/drawing/2014/main" xmlns="" id="{A5B2A446-D2C9-42D0-A21D-67B3FC0B9BD3}"/>
               </a:ext>
             </a:extLst>
           </p:cNvPr>
@@ -11470,7 +11653,7 @@
           <p:cNvPr id="5" name="Footer Placeholder 4">
             <a:extLst>
               <a:ext uri="{FF2B5EF4-FFF2-40B4-BE49-F238E27FC236}">
-                <a16:creationId xmlns:a16="http://schemas.microsoft.com/office/drawing/2014/main" id="{85358D6C-1E27-48CC-B944-A939804B89B2}"/>
+                <a16:creationId xmlns:a16="http://schemas.microsoft.com/office/drawing/2014/main" xmlns="" id="{85358D6C-1E27-48CC-B944-A939804B89B2}"/>
               </a:ext>
             </a:extLst>
           </p:cNvPr>
@@ -11506,7 +11689,7 @@
           <p:cNvPr id="6" name="Slide Number Placeholder 5">
             <a:extLst>
               <a:ext uri="{FF2B5EF4-FFF2-40B4-BE49-F238E27FC236}">
-                <a16:creationId xmlns:a16="http://schemas.microsoft.com/office/drawing/2014/main" id="{57834132-A330-4543-B48F-9E19F70566C9}"/>
+                <a16:creationId xmlns:a16="http://schemas.microsoft.com/office/drawing/2014/main" xmlns="" id="{57834132-A330-4543-B48F-9E19F70566C9}"/>
               </a:ext>
             </a:extLst>
           </p:cNvPr>
@@ -11535,7 +11718,7 @@
           <p:cNvPr id="1026" name="Picture 2">
             <a:extLst>
               <a:ext uri="{FF2B5EF4-FFF2-40B4-BE49-F238E27FC236}">
-                <a16:creationId xmlns:a16="http://schemas.microsoft.com/office/drawing/2014/main" id="{4AB4DD19-73AA-4F7F-8416-A3D38552FA54}"/>
+                <a16:creationId xmlns:a16="http://schemas.microsoft.com/office/drawing/2014/main" xmlns="" id="{4AB4DD19-73AA-4F7F-8416-A3D38552FA54}"/>
               </a:ext>
             </a:extLst>
           </p:cNvPr>
@@ -11584,7 +11767,7 @@
           <p:cNvPr id="1028" name="Picture 4" descr="Arduino Nano Every">
             <a:extLst>
               <a:ext uri="{FF2B5EF4-FFF2-40B4-BE49-F238E27FC236}">
-                <a16:creationId xmlns:a16="http://schemas.microsoft.com/office/drawing/2014/main" id="{54F8B0C4-7342-415E-A80C-307227A2890C}"/>
+                <a16:creationId xmlns:a16="http://schemas.microsoft.com/office/drawing/2014/main" xmlns="" id="{54F8B0C4-7342-415E-A80C-307227A2890C}"/>
               </a:ext>
             </a:extLst>
           </p:cNvPr>
@@ -11631,7 +11814,7 @@
           <p:cNvPr id="1030" name="Picture 6" descr="Arduino Nano 33 BLE">
             <a:extLst>
               <a:ext uri="{FF2B5EF4-FFF2-40B4-BE49-F238E27FC236}">
-                <a16:creationId xmlns:a16="http://schemas.microsoft.com/office/drawing/2014/main" id="{59894DD5-8D41-4F5E-B0A8-51721BFB03A8}"/>
+                <a16:creationId xmlns:a16="http://schemas.microsoft.com/office/drawing/2014/main" xmlns="" id="{59894DD5-8D41-4F5E-B0A8-51721BFB03A8}"/>
               </a:ext>
             </a:extLst>
           </p:cNvPr>
@@ -11678,7 +11861,7 @@
           <p:cNvPr id="1032" name="Picture 8" descr="Arduino Nano 33 BLE Sense">
             <a:extLst>
               <a:ext uri="{FF2B5EF4-FFF2-40B4-BE49-F238E27FC236}">
-                <a16:creationId xmlns:a16="http://schemas.microsoft.com/office/drawing/2014/main" id="{E5646E88-25EB-4CD7-A032-7D9D0255D3ED}"/>
+                <a16:creationId xmlns:a16="http://schemas.microsoft.com/office/drawing/2014/main" xmlns="" id="{E5646E88-25EB-4CD7-A032-7D9D0255D3ED}"/>
               </a:ext>
             </a:extLst>
           </p:cNvPr>
@@ -11725,7 +11908,7 @@
           <p:cNvPr id="3" name="TextBox 2">
             <a:extLst>
               <a:ext uri="{FF2B5EF4-FFF2-40B4-BE49-F238E27FC236}">
-                <a16:creationId xmlns:a16="http://schemas.microsoft.com/office/drawing/2014/main" id="{3DC34EC5-30DA-466F-865B-062E0DDCFAA8}"/>
+                <a16:creationId xmlns:a16="http://schemas.microsoft.com/office/drawing/2014/main" xmlns="" id="{3DC34EC5-30DA-466F-865B-062E0DDCFAA8}"/>
               </a:ext>
             </a:extLst>
           </p:cNvPr>
@@ -11760,7 +11943,7 @@
           <p:cNvPr id="11" name="TextBox 10">
             <a:extLst>
               <a:ext uri="{FF2B5EF4-FFF2-40B4-BE49-F238E27FC236}">
-                <a16:creationId xmlns:a16="http://schemas.microsoft.com/office/drawing/2014/main" id="{DD552EF8-B5E2-4210-AA09-C49C4C7D3FF6}"/>
+                <a16:creationId xmlns:a16="http://schemas.microsoft.com/office/drawing/2014/main" xmlns="" id="{DD552EF8-B5E2-4210-AA09-C49C4C7D3FF6}"/>
               </a:ext>
             </a:extLst>
           </p:cNvPr>
@@ -11795,7 +11978,7 @@
           <p:cNvPr id="12" name="TextBox 11">
             <a:extLst>
               <a:ext uri="{FF2B5EF4-FFF2-40B4-BE49-F238E27FC236}">
-                <a16:creationId xmlns:a16="http://schemas.microsoft.com/office/drawing/2014/main" id="{1567ED3D-36F8-4554-8AE1-388EA3EC0B93}"/>
+                <a16:creationId xmlns:a16="http://schemas.microsoft.com/office/drawing/2014/main" xmlns="" id="{1567ED3D-36F8-4554-8AE1-388EA3EC0B93}"/>
               </a:ext>
             </a:extLst>
           </p:cNvPr>
@@ -11830,7 +12013,7 @@
           <p:cNvPr id="13" name="TextBox 12">
             <a:extLst>
               <a:ext uri="{FF2B5EF4-FFF2-40B4-BE49-F238E27FC236}">
-                <a16:creationId xmlns:a16="http://schemas.microsoft.com/office/drawing/2014/main" id="{812EF23B-A493-4923-894A-264A832AE15A}"/>
+                <a16:creationId xmlns:a16="http://schemas.microsoft.com/office/drawing/2014/main" xmlns="" id="{812EF23B-A493-4923-894A-264A832AE15A}"/>
               </a:ext>
             </a:extLst>
           </p:cNvPr>
@@ -12015,7 +12198,7 @@
           <p:cNvPr id="6" name="Slide Number Placeholder 5">
             <a:extLst>
               <a:ext uri="{FF2B5EF4-FFF2-40B4-BE49-F238E27FC236}">
-                <a16:creationId xmlns:a16="http://schemas.microsoft.com/office/drawing/2014/main" id="{7030B9E2-7975-43BC-BCE7-5F3D33D9074F}"/>
+                <a16:creationId xmlns:a16="http://schemas.microsoft.com/office/drawing/2014/main" xmlns="" id="{7030B9E2-7975-43BC-BCE7-5F3D33D9074F}"/>
               </a:ext>
             </a:extLst>
           </p:cNvPr>
@@ -12044,7 +12227,7 @@
           <p:cNvPr id="7" name="Footer Placeholder 2">
             <a:extLst>
               <a:ext uri="{FF2B5EF4-FFF2-40B4-BE49-F238E27FC236}">
-                <a16:creationId xmlns:a16="http://schemas.microsoft.com/office/drawing/2014/main" id="{9DD7AE80-FC64-4E6B-90D8-B501BAF76339}"/>
+                <a16:creationId xmlns:a16="http://schemas.microsoft.com/office/drawing/2014/main" xmlns="" id="{9DD7AE80-FC64-4E6B-90D8-B501BAF76339}"/>
               </a:ext>
             </a:extLst>
           </p:cNvPr>

</xml_diff>